<commit_message>
#12: presentation.pptx, add section
</commit_message>
<xml_diff>
--- a/presentation.pptx
+++ b/presentation.pptx
@@ -9,6 +9,7 @@
     <p:sldId id="257" r:id="rId3"/>
     <p:sldId id="258" r:id="rId4"/>
     <p:sldId id="259" r:id="rId5"/>
+    <p:sldId id="260" r:id="rId6"/>
   </p:sldIdLst>
   <p:sldSz cx="12192000" cy="6858000"/>
   <p:notesSz cx="6858000" cy="9144000"/>
@@ -4287,6 +4288,108 @@
 </p:sld>
 </file>
 
+<file path=ppt/slides/slide5.xml><?xml version="1.0" encoding="utf-8"?>
+<p:sld xmlns:a="http://schemas.openxmlformats.org/drawingml/2006/main" xmlns:r="http://schemas.openxmlformats.org/officeDocument/2006/relationships" xmlns:p="http://schemas.openxmlformats.org/presentationml/2006/main">
+  <p:cSld>
+    <p:bg>
+      <p:bgPr>
+        <a:blipFill dpi="0" rotWithShape="1">
+          <a:blip r:embed="rId2">
+            <a:alphaModFix amt="15000"/>
+            <a:lum/>
+          </a:blip>
+          <a:srcRect/>
+          <a:stretch>
+            <a:fillRect l="-2000" r="-2000"/>
+          </a:stretch>
+        </a:blipFill>
+        <a:effectLst/>
+      </p:bgPr>
+    </p:bg>
+    <p:spTree>
+      <p:nvGrpSpPr>
+        <p:cNvPr id="1" name=""/>
+        <p:cNvGrpSpPr/>
+        <p:nvPr/>
+      </p:nvGrpSpPr>
+      <p:grpSpPr>
+        <a:xfrm>
+          <a:off x="0" y="0"/>
+          <a:ext cx="0" cy="0"/>
+          <a:chOff x="0" y="0"/>
+          <a:chExt cx="0" cy="0"/>
+        </a:xfrm>
+      </p:grpSpPr>
+      <p:sp>
+        <p:nvSpPr>
+          <p:cNvPr id="7" name="Title 6">
+            <a:extLst>
+              <a:ext uri="{FF2B5EF4-FFF2-40B4-BE49-F238E27FC236}">
+                <a16:creationId xmlns:a16="http://schemas.microsoft.com/office/drawing/2014/main" id="{F276A244-89FD-5B81-7E4E-67067BB463F2}"/>
+              </a:ext>
+            </a:extLst>
+          </p:cNvPr>
+          <p:cNvSpPr>
+            <a:spLocks noGrp="1"/>
+          </p:cNvSpPr>
+          <p:nvPr>
+            <p:ph type="ctrTitle"/>
+          </p:nvPr>
+        </p:nvSpPr>
+        <p:spPr/>
+        <p:txBody>
+          <a:bodyPr/>
+          <a:lstStyle/>
+          <a:p>
+            <a:r>
+              <a:rPr lang="en-US" dirty="0">
+                <a:solidFill>
+                  <a:schemeClr val="tx1"/>
+                </a:solidFill>
+              </a:rPr>
+              <a:t>Follow-up</a:t>
+            </a:r>
+          </a:p>
+        </p:txBody>
+      </p:sp>
+      <p:sp>
+        <p:nvSpPr>
+          <p:cNvPr id="2" name="Subtitle 1">
+            <a:extLst>
+              <a:ext uri="{FF2B5EF4-FFF2-40B4-BE49-F238E27FC236}">
+                <a16:creationId xmlns:a16="http://schemas.microsoft.com/office/drawing/2014/main" id="{E28A000C-5430-E51B-8330-70BE38363181}"/>
+              </a:ext>
+            </a:extLst>
+          </p:cNvPr>
+          <p:cNvSpPr>
+            <a:spLocks noGrp="1"/>
+          </p:cNvSpPr>
+          <p:nvPr>
+            <p:ph type="subTitle" idx="1"/>
+          </p:nvPr>
+        </p:nvSpPr>
+        <p:spPr/>
+        <p:txBody>
+          <a:bodyPr/>
+          <a:lstStyle/>
+          <a:p>
+            <a:endParaRPr lang="en-US" dirty="0"/>
+          </a:p>
+        </p:txBody>
+      </p:sp>
+    </p:spTree>
+    <p:extLst>
+      <p:ext uri="{BB962C8B-B14F-4D97-AF65-F5344CB8AC3E}">
+        <p14:creationId xmlns:p14="http://schemas.microsoft.com/office/powerpoint/2010/main" val="1305535365"/>
+      </p:ext>
+    </p:extLst>
+  </p:cSld>
+  <p:clrMapOvr>
+    <a:masterClrMapping/>
+  </p:clrMapOvr>
+</p:sld>
+</file>
+
 <file path=ppt/theme/theme1.xml><?xml version="1.0" encoding="utf-8"?>
 <a:theme xmlns:a="http://schemas.openxmlformats.org/drawingml/2006/main" name="Crop">
   <a:themeElements>

</xml_diff>

<commit_message>
#12: presentation.pptx, add subtitles
</commit_message>
<xml_diff>
--- a/presentation.pptx
+++ b/presentation.pptx
@@ -4056,7 +4056,10 @@
           <a:bodyPr/>
           <a:lstStyle/>
           <a:p>
-            <a:endParaRPr lang="en-US"/>
+            <a:r>
+              <a:rPr lang="en-US" dirty="0"/>
+              <a:t>Asset Analysis: visualization using Shiny Dashboard</a:t>
+            </a:r>
           </a:p>
         </p:txBody>
       </p:sp>
@@ -4158,7 +4161,10 @@
           <a:bodyPr/>
           <a:lstStyle/>
           <a:p>
-            <a:endParaRPr lang="en-US"/>
+            <a:r>
+              <a:rPr lang="en-US" dirty="0"/>
+              <a:t>Ensembled Chatbot: classifiers with neural network</a:t>
+            </a:r>
           </a:p>
         </p:txBody>
       </p:sp>
@@ -4271,7 +4277,10 @@
           <a:bodyPr/>
           <a:lstStyle/>
           <a:p>
-            <a:endParaRPr lang="en-US"/>
+            <a:r>
+              <a:rPr lang="en-US" dirty="0"/>
+              <a:t>Market Prediction: using sentiment analysis</a:t>
+            </a:r>
           </a:p>
         </p:txBody>
       </p:sp>
@@ -4373,7 +4382,10 @@
           <a:bodyPr/>
           <a:lstStyle/>
           <a:p>
-            <a:endParaRPr lang="en-US" dirty="0"/>
+            <a:r>
+              <a:rPr lang="en-US" dirty="0"/>
+              <a:t>AWS Integration: streaming data</a:t>
+            </a:r>
           </a:p>
         </p:txBody>
       </p:sp>

</xml_diff>

<commit_message>
#12: presentation.pptx, add 'learning goals' slide
</commit_message>
<xml_diff>
--- a/presentation.pptx
+++ b/presentation.pptx
@@ -5,15 +5,16 @@
     <p:sldMasterId id="2147483726" r:id="rId1"/>
   </p:sldMasterIdLst>
   <p:notesMasterIdLst>
-    <p:notesMasterId r:id="rId8"/>
+    <p:notesMasterId r:id="rId9"/>
   </p:notesMasterIdLst>
   <p:sldIdLst>
     <p:sldId id="261" r:id="rId2"/>
     <p:sldId id="256" r:id="rId3"/>
-    <p:sldId id="257" r:id="rId4"/>
-    <p:sldId id="258" r:id="rId5"/>
-    <p:sldId id="259" r:id="rId6"/>
-    <p:sldId id="260" r:id="rId7"/>
+    <p:sldId id="262" r:id="rId4"/>
+    <p:sldId id="257" r:id="rId5"/>
+    <p:sldId id="258" r:id="rId6"/>
+    <p:sldId id="259" r:id="rId7"/>
+    <p:sldId id="260" r:id="rId8"/>
   </p:sldIdLst>
   <p:sldSz cx="12192000" cy="6858000"/>
   <p:notesSz cx="6858000" cy="9144000"/>
@@ -13373,9 +13374,10 @@
           <a:lstStyle/>
           <a:p>
             <a:r>
-              <a:rPr lang="en-US" dirty="0"/>
-              <a:t>Learning Goals</a:t>
+              <a:rPr lang="en-US"/>
+              <a:t>Introduction</a:t>
             </a:r>
+            <a:endParaRPr lang="en-US" dirty="0"/>
           </a:p>
         </p:txBody>
       </p:sp>
@@ -13427,6 +13429,166 @@
 </file>
 
 <file path=ppt/slides/slide3.xml><?xml version="1.0" encoding="utf-8"?>
+<p:sld xmlns:a="http://schemas.openxmlformats.org/drawingml/2006/main" xmlns:r="http://schemas.openxmlformats.org/officeDocument/2006/relationships" xmlns:p="http://schemas.openxmlformats.org/presentationml/2006/main">
+  <p:cSld>
+    <p:spTree>
+      <p:nvGrpSpPr>
+        <p:cNvPr id="1" name=""/>
+        <p:cNvGrpSpPr/>
+        <p:nvPr/>
+      </p:nvGrpSpPr>
+      <p:grpSpPr>
+        <a:xfrm>
+          <a:off x="0" y="0"/>
+          <a:ext cx="0" cy="0"/>
+          <a:chOff x="0" y="0"/>
+          <a:chExt cx="0" cy="0"/>
+        </a:xfrm>
+      </p:grpSpPr>
+      <p:sp>
+        <p:nvSpPr>
+          <p:cNvPr id="2" name="Title 1">
+            <a:extLst>
+              <a:ext uri="{FF2B5EF4-FFF2-40B4-BE49-F238E27FC236}">
+                <a16:creationId xmlns:a16="http://schemas.microsoft.com/office/drawing/2014/main" id="{D6470558-0ED2-D384-541E-71434F5424D9}"/>
+              </a:ext>
+            </a:extLst>
+          </p:cNvPr>
+          <p:cNvSpPr>
+            <a:spLocks noGrp="1"/>
+          </p:cNvSpPr>
+          <p:nvPr>
+            <p:ph type="title"/>
+          </p:nvPr>
+        </p:nvSpPr>
+        <p:spPr/>
+        <p:txBody>
+          <a:bodyPr/>
+          <a:lstStyle/>
+          <a:p>
+            <a:r>
+              <a:rPr lang="en-US" dirty="0"/>
+              <a:t>Learning Goals</a:t>
+            </a:r>
+          </a:p>
+        </p:txBody>
+      </p:sp>
+      <p:sp>
+        <p:nvSpPr>
+          <p:cNvPr id="3" name="Content Placeholder 2">
+            <a:extLst>
+              <a:ext uri="{FF2B5EF4-FFF2-40B4-BE49-F238E27FC236}">
+                <a16:creationId xmlns:a16="http://schemas.microsoft.com/office/drawing/2014/main" id="{B4C512E1-E181-445A-F8F1-6456EF98BD41}"/>
+              </a:ext>
+            </a:extLst>
+          </p:cNvPr>
+          <p:cNvSpPr>
+            <a:spLocks noGrp="1"/>
+          </p:cNvSpPr>
+          <p:nvPr>
+            <p:ph idx="1"/>
+          </p:nvPr>
+        </p:nvSpPr>
+        <p:spPr/>
+        <p:txBody>
+          <a:bodyPr>
+            <a:normAutofit/>
+          </a:bodyPr>
+          <a:lstStyle/>
+          <a:p>
+            <a:pPr>
+              <a:buFont typeface="Arial" panose="020B0604020202020204" pitchFamily="34" charset="0"/>
+              <a:buChar char="•"/>
+            </a:pPr>
+            <a:r>
+              <a:rPr lang="en-US" sz="1800" dirty="0">
+                <a:effectLst/>
+                <a:latin typeface="ArialMT"/>
+              </a:rPr>
+              <a:t>Collect, store, and access data by identifying and leveraging applicable technologies </a:t>
+            </a:r>
+          </a:p>
+          <a:p>
+            <a:pPr>
+              <a:buFont typeface="Arial" panose="020B0604020202020204" pitchFamily="34" charset="0"/>
+              <a:buChar char="•"/>
+            </a:pPr>
+            <a:r>
+              <a:rPr lang="en-US" sz="1800" dirty="0">
+                <a:effectLst/>
+                <a:latin typeface="ArialMT"/>
+              </a:rPr>
+              <a:t>Create actionable insight across a range of contexts (e.g. societal, business, political), using data and the full data science life cycle </a:t>
+            </a:r>
+          </a:p>
+          <a:p>
+            <a:pPr>
+              <a:buFont typeface="Arial" panose="020B0604020202020204" pitchFamily="34" charset="0"/>
+              <a:buChar char="•"/>
+            </a:pPr>
+            <a:r>
+              <a:rPr lang="en-US" sz="1800" dirty="0">
+                <a:effectLst/>
+                <a:latin typeface="ArialMT"/>
+              </a:rPr>
+              <a:t>Apply visualization and predictive models to help generate actionable insight </a:t>
+            </a:r>
+          </a:p>
+          <a:p>
+            <a:pPr>
+              <a:buFont typeface="Arial" panose="020B0604020202020204" pitchFamily="34" charset="0"/>
+              <a:buChar char="•"/>
+            </a:pPr>
+            <a:r>
+              <a:rPr lang="en-US" sz="1800" dirty="0">
+                <a:effectLst/>
+                <a:latin typeface="ArialMT"/>
+              </a:rPr>
+              <a:t>Use programming languages such as Rand Python to support the generation of actionable insight </a:t>
+            </a:r>
+          </a:p>
+          <a:p>
+            <a:pPr>
+              <a:buFont typeface="Arial" panose="020B0604020202020204" pitchFamily="34" charset="0"/>
+              <a:buChar char="•"/>
+            </a:pPr>
+            <a:r>
+              <a:rPr lang="en-US" sz="1800" dirty="0">
+                <a:effectLst/>
+                <a:latin typeface="ArialMT"/>
+              </a:rPr>
+              <a:t>Communicate insights gained via visualization and analytics to a broad range of audiences (including project sponsors and technical team leads)</a:t>
+            </a:r>
+          </a:p>
+          <a:p>
+            <a:pPr>
+              <a:buFont typeface="Arial" panose="020B0604020202020204" pitchFamily="34" charset="0"/>
+              <a:buChar char="•"/>
+            </a:pPr>
+            <a:r>
+              <a:rPr lang="en-US" sz="1800" dirty="0">
+                <a:effectLst/>
+                <a:latin typeface="ArialMT"/>
+              </a:rPr>
+              <a:t>Apply ethics in the development, use and evaluation of data and predictive models (e.g., fairness, bias, transparency, privacy) </a:t>
+            </a:r>
+          </a:p>
+        </p:txBody>
+      </p:sp>
+    </p:spTree>
+    <p:extLst>
+      <p:ext uri="{BB962C8B-B14F-4D97-AF65-F5344CB8AC3E}">
+        <p14:creationId xmlns:p14="http://schemas.microsoft.com/office/powerpoint/2010/main" val="3704083266"/>
+      </p:ext>
+    </p:extLst>
+  </p:cSld>
+  <p:clrMapOvr>
+    <a:masterClrMapping/>
+  </p:clrMapOvr>
+</p:sld>
+</file>
+
+<file path=ppt/slides/slide4.xml><?xml version="1.0" encoding="utf-8"?>
 <p:sld xmlns:a="http://schemas.openxmlformats.org/drawingml/2006/main" xmlns:r="http://schemas.openxmlformats.org/officeDocument/2006/relationships" xmlns:p="http://schemas.openxmlformats.org/presentationml/2006/main">
   <p:cSld>
     <p:bg>
@@ -13542,7 +13704,7 @@
 </p:sld>
 </file>
 
-<file path=ppt/slides/slide4.xml><?xml version="1.0" encoding="utf-8"?>
+<file path=ppt/slides/slide5.xml><?xml version="1.0" encoding="utf-8"?>
 <p:sld xmlns:a="http://schemas.openxmlformats.org/drawingml/2006/main" xmlns:r="http://schemas.openxmlformats.org/officeDocument/2006/relationships" xmlns:p="http://schemas.openxmlformats.org/presentationml/2006/main">
   <p:cSld>
     <p:bg>
@@ -13647,7 +13809,7 @@
 </p:sld>
 </file>
 
-<file path=ppt/slides/slide5.xml><?xml version="1.0" encoding="utf-8"?>
+<file path=ppt/slides/slide6.xml><?xml version="1.0" encoding="utf-8"?>
 <p:sld xmlns:a="http://schemas.openxmlformats.org/drawingml/2006/main" xmlns:r="http://schemas.openxmlformats.org/officeDocument/2006/relationships" xmlns:p="http://schemas.openxmlformats.org/presentationml/2006/main">
   <p:cSld>
     <p:bg>
@@ -13763,7 +13925,7 @@
 </p:sld>
 </file>
 
-<file path=ppt/slides/slide6.xml><?xml version="1.0" encoding="utf-8"?>
+<file path=ppt/slides/slide7.xml><?xml version="1.0" encoding="utf-8"?>
 <p:sld xmlns:a="http://schemas.openxmlformats.org/drawingml/2006/main" xmlns:r="http://schemas.openxmlformats.org/officeDocument/2006/relationships" xmlns:p="http://schemas.openxmlformats.org/presentationml/2006/main">
   <p:cSld>
     <p:bg>

</xml_diff>

<commit_message>
#12: presentation.pptx, add 'capstone projects' slide
</commit_message>
<xml_diff>
--- a/presentation.pptx
+++ b/presentation.pptx
@@ -5,16 +5,17 @@
     <p:sldMasterId id="2147483726" r:id="rId1"/>
   </p:sldMasterIdLst>
   <p:notesMasterIdLst>
-    <p:notesMasterId r:id="rId9"/>
+    <p:notesMasterId r:id="rId10"/>
   </p:notesMasterIdLst>
   <p:sldIdLst>
     <p:sldId id="261" r:id="rId2"/>
     <p:sldId id="256" r:id="rId3"/>
     <p:sldId id="262" r:id="rId4"/>
-    <p:sldId id="257" r:id="rId5"/>
-    <p:sldId id="258" r:id="rId6"/>
-    <p:sldId id="259" r:id="rId7"/>
-    <p:sldId id="260" r:id="rId8"/>
+    <p:sldId id="263" r:id="rId5"/>
+    <p:sldId id="257" r:id="rId6"/>
+    <p:sldId id="258" r:id="rId7"/>
+    <p:sldId id="259" r:id="rId8"/>
+    <p:sldId id="260" r:id="rId9"/>
   </p:sldIdLst>
   <p:sldSz cx="12192000" cy="6858000"/>
   <p:notesSz cx="6858000" cy="9144000"/>
@@ -13374,10 +13375,9 @@
           <a:lstStyle/>
           <a:p>
             <a:r>
-              <a:rPr lang="en-US"/>
+              <a:rPr lang="en-US" dirty="0"/>
               <a:t>Introduction</a:t>
             </a:r>
-            <a:endParaRPr lang="en-US" dirty="0"/>
           </a:p>
         </p:txBody>
       </p:sp>
@@ -13591,6 +13591,444 @@
 <file path=ppt/slides/slide4.xml><?xml version="1.0" encoding="utf-8"?>
 <p:sld xmlns:a="http://schemas.openxmlformats.org/drawingml/2006/main" xmlns:r="http://schemas.openxmlformats.org/officeDocument/2006/relationships" xmlns:p="http://schemas.openxmlformats.org/presentationml/2006/main">
   <p:cSld>
+    <p:spTree>
+      <p:nvGrpSpPr>
+        <p:cNvPr id="1" name=""/>
+        <p:cNvGrpSpPr/>
+        <p:nvPr/>
+      </p:nvGrpSpPr>
+      <p:grpSpPr>
+        <a:xfrm>
+          <a:off x="0" y="0"/>
+          <a:ext cx="0" cy="0"/>
+          <a:chOff x="0" y="0"/>
+          <a:chExt cx="0" cy="0"/>
+        </a:xfrm>
+      </p:grpSpPr>
+      <p:sp>
+        <p:nvSpPr>
+          <p:cNvPr id="2" name="Title 1">
+            <a:extLst>
+              <a:ext uri="{FF2B5EF4-FFF2-40B4-BE49-F238E27FC236}">
+                <a16:creationId xmlns:a16="http://schemas.microsoft.com/office/drawing/2014/main" id="{20E820D5-E994-12CF-E4DA-055F2816EEC3}"/>
+              </a:ext>
+            </a:extLst>
+          </p:cNvPr>
+          <p:cNvSpPr>
+            <a:spLocks noGrp="1"/>
+          </p:cNvSpPr>
+          <p:nvPr>
+            <p:ph type="title"/>
+          </p:nvPr>
+        </p:nvSpPr>
+        <p:spPr/>
+        <p:txBody>
+          <a:bodyPr/>
+          <a:lstStyle/>
+          <a:p>
+            <a:r>
+              <a:rPr lang="en-US" dirty="0"/>
+              <a:t>Capstone Projects</a:t>
+            </a:r>
+          </a:p>
+        </p:txBody>
+      </p:sp>
+      <p:graphicFrame>
+        <p:nvGraphicFramePr>
+          <p:cNvPr id="4" name="Table 4">
+            <a:extLst>
+              <a:ext uri="{FF2B5EF4-FFF2-40B4-BE49-F238E27FC236}">
+                <a16:creationId xmlns:a16="http://schemas.microsoft.com/office/drawing/2014/main" id="{DBCFFCB9-C4C0-E692-975C-465A2D694459}"/>
+              </a:ext>
+            </a:extLst>
+          </p:cNvPr>
+          <p:cNvGraphicFramePr>
+            <a:graphicFrameLocks noGrp="1"/>
+          </p:cNvGraphicFramePr>
+          <p:nvPr>
+            <p:ph idx="1"/>
+            <p:extLst>
+              <p:ext uri="{D42A27DB-BD31-4B8C-83A1-F6EECF244321}">
+                <p14:modId xmlns:p14="http://schemas.microsoft.com/office/powerpoint/2010/main" val="1200281430"/>
+              </p:ext>
+            </p:extLst>
+          </p:nvPr>
+        </p:nvGraphicFramePr>
+        <p:xfrm>
+          <a:off x="1371600" y="2171700"/>
+          <a:ext cx="10248900" cy="3937000"/>
+        </p:xfrm>
+        <a:graphic>
+          <a:graphicData uri="http://schemas.openxmlformats.org/drawingml/2006/table">
+            <a:tbl>
+              <a:tblPr firstRow="1" bandRow="1">
+                <a:tableStyleId>{5C22544A-7EE6-4342-B048-85BDC9FD1C3A}</a:tableStyleId>
+              </a:tblPr>
+              <a:tblGrid>
+                <a:gridCol w="3073400">
+                  <a:extLst>
+                    <a:ext uri="{9D8B030D-6E8A-4147-A177-3AD203B41FA5}">
+                      <a16:colId xmlns:a16="http://schemas.microsoft.com/office/drawing/2014/main" val="4086179984"/>
+                    </a:ext>
+                  </a:extLst>
+                </a:gridCol>
+                <a:gridCol w="3441700">
+                  <a:extLst>
+                    <a:ext uri="{9D8B030D-6E8A-4147-A177-3AD203B41FA5}">
+                      <a16:colId xmlns:a16="http://schemas.microsoft.com/office/drawing/2014/main" val="1520073103"/>
+                    </a:ext>
+                  </a:extLst>
+                </a:gridCol>
+                <a:gridCol w="3733800">
+                  <a:extLst>
+                    <a:ext uri="{9D8B030D-6E8A-4147-A177-3AD203B41FA5}">
+                      <a16:colId xmlns:a16="http://schemas.microsoft.com/office/drawing/2014/main" val="3515288955"/>
+                    </a:ext>
+                  </a:extLst>
+                </a:gridCol>
+              </a:tblGrid>
+              <a:tr h="370840">
+                <a:tc>
+                  <a:txBody>
+                    <a:bodyPr/>
+                    <a:lstStyle/>
+                    <a:p>
+                      <a:r>
+                        <a:rPr lang="en-US" dirty="0"/>
+                        <a:t>Course</a:t>
+                      </a:r>
+                    </a:p>
+                  </a:txBody>
+                  <a:tcPr/>
+                </a:tc>
+                <a:tc>
+                  <a:txBody>
+                    <a:bodyPr/>
+                    <a:lstStyle/>
+                    <a:p>
+                      <a:r>
+                        <a:rPr lang="en-US" dirty="0"/>
+                        <a:t>Capstone Project</a:t>
+                      </a:r>
+                    </a:p>
+                  </a:txBody>
+                  <a:tcPr/>
+                </a:tc>
+                <a:tc>
+                  <a:txBody>
+                    <a:bodyPr/>
+                    <a:lstStyle/>
+                    <a:p>
+                      <a:r>
+                        <a:rPr lang="en-US" dirty="0"/>
+                        <a:t>Skills</a:t>
+                      </a:r>
+                    </a:p>
+                  </a:txBody>
+                  <a:tcPr/>
+                </a:tc>
+                <a:extLst>
+                  <a:ext uri="{0D108BD9-81ED-4DB2-BD59-A6C34878D82A}">
+                    <a16:rowId xmlns:a16="http://schemas.microsoft.com/office/drawing/2014/main" val="3562611633"/>
+                  </a:ext>
+                </a:extLst>
+              </a:tr>
+              <a:tr h="370840">
+                <a:tc>
+                  <a:txBody>
+                    <a:bodyPr/>
+                    <a:lstStyle/>
+                    <a:p>
+                      <a:r>
+                        <a:rPr lang="en-US" b="1" dirty="0"/>
+                        <a:t>FIN-654</a:t>
+                      </a:r>
+                    </a:p>
+                    <a:p>
+                      <a:r>
+                        <a:rPr lang="en-US" dirty="0"/>
+                        <a:t>Financial Analytics</a:t>
+                      </a:r>
+                    </a:p>
+                  </a:txBody>
+                  <a:tcPr anchor="ctr"/>
+                </a:tc>
+                <a:tc>
+                  <a:txBody>
+                    <a:bodyPr/>
+                    <a:lstStyle/>
+                    <a:p>
+                      <a:pPr algn="l"/>
+                      <a:r>
+                        <a:rPr lang="en-US" dirty="0"/>
+                        <a:t>Asset/Portfolio Analysis</a:t>
+                      </a:r>
+                    </a:p>
+                  </a:txBody>
+                  <a:tcPr anchor="ctr"/>
+                </a:tc>
+                <a:tc>
+                  <a:txBody>
+                    <a:bodyPr/>
+                    <a:lstStyle/>
+                    <a:p>
+                      <a:r>
+                        <a:rPr lang="en-US" sz="1800" kern="1200" dirty="0">
+                          <a:solidFill>
+                            <a:schemeClr val="dk1"/>
+                          </a:solidFill>
+                          <a:effectLst/>
+                          <a:latin typeface="+mn-lt"/>
+                          <a:ea typeface="+mn-ea"/>
+                          <a:cs typeface="+mn-cs"/>
+                        </a:rPr>
+                        <a:t>Python, R, time series analysis, financial analysis, Shiny Dashboard</a:t>
+                      </a:r>
+                      <a:r>
+                        <a:rPr lang="en-US" dirty="0">
+                          <a:effectLst/>
+                        </a:rPr>
+                        <a:t> </a:t>
+                      </a:r>
+                      <a:endParaRPr lang="en-US" dirty="0"/>
+                    </a:p>
+                  </a:txBody>
+                  <a:tcPr anchor="ctr"/>
+                </a:tc>
+                <a:extLst>
+                  <a:ext uri="{0D108BD9-81ED-4DB2-BD59-A6C34878D82A}">
+                    <a16:rowId xmlns:a16="http://schemas.microsoft.com/office/drawing/2014/main" val="1195236710"/>
+                  </a:ext>
+                </a:extLst>
+              </a:tr>
+              <a:tr h="370840">
+                <a:tc>
+                  <a:txBody>
+                    <a:bodyPr/>
+                    <a:lstStyle/>
+                    <a:p>
+                      <a:r>
+                        <a:rPr lang="en-US" b="1" dirty="0"/>
+                        <a:t>IST-664</a:t>
+                      </a:r>
+                    </a:p>
+                    <a:p>
+                      <a:r>
+                        <a:rPr lang="en-US" dirty="0"/>
+                        <a:t>Natural Language Processing</a:t>
+                      </a:r>
+                    </a:p>
+                  </a:txBody>
+                  <a:tcPr anchor="ctr"/>
+                </a:tc>
+                <a:tc>
+                  <a:txBody>
+                    <a:bodyPr/>
+                    <a:lstStyle/>
+                    <a:p>
+                      <a:r>
+                        <a:rPr lang="en-US" dirty="0"/>
+                        <a:t>Chatbot</a:t>
+                      </a:r>
+                    </a:p>
+                  </a:txBody>
+                  <a:tcPr anchor="ctr"/>
+                </a:tc>
+                <a:tc>
+                  <a:txBody>
+                    <a:bodyPr/>
+                    <a:lstStyle/>
+                    <a:p>
+                      <a:pPr marL="0" marR="0" lvl="0" indent="0" algn="l" defTabSz="914400" rtl="0" eaLnBrk="1" fontAlgn="auto" latinLnBrk="0" hangingPunct="1">
+                        <a:lnSpc>
+                          <a:spcPct val="100000"/>
+                        </a:lnSpc>
+                        <a:spcBef>
+                          <a:spcPts val="0"/>
+                        </a:spcBef>
+                        <a:spcAft>
+                          <a:spcPts val="0"/>
+                        </a:spcAft>
+                        <a:buClrTx/>
+                        <a:buSzTx/>
+                        <a:buFontTx/>
+                        <a:buNone/>
+                        <a:tabLst/>
+                        <a:defRPr/>
+                      </a:pPr>
+                      <a:r>
+                        <a:rPr lang="en-US" sz="1800" kern="1200" dirty="0">
+                          <a:solidFill>
+                            <a:schemeClr val="dk1"/>
+                          </a:solidFill>
+                          <a:effectLst/>
+                          <a:latin typeface="+mn-lt"/>
+                          <a:ea typeface="+mn-ea"/>
+                          <a:cs typeface="+mn-cs"/>
+                        </a:rPr>
+                        <a:t>Python, MongoDB / Hadoop, </a:t>
+                      </a:r>
+                      <a:r>
+                        <a:rPr lang="en-US" sz="1800" kern="1200" dirty="0" err="1">
+                          <a:solidFill>
+                            <a:schemeClr val="dk1"/>
+                          </a:solidFill>
+                          <a:effectLst/>
+                          <a:latin typeface="+mn-lt"/>
+                          <a:ea typeface="+mn-ea"/>
+                          <a:cs typeface="+mn-cs"/>
+                        </a:rPr>
+                        <a:t>Jupyter</a:t>
+                      </a:r>
+                      <a:r>
+                        <a:rPr lang="en-US" sz="1800" kern="1200" dirty="0">
+                          <a:solidFill>
+                            <a:schemeClr val="dk1"/>
+                          </a:solidFill>
+                          <a:effectLst/>
+                          <a:latin typeface="+mn-lt"/>
+                          <a:ea typeface="+mn-ea"/>
+                          <a:cs typeface="+mn-cs"/>
+                        </a:rPr>
+                        <a:t> Notebook, Time series analysis, Classification analysis, Natural language processing</a:t>
+                      </a:r>
+                    </a:p>
+                    <a:p>
+                      <a:endParaRPr lang="en-US" dirty="0"/>
+                    </a:p>
+                  </a:txBody>
+                  <a:tcPr anchor="ctr"/>
+                </a:tc>
+                <a:extLst>
+                  <a:ext uri="{0D108BD9-81ED-4DB2-BD59-A6C34878D82A}">
+                    <a16:rowId xmlns:a16="http://schemas.microsoft.com/office/drawing/2014/main" val="3756285181"/>
+                  </a:ext>
+                </a:extLst>
+              </a:tr>
+              <a:tr h="370840">
+                <a:tc>
+                  <a:txBody>
+                    <a:bodyPr/>
+                    <a:lstStyle/>
+                    <a:p>
+                      <a:r>
+                        <a:rPr lang="en-US" b="1" dirty="0"/>
+                        <a:t>IST-736</a:t>
+                      </a:r>
+                    </a:p>
+                    <a:p>
+                      <a:r>
+                        <a:rPr lang="en-US" dirty="0"/>
+                        <a:t>Text Mining</a:t>
+                      </a:r>
+                    </a:p>
+                  </a:txBody>
+                  <a:tcPr anchor="ctr"/>
+                </a:tc>
+                <a:tc>
+                  <a:txBody>
+                    <a:bodyPr/>
+                    <a:lstStyle/>
+                    <a:p>
+                      <a:r>
+                        <a:rPr lang="en-US" dirty="0"/>
+                        <a:t>Stock Market Sentiment Analysis</a:t>
+                      </a:r>
+                    </a:p>
+                  </a:txBody>
+                  <a:tcPr anchor="ctr"/>
+                </a:tc>
+                <a:tc>
+                  <a:txBody>
+                    <a:bodyPr/>
+                    <a:lstStyle/>
+                    <a:p>
+                      <a:pPr marL="0" marR="0" lvl="0" indent="0" algn="l" defTabSz="914400" rtl="0" eaLnBrk="1" fontAlgn="auto" latinLnBrk="0" hangingPunct="1">
+                        <a:lnSpc>
+                          <a:spcPct val="100000"/>
+                        </a:lnSpc>
+                        <a:spcBef>
+                          <a:spcPts val="0"/>
+                        </a:spcBef>
+                        <a:spcAft>
+                          <a:spcPts val="0"/>
+                        </a:spcAft>
+                        <a:buClrTx/>
+                        <a:buSzTx/>
+                        <a:buFontTx/>
+                        <a:buNone/>
+                        <a:tabLst/>
+                        <a:defRPr/>
+                      </a:pPr>
+                      <a:r>
+                        <a:rPr lang="en-US" sz="1800" kern="1200" dirty="0">
+                          <a:solidFill>
+                            <a:schemeClr val="dk1"/>
+                          </a:solidFill>
+                          <a:effectLst/>
+                          <a:latin typeface="+mn-lt"/>
+                          <a:ea typeface="+mn-ea"/>
+                          <a:cs typeface="+mn-cs"/>
+                        </a:rPr>
+                        <a:t>Topic modeling, Sentiment analysis, Time series analysis, Classification analysis, Signal analysis, Data mining, AWS, </a:t>
+                      </a:r>
+                      <a:r>
+                        <a:rPr lang="en-US" sz="1800" kern="1200" dirty="0" err="1">
+                          <a:solidFill>
+                            <a:schemeClr val="dk1"/>
+                          </a:solidFill>
+                          <a:effectLst/>
+                          <a:latin typeface="+mn-lt"/>
+                          <a:ea typeface="+mn-ea"/>
+                          <a:cs typeface="+mn-cs"/>
+                        </a:rPr>
+                        <a:t>Jupyter</a:t>
+                      </a:r>
+                      <a:r>
+                        <a:rPr lang="en-US" sz="1800" kern="1200" dirty="0">
+                          <a:solidFill>
+                            <a:schemeClr val="dk1"/>
+                          </a:solidFill>
+                          <a:effectLst/>
+                          <a:latin typeface="+mn-lt"/>
+                          <a:ea typeface="+mn-ea"/>
+                          <a:cs typeface="+mn-cs"/>
+                        </a:rPr>
+                        <a:t> Notebook</a:t>
+                      </a:r>
+                    </a:p>
+                    <a:p>
+                      <a:endParaRPr lang="en-US" dirty="0"/>
+                    </a:p>
+                  </a:txBody>
+                  <a:tcPr anchor="ctr"/>
+                </a:tc>
+                <a:extLst>
+                  <a:ext uri="{0D108BD9-81ED-4DB2-BD59-A6C34878D82A}">
+                    <a16:rowId xmlns:a16="http://schemas.microsoft.com/office/drawing/2014/main" val="757342613"/>
+                  </a:ext>
+                </a:extLst>
+              </a:tr>
+            </a:tbl>
+          </a:graphicData>
+        </a:graphic>
+      </p:graphicFrame>
+    </p:spTree>
+    <p:extLst>
+      <p:ext uri="{BB962C8B-B14F-4D97-AF65-F5344CB8AC3E}">
+        <p14:creationId xmlns:p14="http://schemas.microsoft.com/office/powerpoint/2010/main" val="1224665373"/>
+      </p:ext>
+    </p:extLst>
+  </p:cSld>
+  <p:clrMapOvr>
+    <a:masterClrMapping/>
+  </p:clrMapOvr>
+</p:sld>
+</file>
+
+<file path=ppt/slides/slide5.xml><?xml version="1.0" encoding="utf-8"?>
+<p:sld xmlns:a="http://schemas.openxmlformats.org/drawingml/2006/main" xmlns:r="http://schemas.openxmlformats.org/officeDocument/2006/relationships" xmlns:p="http://schemas.openxmlformats.org/presentationml/2006/main">
+  <p:cSld>
     <p:bg>
       <p:bgPr>
         <a:blipFill dpi="0" rotWithShape="1">
@@ -13704,7 +14142,7 @@
 </p:sld>
 </file>
 
-<file path=ppt/slides/slide5.xml><?xml version="1.0" encoding="utf-8"?>
+<file path=ppt/slides/slide6.xml><?xml version="1.0" encoding="utf-8"?>
 <p:sld xmlns:a="http://schemas.openxmlformats.org/drawingml/2006/main" xmlns:r="http://schemas.openxmlformats.org/officeDocument/2006/relationships" xmlns:p="http://schemas.openxmlformats.org/presentationml/2006/main">
   <p:cSld>
     <p:bg>
@@ -13809,7 +14247,7 @@
 </p:sld>
 </file>
 
-<file path=ppt/slides/slide6.xml><?xml version="1.0" encoding="utf-8"?>
+<file path=ppt/slides/slide7.xml><?xml version="1.0" encoding="utf-8"?>
 <p:sld xmlns:a="http://schemas.openxmlformats.org/drawingml/2006/main" xmlns:r="http://schemas.openxmlformats.org/officeDocument/2006/relationships" xmlns:p="http://schemas.openxmlformats.org/presentationml/2006/main">
   <p:cSld>
     <p:bg>
@@ -13925,7 +14363,7 @@
 </p:sld>
 </file>
 
-<file path=ppt/slides/slide7.xml><?xml version="1.0" encoding="utf-8"?>
+<file path=ppt/slides/slide8.xml><?xml version="1.0" encoding="utf-8"?>
 <p:sld xmlns:a="http://schemas.openxmlformats.org/drawingml/2006/main" xmlns:r="http://schemas.openxmlformats.org/officeDocument/2006/relationships" xmlns:p="http://schemas.openxmlformats.org/presentationml/2006/main">
   <p:cSld>
     <p:bg>

</xml_diff>

<commit_message>
#12: presentation.pptx, add footer
</commit_message>
<xml_diff>
--- a/presentation.pptx
+++ b/presentation.pptx
@@ -727,7 +727,7 @@
             </a:lvl1pPr>
           </a:lstStyle>
           <a:p>
-            <a:fld id="{C557799C-6D6E-E24F-86E4-FFFEFC20BDAE}" type="datetimeFigureOut">
+            <a:fld id="{4C0F8E7E-8FDB-B549-8056-A04941168DE5}" type="datetime1">
               <a:rPr lang="en-US" smtClean="0"/>
               <a:t>6/4/23</a:t>
             </a:fld>
@@ -763,7 +763,10 @@
             </a:lvl1pPr>
           </a:lstStyle>
           <a:p>
-            <a:endParaRPr lang="en-US"/>
+            <a:r>
+              <a:rPr lang="en-US"/>
+              <a:t>Syracuse University | School of Information Studies | Jeff Levesque</a:t>
+            </a:r>
           </a:p>
         </p:txBody>
       </p:sp>
@@ -1057,7 +1060,7 @@
           <a:bodyPr/>
           <a:lstStyle/>
           <a:p>
-            <a:fld id="{C557799C-6D6E-E24F-86E4-FFFEFC20BDAE}" type="datetimeFigureOut">
+            <a:fld id="{93FC931D-73A6-6549-AECD-508B6863E870}" type="datetime1">
               <a:rPr lang="en-US" smtClean="0"/>
               <a:t>6/4/23</a:t>
             </a:fld>
@@ -1080,7 +1083,10 @@
           <a:bodyPr/>
           <a:lstStyle/>
           <a:p>
-            <a:endParaRPr lang="en-US"/>
+            <a:r>
+              <a:rPr lang="en-US"/>
+              <a:t>Syracuse University | School of Information Studies | Jeff Levesque</a:t>
+            </a:r>
           </a:p>
         </p:txBody>
       </p:sp>
@@ -1237,7 +1243,7 @@
           <a:bodyPr/>
           <a:lstStyle/>
           <a:p>
-            <a:fld id="{C557799C-6D6E-E24F-86E4-FFFEFC20BDAE}" type="datetimeFigureOut">
+            <a:fld id="{D4D6324E-F43B-4D4C-9F90-59649D35F5F9}" type="datetime1">
               <a:rPr lang="en-US" smtClean="0"/>
               <a:t>6/4/23</a:t>
             </a:fld>
@@ -1260,7 +1266,10 @@
           <a:bodyPr/>
           <a:lstStyle/>
           <a:p>
-            <a:endParaRPr lang="en-US"/>
+            <a:r>
+              <a:rPr lang="en-US"/>
+              <a:t>Syracuse University | School of Information Studies | Jeff Levesque</a:t>
+            </a:r>
           </a:p>
         </p:txBody>
       </p:sp>
@@ -9974,7 +9983,7 @@
             </a:lvl1pPr>
           </a:lstStyle>
           <a:p>
-            <a:fld id="{CC4E5189-0973-4C0E-85EF-9CF74FA863BB}" type="datetime1">
+            <a:fld id="{DD2EA2E9-013E-AB47-BC97-17F51FA22B3A}" type="datetime1">
               <a:rPr lang="en-US" smtClean="0"/>
               <a:t>6/4/23</a:t>
             </a:fld>
@@ -9999,7 +10008,7 @@
           <a:p>
             <a:r>
               <a:rPr lang="en-US"/>
-              <a:t>School of Information Studies | Syracuse University</a:t>
+              <a:t>Syracuse University | School of Information Studies | Jeff Levesque</a:t>
             </a:r>
             <a:endParaRPr lang="en-US" dirty="0"/>
           </a:p>
@@ -10289,7 +10298,7 @@
           <a:bodyPr/>
           <a:lstStyle/>
           <a:p>
-            <a:fld id="{C557799C-6D6E-E24F-86E4-FFFEFC20BDAE}" type="datetimeFigureOut">
+            <a:fld id="{F6112C6D-CE56-CF4A-8DBF-C76F7E8E495B}" type="datetime1">
               <a:rPr lang="en-US" smtClean="0"/>
               <a:t>6/4/23</a:t>
             </a:fld>
@@ -10312,7 +10321,10 @@
           <a:bodyPr/>
           <a:lstStyle/>
           <a:p>
-            <a:endParaRPr lang="en-US"/>
+            <a:r>
+              <a:rPr lang="en-US"/>
+              <a:t>Syracuse University | School of Information Studies | Jeff Levesque</a:t>
+            </a:r>
           </a:p>
         </p:txBody>
       </p:sp>
@@ -10566,7 +10578,7 @@
             </a:lvl1pPr>
           </a:lstStyle>
           <a:p>
-            <a:fld id="{C557799C-6D6E-E24F-86E4-FFFEFC20BDAE}" type="datetimeFigureOut">
+            <a:fld id="{9AAAA8A4-4C96-BE4F-9E1C-428080E0BACC}" type="datetime1">
               <a:rPr lang="en-US" smtClean="0"/>
               <a:t>6/4/23</a:t>
             </a:fld>
@@ -10602,7 +10614,10 @@
             </a:lvl1pPr>
           </a:lstStyle>
           <a:p>
-            <a:endParaRPr lang="en-US"/>
+            <a:r>
+              <a:rPr lang="en-US"/>
+              <a:t>Syracuse University | School of Information Studies | Jeff Levesque</a:t>
+            </a:r>
           </a:p>
         </p:txBody>
       </p:sp>
@@ -10960,7 +10975,7 @@
           <a:bodyPr/>
           <a:lstStyle/>
           <a:p>
-            <a:fld id="{C557799C-6D6E-E24F-86E4-FFFEFC20BDAE}" type="datetimeFigureOut">
+            <a:fld id="{E04A41D6-B07E-DC49-A486-FDA2D13C35BC}" type="datetime1">
               <a:rPr lang="en-US" smtClean="0"/>
               <a:t>6/4/23</a:t>
             </a:fld>
@@ -10983,7 +10998,10 @@
           <a:bodyPr/>
           <a:lstStyle/>
           <a:p>
-            <a:endParaRPr lang="en-US"/>
+            <a:r>
+              <a:rPr lang="en-US"/>
+              <a:t>Syracuse University | School of Information Studies | Jeff Levesque</a:t>
+            </a:r>
           </a:p>
         </p:txBody>
       </p:sp>
@@ -11437,7 +11455,7 @@
           <a:bodyPr/>
           <a:lstStyle/>
           <a:p>
-            <a:fld id="{C557799C-6D6E-E24F-86E4-FFFEFC20BDAE}" type="datetimeFigureOut">
+            <a:fld id="{C077E067-47F5-044A-8A13-F879DBD075BC}" type="datetime1">
               <a:rPr lang="en-US" smtClean="0"/>
               <a:t>6/4/23</a:t>
             </a:fld>
@@ -11460,7 +11478,10 @@
           <a:bodyPr/>
           <a:lstStyle/>
           <a:p>
-            <a:endParaRPr lang="en-US"/>
+            <a:r>
+              <a:rPr lang="en-US"/>
+              <a:t>Syracuse University | School of Information Studies | Jeff Levesque</a:t>
+            </a:r>
           </a:p>
         </p:txBody>
       </p:sp>
@@ -11555,7 +11576,7 @@
           <a:bodyPr/>
           <a:lstStyle/>
           <a:p>
-            <a:fld id="{C557799C-6D6E-E24F-86E4-FFFEFC20BDAE}" type="datetimeFigureOut">
+            <a:fld id="{1E07AD2F-1130-B14F-A37D-7190EB120BD6}" type="datetime1">
               <a:rPr lang="en-US" smtClean="0"/>
               <a:t>6/4/23</a:t>
             </a:fld>
@@ -11578,7 +11599,10 @@
           <a:bodyPr/>
           <a:lstStyle/>
           <a:p>
-            <a:endParaRPr lang="en-US"/>
+            <a:r>
+              <a:rPr lang="en-US"/>
+              <a:t>Syracuse University | School of Information Studies | Jeff Levesque</a:t>
+            </a:r>
           </a:p>
         </p:txBody>
       </p:sp>
@@ -11650,7 +11674,7 @@
           <a:bodyPr/>
           <a:lstStyle/>
           <a:p>
-            <a:fld id="{C557799C-6D6E-E24F-86E4-FFFEFC20BDAE}" type="datetimeFigureOut">
+            <a:fld id="{8B6E3F15-160B-A24A-A518-90DC0291861B}" type="datetime1">
               <a:rPr lang="en-US" smtClean="0"/>
               <a:t>6/4/23</a:t>
             </a:fld>
@@ -11673,7 +11697,10 @@
           <a:bodyPr/>
           <a:lstStyle/>
           <a:p>
-            <a:endParaRPr lang="en-US"/>
+            <a:r>
+              <a:rPr lang="en-US"/>
+              <a:t>Syracuse University | School of Information Studies | Jeff Levesque</a:t>
+            </a:r>
           </a:p>
         </p:txBody>
       </p:sp>
@@ -11996,7 +12023,7 @@
             </a:lvl1pPr>
           </a:lstStyle>
           <a:p>
-            <a:fld id="{C557799C-6D6E-E24F-86E4-FFFEFC20BDAE}" type="datetimeFigureOut">
+            <a:fld id="{85E6799D-CE10-4745-88A9-6A33FD6561D9}" type="datetime1">
               <a:rPr lang="en-US" smtClean="0"/>
               <a:t>6/4/23</a:t>
             </a:fld>
@@ -12032,7 +12059,10 @@
             </a:lvl1pPr>
           </a:lstStyle>
           <a:p>
-            <a:endParaRPr lang="en-US"/>
+            <a:r>
+              <a:rPr lang="en-US"/>
+              <a:t>Syracuse University | School of Information Studies | Jeff Levesque</a:t>
+            </a:r>
           </a:p>
         </p:txBody>
       </p:sp>
@@ -12384,7 +12414,7 @@
             </a:lvl1pPr>
           </a:lstStyle>
           <a:p>
-            <a:fld id="{C557799C-6D6E-E24F-86E4-FFFEFC20BDAE}" type="datetimeFigureOut">
+            <a:fld id="{5613AE25-CE86-1346-9A31-2A2AF6C844B6}" type="datetime1">
               <a:rPr lang="en-US" smtClean="0"/>
               <a:t>6/4/23</a:t>
             </a:fld>
@@ -12420,7 +12450,10 @@
             </a:lvl1pPr>
           </a:lstStyle>
           <a:p>
-            <a:endParaRPr lang="en-US"/>
+            <a:r>
+              <a:rPr lang="en-US"/>
+              <a:t>Syracuse University | School of Information Studies | Jeff Levesque</a:t>
+            </a:r>
           </a:p>
         </p:txBody>
       </p:sp>
@@ -12662,7 +12695,7 @@
             </a:lvl1pPr>
           </a:lstStyle>
           <a:p>
-            <a:fld id="{C557799C-6D6E-E24F-86E4-FFFEFC20BDAE}" type="datetimeFigureOut">
+            <a:fld id="{20B9501A-05B8-B740-B11A-B913FF0EE626}" type="datetime1">
               <a:rPr lang="en-US" smtClean="0"/>
               <a:t>6/4/23</a:t>
             </a:fld>
@@ -12701,7 +12734,10 @@
             </a:lvl1pPr>
           </a:lstStyle>
           <a:p>
-            <a:endParaRPr lang="en-US"/>
+            <a:r>
+              <a:rPr lang="en-US"/>
+              <a:t>Syracuse University | School of Information Studies | Jeff Levesque</a:t>
+            </a:r>
           </a:p>
         </p:txBody>
       </p:sp>
@@ -12804,6 +12840,7 @@
     <p:sldLayoutId id="2147483737" r:id="rId11"/>
     <p:sldLayoutId id="2147483738" r:id="rId12"/>
   </p:sldLayoutIdLst>
+  <p:hf hdr="0" dt="0"/>
   <p:txStyles>
     <p:titleStyle>
       <a:lvl1pPr algn="l" defTabSz="914400" rtl="0" eaLnBrk="1" latinLnBrk="0" hangingPunct="1">
@@ -13187,12 +13224,7 @@
             <p:ph type="ctrTitle"/>
           </p:nvPr>
         </p:nvSpPr>
-        <p:spPr>
-          <a:xfrm>
-            <a:off x="1200200" y="5051117"/>
-            <a:ext cx="7011843" cy="1264594"/>
-          </a:xfrm>
-        </p:spPr>
+        <p:spPr/>
         <p:txBody>
           <a:bodyPr>
             <a:noAutofit/>
@@ -13271,9 +13303,7 @@
             </a:extLst>
           </a:blip>
           <a:srcRect t="21811" b="21811"/>
-          <a:stretch>
-            <a:fillRect/>
-          </a:stretch>
+          <a:stretch/>
         </p:blipFill>
         <p:spPr bwMode="auto">
           <a:prstGeom prst="rect">
@@ -13412,6 +13442,64 @@
               <a:t>Showcase coursework that demonstrate learning achievements</a:t>
             </a:r>
             <a:endParaRPr lang="en-US" dirty="0"/>
+          </a:p>
+        </p:txBody>
+      </p:sp>
+      <p:sp>
+        <p:nvSpPr>
+          <p:cNvPr id="5" name="Footer Placeholder 4">
+            <a:extLst>
+              <a:ext uri="{FF2B5EF4-FFF2-40B4-BE49-F238E27FC236}">
+                <a16:creationId xmlns:a16="http://schemas.microsoft.com/office/drawing/2014/main" id="{328241FD-DC00-71DF-ED0E-CDDA78FB8BF5}"/>
+              </a:ext>
+            </a:extLst>
+          </p:cNvPr>
+          <p:cNvSpPr>
+            <a:spLocks noGrp="1"/>
+          </p:cNvSpPr>
+          <p:nvPr>
+            <p:ph type="ftr" sz="quarter" idx="11"/>
+          </p:nvPr>
+        </p:nvSpPr>
+        <p:spPr/>
+        <p:txBody>
+          <a:bodyPr/>
+          <a:lstStyle/>
+          <a:p>
+            <a:r>
+              <a:rPr lang="en-US"/>
+              <a:t>Syracuse University | School of Information Studies | Jeff Levesque</a:t>
+            </a:r>
+            <a:endParaRPr lang="en-US" dirty="0"/>
+          </a:p>
+        </p:txBody>
+      </p:sp>
+      <p:sp>
+        <p:nvSpPr>
+          <p:cNvPr id="6" name="Slide Number Placeholder 5">
+            <a:extLst>
+              <a:ext uri="{FF2B5EF4-FFF2-40B4-BE49-F238E27FC236}">
+                <a16:creationId xmlns:a16="http://schemas.microsoft.com/office/drawing/2014/main" id="{765E6F41-3E43-51AC-5D97-39FC9778EB5E}"/>
+              </a:ext>
+            </a:extLst>
+          </p:cNvPr>
+          <p:cNvSpPr>
+            <a:spLocks noGrp="1"/>
+          </p:cNvSpPr>
+          <p:nvPr>
+            <p:ph type="sldNum" sz="quarter" idx="12"/>
+          </p:nvPr>
+        </p:nvSpPr>
+        <p:spPr/>
+        <p:txBody>
+          <a:bodyPr/>
+          <a:lstStyle/>
+          <a:p>
+            <a:fld id="{853C539F-E86C-6741-9E08-043B79C1FE47}" type="slidenum">
+              <a:rPr lang="en-US" smtClean="0"/>
+              <a:t>2</a:t>
+            </a:fld>
+            <a:endParaRPr lang="en-US"/>
           </a:p>
         </p:txBody>
       </p:sp>
@@ -13571,6 +13659,63 @@
                 <a:latin typeface="ArialMT"/>
               </a:rPr>
               <a:t>Apply ethics in the development, use and evaluation of data and predictive models (e.g., fairness, bias, transparency, privacy) </a:t>
+            </a:r>
+          </a:p>
+        </p:txBody>
+      </p:sp>
+      <p:sp>
+        <p:nvSpPr>
+          <p:cNvPr id="7" name="Slide Number Placeholder 6">
+            <a:extLst>
+              <a:ext uri="{FF2B5EF4-FFF2-40B4-BE49-F238E27FC236}">
+                <a16:creationId xmlns:a16="http://schemas.microsoft.com/office/drawing/2014/main" id="{6A09675A-DBDD-3BA6-B7FC-E9FB25AA1694}"/>
+              </a:ext>
+            </a:extLst>
+          </p:cNvPr>
+          <p:cNvSpPr>
+            <a:spLocks noGrp="1"/>
+          </p:cNvSpPr>
+          <p:nvPr>
+            <p:ph type="sldNum" sz="quarter" idx="12"/>
+          </p:nvPr>
+        </p:nvSpPr>
+        <p:spPr/>
+        <p:txBody>
+          <a:bodyPr/>
+          <a:lstStyle/>
+          <a:p>
+            <a:fld id="{853C539F-E86C-6741-9E08-043B79C1FE47}" type="slidenum">
+              <a:rPr lang="en-US" smtClean="0"/>
+              <a:t>3</a:t>
+            </a:fld>
+            <a:endParaRPr lang="en-US"/>
+          </a:p>
+        </p:txBody>
+      </p:sp>
+      <p:sp>
+        <p:nvSpPr>
+          <p:cNvPr id="8" name="Footer Placeholder 7">
+            <a:extLst>
+              <a:ext uri="{FF2B5EF4-FFF2-40B4-BE49-F238E27FC236}">
+                <a16:creationId xmlns:a16="http://schemas.microsoft.com/office/drawing/2014/main" id="{06035AC8-2D8A-51DC-6E2C-34E835C04C2C}"/>
+              </a:ext>
+            </a:extLst>
+          </p:cNvPr>
+          <p:cNvSpPr>
+            <a:spLocks noGrp="1"/>
+          </p:cNvSpPr>
+          <p:nvPr>
+            <p:ph type="ftr" sz="quarter" idx="11"/>
+          </p:nvPr>
+        </p:nvSpPr>
+        <p:spPr/>
+        <p:txBody>
+          <a:bodyPr/>
+          <a:lstStyle/>
+          <a:p>
+            <a:r>
+              <a:rPr lang="en-US"/>
+              <a:t>Syracuse University | School of Information Studies | Jeff Levesque</a:t>
             </a:r>
           </a:p>
         </p:txBody>
@@ -14013,6 +14158,63 @@
           </a:graphicData>
         </a:graphic>
       </p:graphicFrame>
+      <p:sp>
+        <p:nvSpPr>
+          <p:cNvPr id="8" name="Slide Number Placeholder 7">
+            <a:extLst>
+              <a:ext uri="{FF2B5EF4-FFF2-40B4-BE49-F238E27FC236}">
+                <a16:creationId xmlns:a16="http://schemas.microsoft.com/office/drawing/2014/main" id="{57C32524-27DE-BCB2-1BA9-2A4B3A978404}"/>
+              </a:ext>
+            </a:extLst>
+          </p:cNvPr>
+          <p:cNvSpPr>
+            <a:spLocks noGrp="1"/>
+          </p:cNvSpPr>
+          <p:nvPr>
+            <p:ph type="sldNum" sz="quarter" idx="12"/>
+          </p:nvPr>
+        </p:nvSpPr>
+        <p:spPr/>
+        <p:txBody>
+          <a:bodyPr/>
+          <a:lstStyle/>
+          <a:p>
+            <a:fld id="{853C539F-E86C-6741-9E08-043B79C1FE47}" type="slidenum">
+              <a:rPr lang="en-US" smtClean="0"/>
+              <a:t>4</a:t>
+            </a:fld>
+            <a:endParaRPr lang="en-US"/>
+          </a:p>
+        </p:txBody>
+      </p:sp>
+      <p:sp>
+        <p:nvSpPr>
+          <p:cNvPr id="11" name="Footer Placeholder 10">
+            <a:extLst>
+              <a:ext uri="{FF2B5EF4-FFF2-40B4-BE49-F238E27FC236}">
+                <a16:creationId xmlns:a16="http://schemas.microsoft.com/office/drawing/2014/main" id="{DA309D2D-BF96-A2FC-71AC-95490A016D46}"/>
+              </a:ext>
+            </a:extLst>
+          </p:cNvPr>
+          <p:cNvSpPr>
+            <a:spLocks noGrp="1"/>
+          </p:cNvSpPr>
+          <p:nvPr>
+            <p:ph type="ftr" sz="quarter" idx="11"/>
+          </p:nvPr>
+        </p:nvSpPr>
+        <p:spPr/>
+        <p:txBody>
+          <a:bodyPr/>
+          <a:lstStyle/>
+          <a:p>
+            <a:r>
+              <a:rPr lang="en-US"/>
+              <a:t>Syracuse University | School of Information Studies | Jeff Levesque</a:t>
+            </a:r>
+          </a:p>
+        </p:txBody>
+      </p:sp>
     </p:spTree>
     <p:extLst>
       <p:ext uri="{BB962C8B-B14F-4D97-AF65-F5344CB8AC3E}">
@@ -14129,6 +14331,63 @@
           </a:p>
         </p:txBody>
       </p:sp>
+      <p:sp>
+        <p:nvSpPr>
+          <p:cNvPr id="3" name="Footer Placeholder 2">
+            <a:extLst>
+              <a:ext uri="{FF2B5EF4-FFF2-40B4-BE49-F238E27FC236}">
+                <a16:creationId xmlns:a16="http://schemas.microsoft.com/office/drawing/2014/main" id="{03441EFE-5CFB-4CEE-8A26-0E82823F0687}"/>
+              </a:ext>
+            </a:extLst>
+          </p:cNvPr>
+          <p:cNvSpPr>
+            <a:spLocks noGrp="1"/>
+          </p:cNvSpPr>
+          <p:nvPr>
+            <p:ph type="ftr" sz="quarter" idx="11"/>
+          </p:nvPr>
+        </p:nvSpPr>
+        <p:spPr/>
+        <p:txBody>
+          <a:bodyPr/>
+          <a:lstStyle/>
+          <a:p>
+            <a:r>
+              <a:rPr lang="en-US"/>
+              <a:t>Syracuse University | School of Information Studies | Jeff Levesque</a:t>
+            </a:r>
+          </a:p>
+        </p:txBody>
+      </p:sp>
+      <p:sp>
+        <p:nvSpPr>
+          <p:cNvPr id="4" name="Slide Number Placeholder 3">
+            <a:extLst>
+              <a:ext uri="{FF2B5EF4-FFF2-40B4-BE49-F238E27FC236}">
+                <a16:creationId xmlns:a16="http://schemas.microsoft.com/office/drawing/2014/main" id="{A8D5BD4F-6314-A98A-9860-672FFC69C2E0}"/>
+              </a:ext>
+            </a:extLst>
+          </p:cNvPr>
+          <p:cNvSpPr>
+            <a:spLocks noGrp="1"/>
+          </p:cNvSpPr>
+          <p:nvPr>
+            <p:ph type="sldNum" sz="quarter" idx="12"/>
+          </p:nvPr>
+        </p:nvSpPr>
+        <p:spPr/>
+        <p:txBody>
+          <a:bodyPr/>
+          <a:lstStyle/>
+          <a:p>
+            <a:fld id="{853C539F-E86C-6741-9E08-043B79C1FE47}" type="slidenum">
+              <a:rPr lang="en-US" smtClean="0"/>
+              <a:t>5</a:t>
+            </a:fld>
+            <a:endParaRPr lang="en-US"/>
+          </a:p>
+        </p:txBody>
+      </p:sp>
     </p:spTree>
     <p:extLst>
       <p:ext uri="{BB962C8B-B14F-4D97-AF65-F5344CB8AC3E}">
@@ -14231,6 +14490,63 @@
               <a:rPr lang="en-US" dirty="0"/>
               <a:t>Ensembled Chatbot: classifiers with neural network</a:t>
             </a:r>
+          </a:p>
+        </p:txBody>
+      </p:sp>
+      <p:sp>
+        <p:nvSpPr>
+          <p:cNvPr id="4" name="Footer Placeholder 3">
+            <a:extLst>
+              <a:ext uri="{FF2B5EF4-FFF2-40B4-BE49-F238E27FC236}">
+                <a16:creationId xmlns:a16="http://schemas.microsoft.com/office/drawing/2014/main" id="{68E9089F-E539-6FB4-7AB9-48C44B1D1C05}"/>
+              </a:ext>
+            </a:extLst>
+          </p:cNvPr>
+          <p:cNvSpPr>
+            <a:spLocks noGrp="1"/>
+          </p:cNvSpPr>
+          <p:nvPr>
+            <p:ph type="ftr" sz="quarter" idx="11"/>
+          </p:nvPr>
+        </p:nvSpPr>
+        <p:spPr/>
+        <p:txBody>
+          <a:bodyPr/>
+          <a:lstStyle/>
+          <a:p>
+            <a:r>
+              <a:rPr lang="en-US"/>
+              <a:t>Syracuse University | School of Information Studies | Jeff Levesque</a:t>
+            </a:r>
+          </a:p>
+        </p:txBody>
+      </p:sp>
+      <p:sp>
+        <p:nvSpPr>
+          <p:cNvPr id="5" name="Slide Number Placeholder 4">
+            <a:extLst>
+              <a:ext uri="{FF2B5EF4-FFF2-40B4-BE49-F238E27FC236}">
+                <a16:creationId xmlns:a16="http://schemas.microsoft.com/office/drawing/2014/main" id="{5A24DB52-4754-4E19-F24F-49AC47526CB9}"/>
+              </a:ext>
+            </a:extLst>
+          </p:cNvPr>
+          <p:cNvSpPr>
+            <a:spLocks noGrp="1"/>
+          </p:cNvSpPr>
+          <p:nvPr>
+            <p:ph type="sldNum" sz="quarter" idx="12"/>
+          </p:nvPr>
+        </p:nvSpPr>
+        <p:spPr/>
+        <p:txBody>
+          <a:bodyPr/>
+          <a:lstStyle/>
+          <a:p>
+            <a:fld id="{853C539F-E86C-6741-9E08-043B79C1FE47}" type="slidenum">
+              <a:rPr lang="en-US" smtClean="0"/>
+              <a:t>6</a:t>
+            </a:fld>
+            <a:endParaRPr lang="en-US"/>
           </a:p>
         </p:txBody>
       </p:sp>
@@ -14350,6 +14666,63 @@
           </a:p>
         </p:txBody>
       </p:sp>
+      <p:sp>
+        <p:nvSpPr>
+          <p:cNvPr id="4" name="Footer Placeholder 3">
+            <a:extLst>
+              <a:ext uri="{FF2B5EF4-FFF2-40B4-BE49-F238E27FC236}">
+                <a16:creationId xmlns:a16="http://schemas.microsoft.com/office/drawing/2014/main" id="{148D5E4F-F673-B65E-FAC4-1DE438B84AB4}"/>
+              </a:ext>
+            </a:extLst>
+          </p:cNvPr>
+          <p:cNvSpPr>
+            <a:spLocks noGrp="1"/>
+          </p:cNvSpPr>
+          <p:nvPr>
+            <p:ph type="ftr" sz="quarter" idx="11"/>
+          </p:nvPr>
+        </p:nvSpPr>
+        <p:spPr/>
+        <p:txBody>
+          <a:bodyPr/>
+          <a:lstStyle/>
+          <a:p>
+            <a:r>
+              <a:rPr lang="en-US"/>
+              <a:t>Syracuse University | School of Information Studies | Jeff Levesque</a:t>
+            </a:r>
+          </a:p>
+        </p:txBody>
+      </p:sp>
+      <p:sp>
+        <p:nvSpPr>
+          <p:cNvPr id="5" name="Slide Number Placeholder 4">
+            <a:extLst>
+              <a:ext uri="{FF2B5EF4-FFF2-40B4-BE49-F238E27FC236}">
+                <a16:creationId xmlns:a16="http://schemas.microsoft.com/office/drawing/2014/main" id="{D83DE05B-874E-F723-C227-FF8655DBEA76}"/>
+              </a:ext>
+            </a:extLst>
+          </p:cNvPr>
+          <p:cNvSpPr>
+            <a:spLocks noGrp="1"/>
+          </p:cNvSpPr>
+          <p:nvPr>
+            <p:ph type="sldNum" sz="quarter" idx="12"/>
+          </p:nvPr>
+        </p:nvSpPr>
+        <p:spPr/>
+        <p:txBody>
+          <a:bodyPr/>
+          <a:lstStyle/>
+          <a:p>
+            <a:fld id="{853C539F-E86C-6741-9E08-043B79C1FE47}" type="slidenum">
+              <a:rPr lang="en-US" smtClean="0"/>
+              <a:t>7</a:t>
+            </a:fld>
+            <a:endParaRPr lang="en-US"/>
+          </a:p>
+        </p:txBody>
+      </p:sp>
     </p:spTree>
     <p:extLst>
       <p:ext uri="{BB962C8B-B14F-4D97-AF65-F5344CB8AC3E}">
@@ -14452,6 +14825,63 @@
               <a:rPr lang="en-US" dirty="0"/>
               <a:t>AWS Integration: streaming data</a:t>
             </a:r>
+          </a:p>
+        </p:txBody>
+      </p:sp>
+      <p:sp>
+        <p:nvSpPr>
+          <p:cNvPr id="4" name="Footer Placeholder 3">
+            <a:extLst>
+              <a:ext uri="{FF2B5EF4-FFF2-40B4-BE49-F238E27FC236}">
+                <a16:creationId xmlns:a16="http://schemas.microsoft.com/office/drawing/2014/main" id="{C28FA6F0-DDC9-871F-8FCA-886AA1E411A0}"/>
+              </a:ext>
+            </a:extLst>
+          </p:cNvPr>
+          <p:cNvSpPr>
+            <a:spLocks noGrp="1"/>
+          </p:cNvSpPr>
+          <p:nvPr>
+            <p:ph type="ftr" sz="quarter" idx="11"/>
+          </p:nvPr>
+        </p:nvSpPr>
+        <p:spPr/>
+        <p:txBody>
+          <a:bodyPr/>
+          <a:lstStyle/>
+          <a:p>
+            <a:r>
+              <a:rPr lang="en-US"/>
+              <a:t>Syracuse University | School of Information Studies | Jeff Levesque</a:t>
+            </a:r>
+          </a:p>
+        </p:txBody>
+      </p:sp>
+      <p:sp>
+        <p:nvSpPr>
+          <p:cNvPr id="5" name="Slide Number Placeholder 4">
+            <a:extLst>
+              <a:ext uri="{FF2B5EF4-FFF2-40B4-BE49-F238E27FC236}">
+                <a16:creationId xmlns:a16="http://schemas.microsoft.com/office/drawing/2014/main" id="{ABEDE7A4-9AA9-7DCB-3C32-03FA6D060154}"/>
+              </a:ext>
+            </a:extLst>
+          </p:cNvPr>
+          <p:cNvSpPr>
+            <a:spLocks noGrp="1"/>
+          </p:cNvSpPr>
+          <p:nvPr>
+            <p:ph type="sldNum" sz="quarter" idx="12"/>
+          </p:nvPr>
+        </p:nvSpPr>
+        <p:spPr/>
+        <p:txBody>
+          <a:bodyPr/>
+          <a:lstStyle/>
+          <a:p>
+            <a:fld id="{853C539F-E86C-6741-9E08-043B79C1FE47}" type="slidenum">
+              <a:rPr lang="en-US" smtClean="0"/>
+              <a:t>8</a:t>
+            </a:fld>
+            <a:endParaRPr lang="en-US"/>
           </a:p>
         </p:txBody>
       </p:sp>

</xml_diff>

<commit_message>
#12: presentation.pptx, minor style update
</commit_message>
<xml_diff>
--- a/presentation.pptx
+++ b/presentation.pptx
@@ -13436,12 +13436,19 @@
           <a:p>
             <a:r>
               <a:rPr lang="en-US" sz="1800" dirty="0">
+                <a:solidFill>
+                  <a:schemeClr val="accent1"/>
+                </a:solidFill>
                 <a:effectLst/>
                 <a:latin typeface="ArialMT"/>
               </a:rPr>
               <a:t>Showcase coursework that demonstrate learning achievements</a:t>
             </a:r>
-            <a:endParaRPr lang="en-US" dirty="0"/>
+            <a:endParaRPr lang="en-US" dirty="0">
+              <a:solidFill>
+                <a:schemeClr val="accent1"/>
+              </a:solidFill>
+            </a:endParaRPr>
           </a:p>
         </p:txBody>
       </p:sp>
@@ -14325,7 +14332,11 @@
           <a:lstStyle/>
           <a:p>
             <a:r>
-              <a:rPr lang="en-US" dirty="0"/>
+              <a:rPr lang="en-US" dirty="0">
+                <a:solidFill>
+                  <a:schemeClr val="accent1"/>
+                </a:solidFill>
+              </a:rPr>
               <a:t>Asset Analysis: visualization using Shiny Dashboard</a:t>
             </a:r>
           </a:p>
@@ -14487,7 +14498,11 @@
           <a:lstStyle/>
           <a:p>
             <a:r>
-              <a:rPr lang="en-US" dirty="0"/>
+              <a:rPr lang="en-US" dirty="0">
+                <a:solidFill>
+                  <a:schemeClr val="accent1"/>
+                </a:solidFill>
+              </a:rPr>
               <a:t>Ensembled Chatbot: classifiers with neural network</a:t>
             </a:r>
           </a:p>
@@ -14660,7 +14675,11 @@
           <a:lstStyle/>
           <a:p>
             <a:r>
-              <a:rPr lang="en-US" dirty="0"/>
+              <a:rPr lang="en-US" dirty="0">
+                <a:solidFill>
+                  <a:schemeClr val="accent1"/>
+                </a:solidFill>
+              </a:rPr>
               <a:t>Market Prediction: using sentiment analysis</a:t>
             </a:r>
           </a:p>
@@ -14822,7 +14841,11 @@
           <a:lstStyle/>
           <a:p>
             <a:r>
-              <a:rPr lang="en-US" dirty="0"/>
+              <a:rPr lang="en-US" dirty="0">
+                <a:solidFill>
+                  <a:schemeClr val="accent1"/>
+                </a:solidFill>
+              </a:rPr>
               <a:t>AWS Integration: streaming data</a:t>
             </a:r>
           </a:p>

</xml_diff>

<commit_message>
#12: presentation.pptx, add fin-654 slides
</commit_message>
<xml_diff>
--- a/presentation.pptx
+++ b/presentation.pptx
@@ -5,7 +5,7 @@
     <p:sldMasterId id="2147483726" r:id="rId1"/>
   </p:sldMasterIdLst>
   <p:notesMasterIdLst>
-    <p:notesMasterId r:id="rId10"/>
+    <p:notesMasterId r:id="rId13"/>
   </p:notesMasterIdLst>
   <p:sldIdLst>
     <p:sldId id="261" r:id="rId2"/>
@@ -13,9 +13,12 @@
     <p:sldId id="262" r:id="rId4"/>
     <p:sldId id="263" r:id="rId5"/>
     <p:sldId id="257" r:id="rId6"/>
-    <p:sldId id="258" r:id="rId7"/>
-    <p:sldId id="259" r:id="rId8"/>
-    <p:sldId id="260" r:id="rId9"/>
+    <p:sldId id="267" r:id="rId7"/>
+    <p:sldId id="265" r:id="rId8"/>
+    <p:sldId id="266" r:id="rId9"/>
+    <p:sldId id="258" r:id="rId10"/>
+    <p:sldId id="259" r:id="rId11"/>
+    <p:sldId id="260" r:id="rId12"/>
   </p:sldIdLst>
   <p:sldSz cx="12192000" cy="6858000"/>
   <p:notesSz cx="6858000" cy="9144000"/>
@@ -13334,6 +13337,349 @@
 </p:sld>
 </file>
 
+<file path=ppt/slides/slide10.xml><?xml version="1.0" encoding="utf-8"?>
+<p:sld xmlns:a="http://schemas.openxmlformats.org/drawingml/2006/main" xmlns:r="http://schemas.openxmlformats.org/officeDocument/2006/relationships" xmlns:p="http://schemas.openxmlformats.org/presentationml/2006/main">
+  <p:cSld>
+    <p:bg>
+      <p:bgPr>
+        <a:blipFill dpi="0" rotWithShape="1">
+          <a:blip r:embed="rId2">
+            <a:alphaModFix amt="29667"/>
+            <a:lum/>
+            <a:extLst>
+              <a:ext uri="{BEBA8EAE-BF5A-486C-A8C5-ECC9F3942E4B}">
+                <a14:imgProps xmlns:a14="http://schemas.microsoft.com/office/drawing/2010/main">
+                  <a14:imgLayer r:embed="rId3">
+                    <a14:imgEffect>
+                      <a14:artisticPencilGrayscale pencilSize="0"/>
+                    </a14:imgEffect>
+                  </a14:imgLayer>
+                </a14:imgProps>
+              </a:ext>
+            </a:extLst>
+          </a:blip>
+          <a:srcRect/>
+          <a:stretch>
+            <a:fillRect l="-3000" r="-3000"/>
+          </a:stretch>
+        </a:blipFill>
+        <a:effectLst/>
+      </p:bgPr>
+    </p:bg>
+    <p:spTree>
+      <p:nvGrpSpPr>
+        <p:cNvPr id="1" name=""/>
+        <p:cNvGrpSpPr/>
+        <p:nvPr/>
+      </p:nvGrpSpPr>
+      <p:grpSpPr>
+        <a:xfrm>
+          <a:off x="0" y="0"/>
+          <a:ext cx="0" cy="0"/>
+          <a:chOff x="0" y="0"/>
+          <a:chExt cx="0" cy="0"/>
+        </a:xfrm>
+      </p:grpSpPr>
+      <p:sp>
+        <p:nvSpPr>
+          <p:cNvPr id="7" name="Title 6">
+            <a:extLst>
+              <a:ext uri="{FF2B5EF4-FFF2-40B4-BE49-F238E27FC236}">
+                <a16:creationId xmlns:a16="http://schemas.microsoft.com/office/drawing/2014/main" id="{F276A244-89FD-5B81-7E4E-67067BB463F2}"/>
+              </a:ext>
+            </a:extLst>
+          </p:cNvPr>
+          <p:cNvSpPr>
+            <a:spLocks noGrp="1"/>
+          </p:cNvSpPr>
+          <p:nvPr>
+            <p:ph type="ctrTitle"/>
+          </p:nvPr>
+        </p:nvSpPr>
+        <p:spPr/>
+        <p:txBody>
+          <a:bodyPr/>
+          <a:lstStyle/>
+          <a:p>
+            <a:r>
+              <a:rPr lang="en-US" dirty="0">
+                <a:solidFill>
+                  <a:schemeClr val="tx1"/>
+                </a:solidFill>
+              </a:rPr>
+              <a:t>IST-736</a:t>
+            </a:r>
+          </a:p>
+        </p:txBody>
+      </p:sp>
+      <p:sp>
+        <p:nvSpPr>
+          <p:cNvPr id="2" name="Subtitle 1">
+            <a:extLst>
+              <a:ext uri="{FF2B5EF4-FFF2-40B4-BE49-F238E27FC236}">
+                <a16:creationId xmlns:a16="http://schemas.microsoft.com/office/drawing/2014/main" id="{E28A000C-5430-E51B-8330-70BE38363181}"/>
+              </a:ext>
+            </a:extLst>
+          </p:cNvPr>
+          <p:cNvSpPr>
+            <a:spLocks noGrp="1"/>
+          </p:cNvSpPr>
+          <p:nvPr>
+            <p:ph type="subTitle" idx="1"/>
+          </p:nvPr>
+        </p:nvSpPr>
+        <p:spPr/>
+        <p:txBody>
+          <a:bodyPr/>
+          <a:lstStyle/>
+          <a:p>
+            <a:r>
+              <a:rPr lang="en-US" dirty="0">
+                <a:solidFill>
+                  <a:schemeClr val="accent1"/>
+                </a:solidFill>
+              </a:rPr>
+              <a:t>Market Prediction: using sentiment analysis</a:t>
+            </a:r>
+          </a:p>
+        </p:txBody>
+      </p:sp>
+      <p:sp>
+        <p:nvSpPr>
+          <p:cNvPr id="4" name="Footer Placeholder 3">
+            <a:extLst>
+              <a:ext uri="{FF2B5EF4-FFF2-40B4-BE49-F238E27FC236}">
+                <a16:creationId xmlns:a16="http://schemas.microsoft.com/office/drawing/2014/main" id="{148D5E4F-F673-B65E-FAC4-1DE438B84AB4}"/>
+              </a:ext>
+            </a:extLst>
+          </p:cNvPr>
+          <p:cNvSpPr>
+            <a:spLocks noGrp="1"/>
+          </p:cNvSpPr>
+          <p:nvPr>
+            <p:ph type="ftr" sz="quarter" idx="11"/>
+          </p:nvPr>
+        </p:nvSpPr>
+        <p:spPr/>
+        <p:txBody>
+          <a:bodyPr/>
+          <a:lstStyle/>
+          <a:p>
+            <a:r>
+              <a:rPr lang="en-US"/>
+              <a:t>Syracuse University | School of Information Studies | Jeff Levesque</a:t>
+            </a:r>
+          </a:p>
+        </p:txBody>
+      </p:sp>
+      <p:sp>
+        <p:nvSpPr>
+          <p:cNvPr id="5" name="Slide Number Placeholder 4">
+            <a:extLst>
+              <a:ext uri="{FF2B5EF4-FFF2-40B4-BE49-F238E27FC236}">
+                <a16:creationId xmlns:a16="http://schemas.microsoft.com/office/drawing/2014/main" id="{D83DE05B-874E-F723-C227-FF8655DBEA76}"/>
+              </a:ext>
+            </a:extLst>
+          </p:cNvPr>
+          <p:cNvSpPr>
+            <a:spLocks noGrp="1"/>
+          </p:cNvSpPr>
+          <p:nvPr>
+            <p:ph type="sldNum" sz="quarter" idx="12"/>
+          </p:nvPr>
+        </p:nvSpPr>
+        <p:spPr/>
+        <p:txBody>
+          <a:bodyPr/>
+          <a:lstStyle/>
+          <a:p>
+            <a:fld id="{853C539F-E86C-6741-9E08-043B79C1FE47}" type="slidenum">
+              <a:rPr lang="en-US" smtClean="0"/>
+              <a:t>10</a:t>
+            </a:fld>
+            <a:endParaRPr lang="en-US"/>
+          </a:p>
+        </p:txBody>
+      </p:sp>
+    </p:spTree>
+    <p:extLst>
+      <p:ext uri="{BB962C8B-B14F-4D97-AF65-F5344CB8AC3E}">
+        <p14:creationId xmlns:p14="http://schemas.microsoft.com/office/powerpoint/2010/main" val="2568997217"/>
+      </p:ext>
+    </p:extLst>
+  </p:cSld>
+  <p:clrMapOvr>
+    <a:masterClrMapping/>
+  </p:clrMapOvr>
+</p:sld>
+</file>
+
+<file path=ppt/slides/slide11.xml><?xml version="1.0" encoding="utf-8"?>
+<p:sld xmlns:a="http://schemas.openxmlformats.org/drawingml/2006/main" xmlns:r="http://schemas.openxmlformats.org/officeDocument/2006/relationships" xmlns:p="http://schemas.openxmlformats.org/presentationml/2006/main">
+  <p:cSld>
+    <p:bg>
+      <p:bgPr>
+        <a:blipFill dpi="0" rotWithShape="1">
+          <a:blip r:embed="rId2">
+            <a:alphaModFix amt="15000"/>
+            <a:lum/>
+          </a:blip>
+          <a:srcRect/>
+          <a:stretch>
+            <a:fillRect l="-2000" r="-2000"/>
+          </a:stretch>
+        </a:blipFill>
+        <a:effectLst/>
+      </p:bgPr>
+    </p:bg>
+    <p:spTree>
+      <p:nvGrpSpPr>
+        <p:cNvPr id="1" name=""/>
+        <p:cNvGrpSpPr/>
+        <p:nvPr/>
+      </p:nvGrpSpPr>
+      <p:grpSpPr>
+        <a:xfrm>
+          <a:off x="0" y="0"/>
+          <a:ext cx="0" cy="0"/>
+          <a:chOff x="0" y="0"/>
+          <a:chExt cx="0" cy="0"/>
+        </a:xfrm>
+      </p:grpSpPr>
+      <p:sp>
+        <p:nvSpPr>
+          <p:cNvPr id="7" name="Title 6">
+            <a:extLst>
+              <a:ext uri="{FF2B5EF4-FFF2-40B4-BE49-F238E27FC236}">
+                <a16:creationId xmlns:a16="http://schemas.microsoft.com/office/drawing/2014/main" id="{F276A244-89FD-5B81-7E4E-67067BB463F2}"/>
+              </a:ext>
+            </a:extLst>
+          </p:cNvPr>
+          <p:cNvSpPr>
+            <a:spLocks noGrp="1"/>
+          </p:cNvSpPr>
+          <p:nvPr>
+            <p:ph type="ctrTitle"/>
+          </p:nvPr>
+        </p:nvSpPr>
+        <p:spPr/>
+        <p:txBody>
+          <a:bodyPr/>
+          <a:lstStyle/>
+          <a:p>
+            <a:r>
+              <a:rPr lang="en-US" dirty="0">
+                <a:solidFill>
+                  <a:schemeClr val="tx1"/>
+                </a:solidFill>
+              </a:rPr>
+              <a:t>Follow-up</a:t>
+            </a:r>
+          </a:p>
+        </p:txBody>
+      </p:sp>
+      <p:sp>
+        <p:nvSpPr>
+          <p:cNvPr id="2" name="Subtitle 1">
+            <a:extLst>
+              <a:ext uri="{FF2B5EF4-FFF2-40B4-BE49-F238E27FC236}">
+                <a16:creationId xmlns:a16="http://schemas.microsoft.com/office/drawing/2014/main" id="{E28A000C-5430-E51B-8330-70BE38363181}"/>
+              </a:ext>
+            </a:extLst>
+          </p:cNvPr>
+          <p:cNvSpPr>
+            <a:spLocks noGrp="1"/>
+          </p:cNvSpPr>
+          <p:nvPr>
+            <p:ph type="subTitle" idx="1"/>
+          </p:nvPr>
+        </p:nvSpPr>
+        <p:spPr/>
+        <p:txBody>
+          <a:bodyPr/>
+          <a:lstStyle/>
+          <a:p>
+            <a:r>
+              <a:rPr lang="en-US" dirty="0">
+                <a:solidFill>
+                  <a:schemeClr val="accent1"/>
+                </a:solidFill>
+              </a:rPr>
+              <a:t>AWS Integration: streaming data</a:t>
+            </a:r>
+          </a:p>
+        </p:txBody>
+      </p:sp>
+      <p:sp>
+        <p:nvSpPr>
+          <p:cNvPr id="4" name="Footer Placeholder 3">
+            <a:extLst>
+              <a:ext uri="{FF2B5EF4-FFF2-40B4-BE49-F238E27FC236}">
+                <a16:creationId xmlns:a16="http://schemas.microsoft.com/office/drawing/2014/main" id="{C28FA6F0-DDC9-871F-8FCA-886AA1E411A0}"/>
+              </a:ext>
+            </a:extLst>
+          </p:cNvPr>
+          <p:cNvSpPr>
+            <a:spLocks noGrp="1"/>
+          </p:cNvSpPr>
+          <p:nvPr>
+            <p:ph type="ftr" sz="quarter" idx="11"/>
+          </p:nvPr>
+        </p:nvSpPr>
+        <p:spPr/>
+        <p:txBody>
+          <a:bodyPr/>
+          <a:lstStyle/>
+          <a:p>
+            <a:r>
+              <a:rPr lang="en-US"/>
+              <a:t>Syracuse University | School of Information Studies | Jeff Levesque</a:t>
+            </a:r>
+          </a:p>
+        </p:txBody>
+      </p:sp>
+      <p:sp>
+        <p:nvSpPr>
+          <p:cNvPr id="5" name="Slide Number Placeholder 4">
+            <a:extLst>
+              <a:ext uri="{FF2B5EF4-FFF2-40B4-BE49-F238E27FC236}">
+                <a16:creationId xmlns:a16="http://schemas.microsoft.com/office/drawing/2014/main" id="{ABEDE7A4-9AA9-7DCB-3C32-03FA6D060154}"/>
+              </a:ext>
+            </a:extLst>
+          </p:cNvPr>
+          <p:cNvSpPr>
+            <a:spLocks noGrp="1"/>
+          </p:cNvSpPr>
+          <p:nvPr>
+            <p:ph type="sldNum" sz="quarter" idx="12"/>
+          </p:nvPr>
+        </p:nvSpPr>
+        <p:spPr/>
+        <p:txBody>
+          <a:bodyPr/>
+          <a:lstStyle/>
+          <a:p>
+            <a:fld id="{853C539F-E86C-6741-9E08-043B79C1FE47}" type="slidenum">
+              <a:rPr lang="en-US" smtClean="0"/>
+              <a:t>11</a:t>
+            </a:fld>
+            <a:endParaRPr lang="en-US"/>
+          </a:p>
+        </p:txBody>
+      </p:sp>
+    </p:spTree>
+    <p:extLst>
+      <p:ext uri="{BB962C8B-B14F-4D97-AF65-F5344CB8AC3E}">
+        <p14:creationId xmlns:p14="http://schemas.microsoft.com/office/powerpoint/2010/main" val="1305535365"/>
+      </p:ext>
+    </p:extLst>
+  </p:cSld>
+  <p:clrMapOvr>
+    <a:masterClrMapping/>
+  </p:clrMapOvr>
+</p:sld>
+</file>
+
 <file path=ppt/slides/slide2.xml><?xml version="1.0" encoding="utf-8"?>
 <p:sld xmlns:a="http://schemas.openxmlformats.org/drawingml/2006/main" xmlns:r="http://schemas.openxmlformats.org/officeDocument/2006/relationships" xmlns:p="http://schemas.openxmlformats.org/presentationml/2006/main">
   <p:cSld>
@@ -14415,6 +14761,979 @@
 <file path=ppt/slides/slide6.xml><?xml version="1.0" encoding="utf-8"?>
 <p:sld xmlns:a="http://schemas.openxmlformats.org/drawingml/2006/main" xmlns:r="http://schemas.openxmlformats.org/officeDocument/2006/relationships" xmlns:p="http://schemas.openxmlformats.org/presentationml/2006/main">
   <p:cSld>
+    <p:spTree>
+      <p:nvGrpSpPr>
+        <p:cNvPr id="1" name=""/>
+        <p:cNvGrpSpPr/>
+        <p:nvPr/>
+      </p:nvGrpSpPr>
+      <p:grpSpPr>
+        <a:xfrm>
+          <a:off x="0" y="0"/>
+          <a:ext cx="0" cy="0"/>
+          <a:chOff x="0" y="0"/>
+          <a:chExt cx="0" cy="0"/>
+        </a:xfrm>
+      </p:grpSpPr>
+      <p:sp>
+        <p:nvSpPr>
+          <p:cNvPr id="2" name="Title 1">
+            <a:extLst>
+              <a:ext uri="{FF2B5EF4-FFF2-40B4-BE49-F238E27FC236}">
+                <a16:creationId xmlns:a16="http://schemas.microsoft.com/office/drawing/2014/main" id="{0D387D4E-3858-5CF2-5D32-CC02DB355186}"/>
+              </a:ext>
+            </a:extLst>
+          </p:cNvPr>
+          <p:cNvSpPr>
+            <a:spLocks noGrp="1"/>
+          </p:cNvSpPr>
+          <p:nvPr>
+            <p:ph type="title"/>
+          </p:nvPr>
+        </p:nvSpPr>
+        <p:spPr/>
+        <p:txBody>
+          <a:bodyPr/>
+          <a:lstStyle/>
+          <a:p>
+            <a:r>
+              <a:rPr lang="en-US" dirty="0"/>
+              <a:t>Portfolio: Dataset</a:t>
+            </a:r>
+          </a:p>
+        </p:txBody>
+      </p:sp>
+      <p:sp>
+        <p:nvSpPr>
+          <p:cNvPr id="7" name="Text Placeholder 6">
+            <a:extLst>
+              <a:ext uri="{FF2B5EF4-FFF2-40B4-BE49-F238E27FC236}">
+                <a16:creationId xmlns:a16="http://schemas.microsoft.com/office/drawing/2014/main" id="{EC79C4E7-6CE9-9323-06A1-4AA009243133}"/>
+              </a:ext>
+            </a:extLst>
+          </p:cNvPr>
+          <p:cNvSpPr>
+            <a:spLocks noGrp="1"/>
+          </p:cNvSpPr>
+          <p:nvPr>
+            <p:ph type="body" idx="1"/>
+          </p:nvPr>
+        </p:nvSpPr>
+        <p:spPr/>
+        <p:txBody>
+          <a:bodyPr/>
+          <a:lstStyle/>
+          <a:p>
+            <a:r>
+              <a:rPr lang="en-US" dirty="0"/>
+              <a:t>Method</a:t>
+            </a:r>
+          </a:p>
+        </p:txBody>
+      </p:sp>
+      <p:sp>
+        <p:nvSpPr>
+          <p:cNvPr id="3" name="Content Placeholder 2">
+            <a:extLst>
+              <a:ext uri="{FF2B5EF4-FFF2-40B4-BE49-F238E27FC236}">
+                <a16:creationId xmlns:a16="http://schemas.microsoft.com/office/drawing/2014/main" id="{864FB755-A1E5-68E4-5EA8-DCA6EA044E0A}"/>
+              </a:ext>
+            </a:extLst>
+          </p:cNvPr>
+          <p:cNvSpPr>
+            <a:spLocks noGrp="1"/>
+          </p:cNvSpPr>
+          <p:nvPr>
+            <p:ph sz="half" idx="2"/>
+          </p:nvPr>
+        </p:nvSpPr>
+        <p:spPr/>
+        <p:txBody>
+          <a:bodyPr>
+            <a:normAutofit fontScale="92500" lnSpcReduction="20000"/>
+          </a:bodyPr>
+          <a:lstStyle/>
+          <a:p>
+            <a:pPr>
+              <a:buFont typeface="+mj-lt"/>
+              <a:buAutoNum type="arabicPeriod"/>
+            </a:pPr>
+            <a:r>
+              <a:rPr lang="en-US" sz="1800" dirty="0">
+                <a:effectLst/>
+                <a:latin typeface="Calibri" panose="020F0502020204030204" pitchFamily="34" charset="0"/>
+                <a:ea typeface="Calibri" panose="020F0502020204030204" pitchFamily="34" charset="0"/>
+                <a:cs typeface="Times New Roman" panose="02020603050405020304" pitchFamily="18" charset="0"/>
+              </a:rPr>
+              <a:t>World’s Biggest Data Breaches &amp; Hacks</a:t>
+            </a:r>
+            <a:endParaRPr lang="en-US" sz="1800" dirty="0">
+              <a:latin typeface="Calibri" panose="020F0502020204030204" pitchFamily="34" charset="0"/>
+              <a:ea typeface="Calibri" panose="020F0502020204030204" pitchFamily="34" charset="0"/>
+              <a:cs typeface="Times New Roman" panose="02020603050405020304" pitchFamily="18" charset="0"/>
+            </a:endParaRPr>
+          </a:p>
+          <a:p>
+            <a:pPr>
+              <a:buFont typeface="+mj-lt"/>
+              <a:buAutoNum type="arabicPeriod"/>
+            </a:pPr>
+            <a:r>
+              <a:rPr lang="en-US" sz="1800" dirty="0">
+                <a:effectLst/>
+                <a:latin typeface="Calibri" panose="020F0502020204030204" pitchFamily="34" charset="0"/>
+                <a:ea typeface="Calibri" panose="020F0502020204030204" pitchFamily="34" charset="0"/>
+                <a:cs typeface="Times New Roman" panose="02020603050405020304" pitchFamily="18" charset="0"/>
+              </a:rPr>
+              <a:t>Privacy Rights Clearinghouse</a:t>
+            </a:r>
+          </a:p>
+          <a:p>
+            <a:pPr>
+              <a:buFont typeface="+mj-lt"/>
+              <a:buAutoNum type="arabicPeriod"/>
+            </a:pPr>
+            <a:endParaRPr lang="en-US" sz="1800" dirty="0">
+              <a:latin typeface="Calibri" panose="020F0502020204030204" pitchFamily="34" charset="0"/>
+              <a:cs typeface="Times New Roman" panose="02020603050405020304" pitchFamily="18" charset="0"/>
+            </a:endParaRPr>
+          </a:p>
+          <a:p>
+            <a:pPr marL="0" indent="0">
+              <a:buNone/>
+            </a:pPr>
+            <a:r>
+              <a:rPr lang="en-US" sz="1800" dirty="0">
+                <a:effectLst/>
+                <a:latin typeface="Calibri" panose="020F0502020204030204" pitchFamily="34" charset="0"/>
+                <a:ea typeface="Calibri" panose="020F0502020204030204" pitchFamily="34" charset="0"/>
+                <a:cs typeface="Times New Roman" panose="02020603050405020304" pitchFamily="18" charset="0"/>
+              </a:rPr>
+              <a:t>The two datasets were merged into a </a:t>
+            </a:r>
+            <a:r>
+              <a:rPr lang="en-US" sz="1800" dirty="0" err="1">
+                <a:effectLst/>
+                <a:latin typeface="Calibri" panose="020F0502020204030204" pitchFamily="34" charset="0"/>
+                <a:ea typeface="Calibri" panose="020F0502020204030204" pitchFamily="34" charset="0"/>
+                <a:cs typeface="Times New Roman" panose="02020603050405020304" pitchFamily="18" charset="0"/>
+              </a:rPr>
+              <a:t>dataframe</a:t>
+            </a:r>
+            <a:r>
+              <a:rPr lang="en-US" sz="1800" dirty="0">
+                <a:effectLst/>
+                <a:latin typeface="Calibri" panose="020F0502020204030204" pitchFamily="34" charset="0"/>
+                <a:ea typeface="Calibri" panose="020F0502020204030204" pitchFamily="34" charset="0"/>
+                <a:cs typeface="Times New Roman" panose="02020603050405020304" pitchFamily="18" charset="0"/>
+              </a:rPr>
+              <a:t> in python, then inner joined with a list of stock ticker symbols obtained using the </a:t>
+            </a:r>
+            <a:r>
+              <a:rPr lang="en-US" sz="1800" dirty="0" err="1">
+                <a:effectLst/>
+                <a:latin typeface="Calibri" panose="020F0502020204030204" pitchFamily="34" charset="0"/>
+                <a:ea typeface="Calibri" panose="020F0502020204030204" pitchFamily="34" charset="0"/>
+                <a:cs typeface="Times New Roman" panose="02020603050405020304" pitchFamily="18" charset="0"/>
+              </a:rPr>
+              <a:t>quandl</a:t>
+            </a:r>
+            <a:r>
+              <a:rPr lang="en-US" sz="1800" dirty="0">
+                <a:effectLst/>
+                <a:latin typeface="Calibri" panose="020F0502020204030204" pitchFamily="34" charset="0"/>
+                <a:ea typeface="Calibri" panose="020F0502020204030204" pitchFamily="34" charset="0"/>
+                <a:cs typeface="Times New Roman" panose="02020603050405020304" pitchFamily="18" charset="0"/>
+              </a:rPr>
+              <a:t> API</a:t>
+            </a:r>
+            <a:endParaRPr lang="en-US" dirty="0"/>
+          </a:p>
+        </p:txBody>
+      </p:sp>
+      <p:sp>
+        <p:nvSpPr>
+          <p:cNvPr id="8" name="Text Placeholder 7">
+            <a:extLst>
+              <a:ext uri="{FF2B5EF4-FFF2-40B4-BE49-F238E27FC236}">
+                <a16:creationId xmlns:a16="http://schemas.microsoft.com/office/drawing/2014/main" id="{7A0A7795-0384-2B01-C8B4-0D5320AEE45D}"/>
+              </a:ext>
+            </a:extLst>
+          </p:cNvPr>
+          <p:cNvSpPr>
+            <a:spLocks noGrp="1"/>
+          </p:cNvSpPr>
+          <p:nvPr>
+            <p:ph type="body" sz="quarter" idx="3"/>
+          </p:nvPr>
+        </p:nvSpPr>
+        <p:spPr>
+          <a:xfrm>
+            <a:off x="7452114" y="2340864"/>
+            <a:ext cx="4443984" cy="823912"/>
+          </a:xfrm>
+        </p:spPr>
+        <p:txBody>
+          <a:bodyPr/>
+          <a:lstStyle/>
+          <a:p>
+            <a:r>
+              <a:rPr lang="en-US" dirty="0"/>
+              <a:t>Final Dataset</a:t>
+            </a:r>
+          </a:p>
+        </p:txBody>
+      </p:sp>
+      <p:sp>
+        <p:nvSpPr>
+          <p:cNvPr id="6" name="Content Placeholder 5">
+            <a:extLst>
+              <a:ext uri="{FF2B5EF4-FFF2-40B4-BE49-F238E27FC236}">
+                <a16:creationId xmlns:a16="http://schemas.microsoft.com/office/drawing/2014/main" id="{20125DCD-8DFE-88B3-E067-561280FF14BB}"/>
+              </a:ext>
+            </a:extLst>
+          </p:cNvPr>
+          <p:cNvSpPr>
+            <a:spLocks noGrp="1"/>
+          </p:cNvSpPr>
+          <p:nvPr>
+            <p:ph sz="quarter" idx="4"/>
+          </p:nvPr>
+        </p:nvSpPr>
+        <p:spPr>
+          <a:xfrm>
+            <a:off x="7452114" y="3305207"/>
+            <a:ext cx="4443984" cy="2562193"/>
+          </a:xfrm>
+        </p:spPr>
+        <p:txBody>
+          <a:bodyPr>
+            <a:normAutofit fontScale="92500" lnSpcReduction="20000"/>
+          </a:bodyPr>
+          <a:lstStyle/>
+          <a:p>
+            <a:r>
+              <a:rPr lang="en-US" dirty="0" err="1"/>
+              <a:t>blw</a:t>
+            </a:r>
+            <a:endParaRPr lang="en-US" dirty="0"/>
+          </a:p>
+          <a:p>
+            <a:r>
+              <a:rPr lang="en-US" dirty="0"/>
+              <a:t>dal</a:t>
+            </a:r>
+          </a:p>
+          <a:p>
+            <a:r>
+              <a:rPr lang="en-US" dirty="0"/>
+              <a:t>fb</a:t>
+            </a:r>
+          </a:p>
+          <a:p>
+            <a:r>
+              <a:rPr lang="en-US" dirty="0" err="1"/>
+              <a:t>gpn</a:t>
+            </a:r>
+            <a:endParaRPr lang="en-US" dirty="0"/>
+          </a:p>
+          <a:p>
+            <a:r>
+              <a:rPr lang="en-US" dirty="0"/>
+              <a:t>mar</a:t>
+            </a:r>
+          </a:p>
+          <a:p>
+            <a:r>
+              <a:rPr lang="en-US" dirty="0" err="1"/>
+              <a:t>ms</a:t>
+            </a:r>
+            <a:endParaRPr lang="en-US" dirty="0"/>
+          </a:p>
+          <a:p>
+            <a:r>
+              <a:rPr lang="en-US" dirty="0" err="1"/>
+              <a:t>sti</a:t>
+            </a:r>
+            <a:endParaRPr lang="en-US" dirty="0"/>
+          </a:p>
+        </p:txBody>
+      </p:sp>
+      <p:sp>
+        <p:nvSpPr>
+          <p:cNvPr id="4" name="Footer Placeholder 3">
+            <a:extLst>
+              <a:ext uri="{FF2B5EF4-FFF2-40B4-BE49-F238E27FC236}">
+                <a16:creationId xmlns:a16="http://schemas.microsoft.com/office/drawing/2014/main" id="{A418A92B-B541-AAF0-104D-DFB835AD0BA1}"/>
+              </a:ext>
+            </a:extLst>
+          </p:cNvPr>
+          <p:cNvSpPr>
+            <a:spLocks noGrp="1"/>
+          </p:cNvSpPr>
+          <p:nvPr>
+            <p:ph type="ftr" sz="quarter" idx="11"/>
+          </p:nvPr>
+        </p:nvSpPr>
+        <p:spPr/>
+        <p:txBody>
+          <a:bodyPr/>
+          <a:lstStyle/>
+          <a:p>
+            <a:r>
+              <a:rPr lang="en-US"/>
+              <a:t>Syracuse University | School of Information Studies | Jeff Levesque</a:t>
+            </a:r>
+          </a:p>
+        </p:txBody>
+      </p:sp>
+      <p:sp>
+        <p:nvSpPr>
+          <p:cNvPr id="5" name="Slide Number Placeholder 4">
+            <a:extLst>
+              <a:ext uri="{FF2B5EF4-FFF2-40B4-BE49-F238E27FC236}">
+                <a16:creationId xmlns:a16="http://schemas.microsoft.com/office/drawing/2014/main" id="{400ACF2F-E9DA-4F9E-7716-B12BCF5CE422}"/>
+              </a:ext>
+            </a:extLst>
+          </p:cNvPr>
+          <p:cNvSpPr>
+            <a:spLocks noGrp="1"/>
+          </p:cNvSpPr>
+          <p:nvPr>
+            <p:ph type="sldNum" sz="quarter" idx="12"/>
+          </p:nvPr>
+        </p:nvSpPr>
+        <p:spPr/>
+        <p:txBody>
+          <a:bodyPr/>
+          <a:lstStyle/>
+          <a:p>
+            <a:fld id="{853C539F-E86C-6741-9E08-043B79C1FE47}" type="slidenum">
+              <a:rPr lang="en-US" smtClean="0"/>
+              <a:t>6</a:t>
+            </a:fld>
+            <a:endParaRPr lang="en-US"/>
+          </a:p>
+        </p:txBody>
+      </p:sp>
+      <p:sp>
+        <p:nvSpPr>
+          <p:cNvPr id="9" name="Right Arrow 8">
+            <a:extLst>
+              <a:ext uri="{FF2B5EF4-FFF2-40B4-BE49-F238E27FC236}">
+                <a16:creationId xmlns:a16="http://schemas.microsoft.com/office/drawing/2014/main" id="{757FA8B6-5B86-B9C3-0308-F5D1B315B927}"/>
+              </a:ext>
+            </a:extLst>
+          </p:cNvPr>
+          <p:cNvSpPr/>
+          <p:nvPr/>
+        </p:nvSpPr>
+        <p:spPr>
+          <a:xfrm>
+            <a:off x="6096000" y="3641584"/>
+            <a:ext cx="1033657" cy="904196"/>
+          </a:xfrm>
+          <a:prstGeom prst="rightArrow">
+            <a:avLst/>
+          </a:prstGeom>
+        </p:spPr>
+        <p:style>
+          <a:lnRef idx="2">
+            <a:schemeClr val="accent1">
+              <a:shade val="15000"/>
+            </a:schemeClr>
+          </a:lnRef>
+          <a:fillRef idx="1">
+            <a:schemeClr val="accent1"/>
+          </a:fillRef>
+          <a:effectRef idx="0">
+            <a:schemeClr val="accent1"/>
+          </a:effectRef>
+          <a:fontRef idx="minor">
+            <a:schemeClr val="lt1"/>
+          </a:fontRef>
+        </p:style>
+        <p:txBody>
+          <a:bodyPr rtlCol="0" anchor="ctr"/>
+          <a:lstStyle/>
+          <a:p>
+            <a:pPr algn="ctr"/>
+            <a:endParaRPr lang="en-US"/>
+          </a:p>
+        </p:txBody>
+      </p:sp>
+    </p:spTree>
+    <p:extLst>
+      <p:ext uri="{BB962C8B-B14F-4D97-AF65-F5344CB8AC3E}">
+        <p14:creationId xmlns:p14="http://schemas.microsoft.com/office/powerpoint/2010/main" val="1922402265"/>
+      </p:ext>
+    </p:extLst>
+  </p:cSld>
+  <p:clrMapOvr>
+    <a:masterClrMapping/>
+  </p:clrMapOvr>
+</p:sld>
+</file>
+
+<file path=ppt/slides/slide7.xml><?xml version="1.0" encoding="utf-8"?>
+<p:sld xmlns:a="http://schemas.openxmlformats.org/drawingml/2006/main" xmlns:r="http://schemas.openxmlformats.org/officeDocument/2006/relationships" xmlns:p="http://schemas.openxmlformats.org/presentationml/2006/main">
+  <p:cSld>
+    <p:spTree>
+      <p:nvGrpSpPr>
+        <p:cNvPr id="1" name=""/>
+        <p:cNvGrpSpPr/>
+        <p:nvPr/>
+      </p:nvGrpSpPr>
+      <p:grpSpPr>
+        <a:xfrm>
+          <a:off x="0" y="0"/>
+          <a:ext cx="0" cy="0"/>
+          <a:chOff x="0" y="0"/>
+          <a:chExt cx="0" cy="0"/>
+        </a:xfrm>
+      </p:grpSpPr>
+      <p:sp>
+        <p:nvSpPr>
+          <p:cNvPr id="2" name="Title 1">
+            <a:extLst>
+              <a:ext uri="{FF2B5EF4-FFF2-40B4-BE49-F238E27FC236}">
+                <a16:creationId xmlns:a16="http://schemas.microsoft.com/office/drawing/2014/main" id="{E3D4D36B-0660-F835-B2E0-23DB1E360E17}"/>
+              </a:ext>
+            </a:extLst>
+          </p:cNvPr>
+          <p:cNvSpPr>
+            <a:spLocks noGrp="1"/>
+          </p:cNvSpPr>
+          <p:nvPr>
+            <p:ph type="title"/>
+          </p:nvPr>
+        </p:nvSpPr>
+        <p:spPr/>
+        <p:txBody>
+          <a:bodyPr/>
+          <a:lstStyle/>
+          <a:p>
+            <a:r>
+              <a:rPr lang="en-US" dirty="0"/>
+              <a:t>Shiny Dashboard</a:t>
+            </a:r>
+          </a:p>
+        </p:txBody>
+      </p:sp>
+      <p:sp>
+        <p:nvSpPr>
+          <p:cNvPr id="7" name="Text Placeholder 6">
+            <a:extLst>
+              <a:ext uri="{FF2B5EF4-FFF2-40B4-BE49-F238E27FC236}">
+                <a16:creationId xmlns:a16="http://schemas.microsoft.com/office/drawing/2014/main" id="{908020ED-A00B-9383-DE76-611AF9A22DC8}"/>
+              </a:ext>
+            </a:extLst>
+          </p:cNvPr>
+          <p:cNvSpPr>
+            <a:spLocks noGrp="1"/>
+          </p:cNvSpPr>
+          <p:nvPr>
+            <p:ph type="body" idx="1"/>
+          </p:nvPr>
+        </p:nvSpPr>
+        <p:spPr>
+          <a:xfrm>
+            <a:off x="1371600" y="1832864"/>
+            <a:ext cx="4443984" cy="823912"/>
+          </a:xfrm>
+        </p:spPr>
+        <p:txBody>
+          <a:bodyPr/>
+          <a:lstStyle/>
+          <a:p>
+            <a:r>
+              <a:rPr lang="en-US" dirty="0"/>
+              <a:t>Variance</a:t>
+            </a:r>
+          </a:p>
+        </p:txBody>
+      </p:sp>
+      <p:pic>
+        <p:nvPicPr>
+          <p:cNvPr id="3074" name="Picture 2" descr="dashboard">
+            <a:extLst>
+              <a:ext uri="{FF2B5EF4-FFF2-40B4-BE49-F238E27FC236}">
+                <a16:creationId xmlns:a16="http://schemas.microsoft.com/office/drawing/2014/main" id="{9BC13CC0-53F0-1FC9-AECB-4347FF867839}"/>
+              </a:ext>
+            </a:extLst>
+          </p:cNvPr>
+          <p:cNvPicPr>
+            <a:picLocks noGrp="1" noChangeAspect="1" noChangeArrowheads="1"/>
+          </p:cNvPicPr>
+          <p:nvPr>
+            <p:ph sz="half" idx="2"/>
+          </p:nvPr>
+        </p:nvPicPr>
+        <p:blipFill>
+          <a:blip r:embed="rId2">
+            <a:extLst>
+              <a:ext uri="{28A0092B-C50C-407E-A947-70E740481C1C}">
+                <a14:useLocalDpi xmlns:a14="http://schemas.microsoft.com/office/drawing/2010/main" val="0"/>
+              </a:ext>
+            </a:extLst>
+          </a:blip>
+          <a:stretch>
+            <a:fillRect/>
+          </a:stretch>
+        </p:blipFill>
+        <p:spPr bwMode="auto">
+          <a:xfrm>
+            <a:off x="1371601" y="2961772"/>
+            <a:ext cx="3960887" cy="1990538"/>
+          </a:xfrm>
+          <a:prstGeom prst="rect">
+            <a:avLst/>
+          </a:prstGeom>
+          <a:noFill/>
+          <a:extLst>
+            <a:ext uri="{909E8E84-426E-40DD-AFC4-6F175D3DCCD1}">
+              <a14:hiddenFill xmlns:a14="http://schemas.microsoft.com/office/drawing/2010/main">
+                <a:solidFill>
+                  <a:srgbClr val="FFFFFF"/>
+                </a:solidFill>
+              </a14:hiddenFill>
+            </a:ext>
+          </a:extLst>
+        </p:spPr>
+      </p:pic>
+      <p:sp>
+        <p:nvSpPr>
+          <p:cNvPr id="8" name="Text Placeholder 7">
+            <a:extLst>
+              <a:ext uri="{FF2B5EF4-FFF2-40B4-BE49-F238E27FC236}">
+                <a16:creationId xmlns:a16="http://schemas.microsoft.com/office/drawing/2014/main" id="{5956DB18-BEC6-B448-B7E2-B7695CE3CDE1}"/>
+              </a:ext>
+            </a:extLst>
+          </p:cNvPr>
+          <p:cNvSpPr>
+            <a:spLocks noGrp="1"/>
+          </p:cNvSpPr>
+          <p:nvPr>
+            <p:ph type="body" sz="quarter" idx="3"/>
+          </p:nvPr>
+        </p:nvSpPr>
+        <p:spPr>
+          <a:xfrm>
+            <a:off x="5776797" y="1832864"/>
+            <a:ext cx="4443984" cy="823912"/>
+          </a:xfrm>
+        </p:spPr>
+        <p:txBody>
+          <a:bodyPr/>
+          <a:lstStyle/>
+          <a:p>
+            <a:r>
+              <a:rPr lang="en-US" dirty="0"/>
+              <a:t>Markowitz Model</a:t>
+            </a:r>
+          </a:p>
+        </p:txBody>
+      </p:sp>
+      <p:pic>
+        <p:nvPicPr>
+          <p:cNvPr id="3076" name="Picture 4" descr="markowitz">
+            <a:extLst>
+              <a:ext uri="{FF2B5EF4-FFF2-40B4-BE49-F238E27FC236}">
+                <a16:creationId xmlns:a16="http://schemas.microsoft.com/office/drawing/2014/main" id="{CA730D6C-BD5B-0723-B22A-40D9C0C19D73}"/>
+              </a:ext>
+            </a:extLst>
+          </p:cNvPr>
+          <p:cNvPicPr>
+            <a:picLocks noGrp="1" noChangeAspect="1" noChangeArrowheads="1"/>
+          </p:cNvPicPr>
+          <p:nvPr>
+            <p:ph sz="quarter" idx="4"/>
+          </p:nvPr>
+        </p:nvPicPr>
+        <p:blipFill>
+          <a:blip r:embed="rId3">
+            <a:extLst>
+              <a:ext uri="{28A0092B-C50C-407E-A947-70E740481C1C}">
+                <a14:useLocalDpi xmlns:a14="http://schemas.microsoft.com/office/drawing/2010/main" val="0"/>
+              </a:ext>
+            </a:extLst>
+          </a:blip>
+          <a:stretch>
+            <a:fillRect/>
+          </a:stretch>
+        </p:blipFill>
+        <p:spPr bwMode="auto">
+          <a:xfrm>
+            <a:off x="5776797" y="2961772"/>
+            <a:ext cx="5940417" cy="1990538"/>
+          </a:xfrm>
+          <a:prstGeom prst="rect">
+            <a:avLst/>
+          </a:prstGeom>
+          <a:noFill/>
+          <a:extLst>
+            <a:ext uri="{909E8E84-426E-40DD-AFC4-6F175D3DCCD1}">
+              <a14:hiddenFill xmlns:a14="http://schemas.microsoft.com/office/drawing/2010/main">
+                <a:solidFill>
+                  <a:srgbClr val="FFFFFF"/>
+                </a:solidFill>
+              </a14:hiddenFill>
+            </a:ext>
+          </a:extLst>
+        </p:spPr>
+      </p:pic>
+      <p:sp>
+        <p:nvSpPr>
+          <p:cNvPr id="5" name="Footer Placeholder 4">
+            <a:extLst>
+              <a:ext uri="{FF2B5EF4-FFF2-40B4-BE49-F238E27FC236}">
+                <a16:creationId xmlns:a16="http://schemas.microsoft.com/office/drawing/2014/main" id="{0A57B210-A9F1-1484-5F84-0596991586AF}"/>
+              </a:ext>
+            </a:extLst>
+          </p:cNvPr>
+          <p:cNvSpPr>
+            <a:spLocks noGrp="1"/>
+          </p:cNvSpPr>
+          <p:nvPr>
+            <p:ph type="ftr" sz="quarter" idx="11"/>
+          </p:nvPr>
+        </p:nvSpPr>
+        <p:spPr/>
+        <p:txBody>
+          <a:bodyPr/>
+          <a:lstStyle/>
+          <a:p>
+            <a:r>
+              <a:rPr lang="en-US"/>
+              <a:t>Syracuse University | School of Information Studies | Jeff Levesque</a:t>
+            </a:r>
+          </a:p>
+        </p:txBody>
+      </p:sp>
+      <p:sp>
+        <p:nvSpPr>
+          <p:cNvPr id="6" name="Slide Number Placeholder 5">
+            <a:extLst>
+              <a:ext uri="{FF2B5EF4-FFF2-40B4-BE49-F238E27FC236}">
+                <a16:creationId xmlns:a16="http://schemas.microsoft.com/office/drawing/2014/main" id="{BDB73A8A-678C-EAB4-F6B4-D3D2ECC80AE1}"/>
+              </a:ext>
+            </a:extLst>
+          </p:cNvPr>
+          <p:cNvSpPr>
+            <a:spLocks noGrp="1"/>
+          </p:cNvSpPr>
+          <p:nvPr>
+            <p:ph type="sldNum" sz="quarter" idx="12"/>
+          </p:nvPr>
+        </p:nvSpPr>
+        <p:spPr/>
+        <p:txBody>
+          <a:bodyPr/>
+          <a:lstStyle/>
+          <a:p>
+            <a:fld id="{853C539F-E86C-6741-9E08-043B79C1FE47}" type="slidenum">
+              <a:rPr lang="en-US" smtClean="0"/>
+              <a:t>7</a:t>
+            </a:fld>
+            <a:endParaRPr lang="en-US"/>
+          </a:p>
+        </p:txBody>
+      </p:sp>
+    </p:spTree>
+    <p:extLst>
+      <p:ext uri="{BB962C8B-B14F-4D97-AF65-F5344CB8AC3E}">
+        <p14:creationId xmlns:p14="http://schemas.microsoft.com/office/powerpoint/2010/main" val="3774234698"/>
+      </p:ext>
+    </p:extLst>
+  </p:cSld>
+  <p:clrMapOvr>
+    <a:masterClrMapping/>
+  </p:clrMapOvr>
+</p:sld>
+</file>
+
+<file path=ppt/slides/slide8.xml><?xml version="1.0" encoding="utf-8"?>
+<p:sld xmlns:a="http://schemas.openxmlformats.org/drawingml/2006/main" xmlns:r="http://schemas.openxmlformats.org/officeDocument/2006/relationships" xmlns:p="http://schemas.openxmlformats.org/presentationml/2006/main">
+  <p:cSld>
+    <p:spTree>
+      <p:nvGrpSpPr>
+        <p:cNvPr id="1" name=""/>
+        <p:cNvGrpSpPr/>
+        <p:nvPr/>
+      </p:nvGrpSpPr>
+      <p:grpSpPr>
+        <a:xfrm>
+          <a:off x="0" y="0"/>
+          <a:ext cx="0" cy="0"/>
+          <a:chOff x="0" y="0"/>
+          <a:chExt cx="0" cy="0"/>
+        </a:xfrm>
+      </p:grpSpPr>
+      <p:sp>
+        <p:nvSpPr>
+          <p:cNvPr id="2" name="Title 1">
+            <a:extLst>
+              <a:ext uri="{FF2B5EF4-FFF2-40B4-BE49-F238E27FC236}">
+                <a16:creationId xmlns:a16="http://schemas.microsoft.com/office/drawing/2014/main" id="{1E694C51-8EB9-E1DC-474B-4C6C6BA02505}"/>
+              </a:ext>
+            </a:extLst>
+          </p:cNvPr>
+          <p:cNvSpPr>
+            <a:spLocks noGrp="1"/>
+          </p:cNvSpPr>
+          <p:nvPr>
+            <p:ph type="title"/>
+          </p:nvPr>
+        </p:nvSpPr>
+        <p:spPr/>
+        <p:txBody>
+          <a:bodyPr/>
+          <a:lstStyle/>
+          <a:p>
+            <a:r>
+              <a:rPr lang="en-US" dirty="0"/>
+              <a:t>Shiny Dashboard</a:t>
+            </a:r>
+          </a:p>
+        </p:txBody>
+      </p:sp>
+      <p:sp>
+        <p:nvSpPr>
+          <p:cNvPr id="3" name="Text Placeholder 2">
+            <a:extLst>
+              <a:ext uri="{FF2B5EF4-FFF2-40B4-BE49-F238E27FC236}">
+                <a16:creationId xmlns:a16="http://schemas.microsoft.com/office/drawing/2014/main" id="{ED1DEA0B-A6E3-1E1B-A45B-4306DBD03936}"/>
+              </a:ext>
+            </a:extLst>
+          </p:cNvPr>
+          <p:cNvSpPr>
+            <a:spLocks noGrp="1"/>
+          </p:cNvSpPr>
+          <p:nvPr>
+            <p:ph type="body" idx="1"/>
+          </p:nvPr>
+        </p:nvSpPr>
+        <p:spPr>
+          <a:xfrm>
+            <a:off x="1371600" y="1566164"/>
+            <a:ext cx="4443984" cy="823912"/>
+          </a:xfrm>
+        </p:spPr>
+        <p:txBody>
+          <a:bodyPr/>
+          <a:lstStyle/>
+          <a:p>
+            <a:r>
+              <a:rPr lang="en-US" dirty="0"/>
+              <a:t>Arima Model</a:t>
+            </a:r>
+          </a:p>
+        </p:txBody>
+      </p:sp>
+      <p:sp>
+        <p:nvSpPr>
+          <p:cNvPr id="5" name="Text Placeholder 4">
+            <a:extLst>
+              <a:ext uri="{FF2B5EF4-FFF2-40B4-BE49-F238E27FC236}">
+                <a16:creationId xmlns:a16="http://schemas.microsoft.com/office/drawing/2014/main" id="{DE7C5AC5-F025-4FA7-FC5F-DA9AE54779C2}"/>
+              </a:ext>
+            </a:extLst>
+          </p:cNvPr>
+          <p:cNvSpPr>
+            <a:spLocks noGrp="1"/>
+          </p:cNvSpPr>
+          <p:nvPr>
+            <p:ph type="body" sz="quarter" idx="3"/>
+          </p:nvPr>
+        </p:nvSpPr>
+        <p:spPr>
+          <a:xfrm>
+            <a:off x="6525014" y="1566164"/>
+            <a:ext cx="4443984" cy="823912"/>
+          </a:xfrm>
+        </p:spPr>
+        <p:txBody>
+          <a:bodyPr/>
+          <a:lstStyle/>
+          <a:p>
+            <a:r>
+              <a:rPr lang="en-US" dirty="0"/>
+              <a:t>Neural Network</a:t>
+            </a:r>
+          </a:p>
+        </p:txBody>
+      </p:sp>
+      <p:sp>
+        <p:nvSpPr>
+          <p:cNvPr id="7" name="Footer Placeholder 6">
+            <a:extLst>
+              <a:ext uri="{FF2B5EF4-FFF2-40B4-BE49-F238E27FC236}">
+                <a16:creationId xmlns:a16="http://schemas.microsoft.com/office/drawing/2014/main" id="{DE97E6B2-1437-822B-C1D5-20D7B7BE30CB}"/>
+              </a:ext>
+            </a:extLst>
+          </p:cNvPr>
+          <p:cNvSpPr>
+            <a:spLocks noGrp="1"/>
+          </p:cNvSpPr>
+          <p:nvPr>
+            <p:ph type="ftr" sz="quarter" idx="11"/>
+          </p:nvPr>
+        </p:nvSpPr>
+        <p:spPr/>
+        <p:txBody>
+          <a:bodyPr/>
+          <a:lstStyle/>
+          <a:p>
+            <a:r>
+              <a:rPr lang="en-US"/>
+              <a:t>Syracuse University | School of Information Studies | Jeff Levesque</a:t>
+            </a:r>
+          </a:p>
+        </p:txBody>
+      </p:sp>
+      <p:sp>
+        <p:nvSpPr>
+          <p:cNvPr id="8" name="Slide Number Placeholder 7">
+            <a:extLst>
+              <a:ext uri="{FF2B5EF4-FFF2-40B4-BE49-F238E27FC236}">
+                <a16:creationId xmlns:a16="http://schemas.microsoft.com/office/drawing/2014/main" id="{7488418E-ED65-84F7-DB6A-2CB0C5196F47}"/>
+              </a:ext>
+            </a:extLst>
+          </p:cNvPr>
+          <p:cNvSpPr>
+            <a:spLocks noGrp="1"/>
+          </p:cNvSpPr>
+          <p:nvPr>
+            <p:ph type="sldNum" sz="quarter" idx="12"/>
+          </p:nvPr>
+        </p:nvSpPr>
+        <p:spPr/>
+        <p:txBody>
+          <a:bodyPr/>
+          <a:lstStyle/>
+          <a:p>
+            <a:fld id="{853C539F-E86C-6741-9E08-043B79C1FE47}" type="slidenum">
+              <a:rPr lang="en-US" smtClean="0"/>
+              <a:t>8</a:t>
+            </a:fld>
+            <a:endParaRPr lang="en-US"/>
+          </a:p>
+        </p:txBody>
+      </p:sp>
+      <p:pic>
+        <p:nvPicPr>
+          <p:cNvPr id="4098" name="Picture 2" descr="arima">
+            <a:extLst>
+              <a:ext uri="{FF2B5EF4-FFF2-40B4-BE49-F238E27FC236}">
+                <a16:creationId xmlns:a16="http://schemas.microsoft.com/office/drawing/2014/main" id="{A3C672B3-951E-6A03-8267-9E94C3A9CEAF}"/>
+              </a:ext>
+            </a:extLst>
+          </p:cNvPr>
+          <p:cNvPicPr>
+            <a:picLocks noGrp="1" noChangeAspect="1" noChangeArrowheads="1"/>
+          </p:cNvPicPr>
+          <p:nvPr>
+            <p:ph sz="half" idx="2"/>
+          </p:nvPr>
+        </p:nvPicPr>
+        <p:blipFill>
+          <a:blip r:embed="rId2">
+            <a:extLst>
+              <a:ext uri="{28A0092B-C50C-407E-A947-70E740481C1C}">
+                <a14:useLocalDpi xmlns:a14="http://schemas.microsoft.com/office/drawing/2010/main" val="0"/>
+              </a:ext>
+            </a:extLst>
+          </a:blip>
+          <a:srcRect/>
+          <a:stretch>
+            <a:fillRect/>
+          </a:stretch>
+        </p:blipFill>
+        <p:spPr bwMode="auto">
+          <a:xfrm>
+            <a:off x="1371600" y="2723519"/>
+            <a:ext cx="3782702" cy="3133148"/>
+          </a:xfrm>
+          <a:prstGeom prst="rect">
+            <a:avLst/>
+          </a:prstGeom>
+          <a:noFill/>
+          <a:extLst>
+            <a:ext uri="{909E8E84-426E-40DD-AFC4-6F175D3DCCD1}">
+              <a14:hiddenFill xmlns:a14="http://schemas.microsoft.com/office/drawing/2010/main">
+                <a:solidFill>
+                  <a:srgbClr val="FFFFFF"/>
+                </a:solidFill>
+              </a14:hiddenFill>
+            </a:ext>
+          </a:extLst>
+        </p:spPr>
+      </p:pic>
+      <p:pic>
+        <p:nvPicPr>
+          <p:cNvPr id="4100" name="Picture 4" descr="lstm">
+            <a:extLst>
+              <a:ext uri="{FF2B5EF4-FFF2-40B4-BE49-F238E27FC236}">
+                <a16:creationId xmlns:a16="http://schemas.microsoft.com/office/drawing/2014/main" id="{B9B5DE4D-8916-1745-4D54-DA779AEE4B2B}"/>
+              </a:ext>
+            </a:extLst>
+          </p:cNvPr>
+          <p:cNvPicPr>
+            <a:picLocks noGrp="1" noChangeAspect="1" noChangeArrowheads="1"/>
+          </p:cNvPicPr>
+          <p:nvPr>
+            <p:ph sz="quarter" idx="4"/>
+          </p:nvPr>
+        </p:nvPicPr>
+        <p:blipFill>
+          <a:blip r:embed="rId3">
+            <a:extLst>
+              <a:ext uri="{28A0092B-C50C-407E-A947-70E740481C1C}">
+                <a14:useLocalDpi xmlns:a14="http://schemas.microsoft.com/office/drawing/2010/main" val="0"/>
+              </a:ext>
+            </a:extLst>
+          </a:blip>
+          <a:srcRect/>
+          <a:stretch>
+            <a:fillRect/>
+          </a:stretch>
+        </p:blipFill>
+        <p:spPr bwMode="auto">
+          <a:xfrm>
+            <a:off x="6525014" y="2723519"/>
+            <a:ext cx="3990423" cy="3145865"/>
+          </a:xfrm>
+          <a:prstGeom prst="rect">
+            <a:avLst/>
+          </a:prstGeom>
+          <a:noFill/>
+          <a:extLst>
+            <a:ext uri="{909E8E84-426E-40DD-AFC4-6F175D3DCCD1}">
+              <a14:hiddenFill xmlns:a14="http://schemas.microsoft.com/office/drawing/2010/main">
+                <a:solidFill>
+                  <a:srgbClr val="FFFFFF"/>
+                </a:solidFill>
+              </a14:hiddenFill>
+            </a:ext>
+          </a:extLst>
+        </p:spPr>
+      </p:pic>
+    </p:spTree>
+    <p:extLst>
+      <p:ext uri="{BB962C8B-B14F-4D97-AF65-F5344CB8AC3E}">
+        <p14:creationId xmlns:p14="http://schemas.microsoft.com/office/powerpoint/2010/main" val="1138072347"/>
+      </p:ext>
+    </p:extLst>
+  </p:cSld>
+  <p:clrMapOvr>
+    <a:masterClrMapping/>
+  </p:clrMapOvr>
+</p:sld>
+</file>
+
+<file path=ppt/slides/slide9.xml><?xml version="1.0" encoding="utf-8"?>
+<p:sld xmlns:a="http://schemas.openxmlformats.org/drawingml/2006/main" xmlns:r="http://schemas.openxmlformats.org/officeDocument/2006/relationships" xmlns:p="http://schemas.openxmlformats.org/presentationml/2006/main">
+  <p:cSld>
     <p:bg>
       <p:bgPr>
         <a:blipFill dpi="0" rotWithShape="1">
@@ -14559,7 +15878,7 @@
           <a:p>
             <a:fld id="{853C539F-E86C-6741-9E08-043B79C1FE47}" type="slidenum">
               <a:rPr lang="en-US" smtClean="0"/>
-              <a:t>6</a:t>
+              <a:t>9</a:t>
             </a:fld>
             <a:endParaRPr lang="en-US"/>
           </a:p>
@@ -14569,349 +15888,6 @@
     <p:extLst>
       <p:ext uri="{BB962C8B-B14F-4D97-AF65-F5344CB8AC3E}">
         <p14:creationId xmlns:p14="http://schemas.microsoft.com/office/powerpoint/2010/main" val="2810723432"/>
-      </p:ext>
-    </p:extLst>
-  </p:cSld>
-  <p:clrMapOvr>
-    <a:masterClrMapping/>
-  </p:clrMapOvr>
-</p:sld>
-</file>
-
-<file path=ppt/slides/slide7.xml><?xml version="1.0" encoding="utf-8"?>
-<p:sld xmlns:a="http://schemas.openxmlformats.org/drawingml/2006/main" xmlns:r="http://schemas.openxmlformats.org/officeDocument/2006/relationships" xmlns:p="http://schemas.openxmlformats.org/presentationml/2006/main">
-  <p:cSld>
-    <p:bg>
-      <p:bgPr>
-        <a:blipFill dpi="0" rotWithShape="1">
-          <a:blip r:embed="rId2">
-            <a:alphaModFix amt="29667"/>
-            <a:lum/>
-            <a:extLst>
-              <a:ext uri="{BEBA8EAE-BF5A-486C-A8C5-ECC9F3942E4B}">
-                <a14:imgProps xmlns:a14="http://schemas.microsoft.com/office/drawing/2010/main">
-                  <a14:imgLayer r:embed="rId3">
-                    <a14:imgEffect>
-                      <a14:artisticPencilGrayscale pencilSize="0"/>
-                    </a14:imgEffect>
-                  </a14:imgLayer>
-                </a14:imgProps>
-              </a:ext>
-            </a:extLst>
-          </a:blip>
-          <a:srcRect/>
-          <a:stretch>
-            <a:fillRect l="-3000" r="-3000"/>
-          </a:stretch>
-        </a:blipFill>
-        <a:effectLst/>
-      </p:bgPr>
-    </p:bg>
-    <p:spTree>
-      <p:nvGrpSpPr>
-        <p:cNvPr id="1" name=""/>
-        <p:cNvGrpSpPr/>
-        <p:nvPr/>
-      </p:nvGrpSpPr>
-      <p:grpSpPr>
-        <a:xfrm>
-          <a:off x="0" y="0"/>
-          <a:ext cx="0" cy="0"/>
-          <a:chOff x="0" y="0"/>
-          <a:chExt cx="0" cy="0"/>
-        </a:xfrm>
-      </p:grpSpPr>
-      <p:sp>
-        <p:nvSpPr>
-          <p:cNvPr id="7" name="Title 6">
-            <a:extLst>
-              <a:ext uri="{FF2B5EF4-FFF2-40B4-BE49-F238E27FC236}">
-                <a16:creationId xmlns:a16="http://schemas.microsoft.com/office/drawing/2014/main" id="{F276A244-89FD-5B81-7E4E-67067BB463F2}"/>
-              </a:ext>
-            </a:extLst>
-          </p:cNvPr>
-          <p:cNvSpPr>
-            <a:spLocks noGrp="1"/>
-          </p:cNvSpPr>
-          <p:nvPr>
-            <p:ph type="ctrTitle"/>
-          </p:nvPr>
-        </p:nvSpPr>
-        <p:spPr/>
-        <p:txBody>
-          <a:bodyPr/>
-          <a:lstStyle/>
-          <a:p>
-            <a:r>
-              <a:rPr lang="en-US" dirty="0">
-                <a:solidFill>
-                  <a:schemeClr val="tx1"/>
-                </a:solidFill>
-              </a:rPr>
-              <a:t>IST-736</a:t>
-            </a:r>
-          </a:p>
-        </p:txBody>
-      </p:sp>
-      <p:sp>
-        <p:nvSpPr>
-          <p:cNvPr id="2" name="Subtitle 1">
-            <a:extLst>
-              <a:ext uri="{FF2B5EF4-FFF2-40B4-BE49-F238E27FC236}">
-                <a16:creationId xmlns:a16="http://schemas.microsoft.com/office/drawing/2014/main" id="{E28A000C-5430-E51B-8330-70BE38363181}"/>
-              </a:ext>
-            </a:extLst>
-          </p:cNvPr>
-          <p:cNvSpPr>
-            <a:spLocks noGrp="1"/>
-          </p:cNvSpPr>
-          <p:nvPr>
-            <p:ph type="subTitle" idx="1"/>
-          </p:nvPr>
-        </p:nvSpPr>
-        <p:spPr/>
-        <p:txBody>
-          <a:bodyPr/>
-          <a:lstStyle/>
-          <a:p>
-            <a:r>
-              <a:rPr lang="en-US" dirty="0">
-                <a:solidFill>
-                  <a:schemeClr val="accent1"/>
-                </a:solidFill>
-              </a:rPr>
-              <a:t>Market Prediction: using sentiment analysis</a:t>
-            </a:r>
-          </a:p>
-        </p:txBody>
-      </p:sp>
-      <p:sp>
-        <p:nvSpPr>
-          <p:cNvPr id="4" name="Footer Placeholder 3">
-            <a:extLst>
-              <a:ext uri="{FF2B5EF4-FFF2-40B4-BE49-F238E27FC236}">
-                <a16:creationId xmlns:a16="http://schemas.microsoft.com/office/drawing/2014/main" id="{148D5E4F-F673-B65E-FAC4-1DE438B84AB4}"/>
-              </a:ext>
-            </a:extLst>
-          </p:cNvPr>
-          <p:cNvSpPr>
-            <a:spLocks noGrp="1"/>
-          </p:cNvSpPr>
-          <p:nvPr>
-            <p:ph type="ftr" sz="quarter" idx="11"/>
-          </p:nvPr>
-        </p:nvSpPr>
-        <p:spPr/>
-        <p:txBody>
-          <a:bodyPr/>
-          <a:lstStyle/>
-          <a:p>
-            <a:r>
-              <a:rPr lang="en-US"/>
-              <a:t>Syracuse University | School of Information Studies | Jeff Levesque</a:t>
-            </a:r>
-          </a:p>
-        </p:txBody>
-      </p:sp>
-      <p:sp>
-        <p:nvSpPr>
-          <p:cNvPr id="5" name="Slide Number Placeholder 4">
-            <a:extLst>
-              <a:ext uri="{FF2B5EF4-FFF2-40B4-BE49-F238E27FC236}">
-                <a16:creationId xmlns:a16="http://schemas.microsoft.com/office/drawing/2014/main" id="{D83DE05B-874E-F723-C227-FF8655DBEA76}"/>
-              </a:ext>
-            </a:extLst>
-          </p:cNvPr>
-          <p:cNvSpPr>
-            <a:spLocks noGrp="1"/>
-          </p:cNvSpPr>
-          <p:nvPr>
-            <p:ph type="sldNum" sz="quarter" idx="12"/>
-          </p:nvPr>
-        </p:nvSpPr>
-        <p:spPr/>
-        <p:txBody>
-          <a:bodyPr/>
-          <a:lstStyle/>
-          <a:p>
-            <a:fld id="{853C539F-E86C-6741-9E08-043B79C1FE47}" type="slidenum">
-              <a:rPr lang="en-US" smtClean="0"/>
-              <a:t>7</a:t>
-            </a:fld>
-            <a:endParaRPr lang="en-US"/>
-          </a:p>
-        </p:txBody>
-      </p:sp>
-    </p:spTree>
-    <p:extLst>
-      <p:ext uri="{BB962C8B-B14F-4D97-AF65-F5344CB8AC3E}">
-        <p14:creationId xmlns:p14="http://schemas.microsoft.com/office/powerpoint/2010/main" val="2568997217"/>
-      </p:ext>
-    </p:extLst>
-  </p:cSld>
-  <p:clrMapOvr>
-    <a:masterClrMapping/>
-  </p:clrMapOvr>
-</p:sld>
-</file>
-
-<file path=ppt/slides/slide8.xml><?xml version="1.0" encoding="utf-8"?>
-<p:sld xmlns:a="http://schemas.openxmlformats.org/drawingml/2006/main" xmlns:r="http://schemas.openxmlformats.org/officeDocument/2006/relationships" xmlns:p="http://schemas.openxmlformats.org/presentationml/2006/main">
-  <p:cSld>
-    <p:bg>
-      <p:bgPr>
-        <a:blipFill dpi="0" rotWithShape="1">
-          <a:blip r:embed="rId2">
-            <a:alphaModFix amt="15000"/>
-            <a:lum/>
-          </a:blip>
-          <a:srcRect/>
-          <a:stretch>
-            <a:fillRect l="-2000" r="-2000"/>
-          </a:stretch>
-        </a:blipFill>
-        <a:effectLst/>
-      </p:bgPr>
-    </p:bg>
-    <p:spTree>
-      <p:nvGrpSpPr>
-        <p:cNvPr id="1" name=""/>
-        <p:cNvGrpSpPr/>
-        <p:nvPr/>
-      </p:nvGrpSpPr>
-      <p:grpSpPr>
-        <a:xfrm>
-          <a:off x="0" y="0"/>
-          <a:ext cx="0" cy="0"/>
-          <a:chOff x="0" y="0"/>
-          <a:chExt cx="0" cy="0"/>
-        </a:xfrm>
-      </p:grpSpPr>
-      <p:sp>
-        <p:nvSpPr>
-          <p:cNvPr id="7" name="Title 6">
-            <a:extLst>
-              <a:ext uri="{FF2B5EF4-FFF2-40B4-BE49-F238E27FC236}">
-                <a16:creationId xmlns:a16="http://schemas.microsoft.com/office/drawing/2014/main" id="{F276A244-89FD-5B81-7E4E-67067BB463F2}"/>
-              </a:ext>
-            </a:extLst>
-          </p:cNvPr>
-          <p:cNvSpPr>
-            <a:spLocks noGrp="1"/>
-          </p:cNvSpPr>
-          <p:nvPr>
-            <p:ph type="ctrTitle"/>
-          </p:nvPr>
-        </p:nvSpPr>
-        <p:spPr/>
-        <p:txBody>
-          <a:bodyPr/>
-          <a:lstStyle/>
-          <a:p>
-            <a:r>
-              <a:rPr lang="en-US" dirty="0">
-                <a:solidFill>
-                  <a:schemeClr val="tx1"/>
-                </a:solidFill>
-              </a:rPr>
-              <a:t>Follow-up</a:t>
-            </a:r>
-          </a:p>
-        </p:txBody>
-      </p:sp>
-      <p:sp>
-        <p:nvSpPr>
-          <p:cNvPr id="2" name="Subtitle 1">
-            <a:extLst>
-              <a:ext uri="{FF2B5EF4-FFF2-40B4-BE49-F238E27FC236}">
-                <a16:creationId xmlns:a16="http://schemas.microsoft.com/office/drawing/2014/main" id="{E28A000C-5430-E51B-8330-70BE38363181}"/>
-              </a:ext>
-            </a:extLst>
-          </p:cNvPr>
-          <p:cNvSpPr>
-            <a:spLocks noGrp="1"/>
-          </p:cNvSpPr>
-          <p:nvPr>
-            <p:ph type="subTitle" idx="1"/>
-          </p:nvPr>
-        </p:nvSpPr>
-        <p:spPr/>
-        <p:txBody>
-          <a:bodyPr/>
-          <a:lstStyle/>
-          <a:p>
-            <a:r>
-              <a:rPr lang="en-US" dirty="0">
-                <a:solidFill>
-                  <a:schemeClr val="accent1"/>
-                </a:solidFill>
-              </a:rPr>
-              <a:t>AWS Integration: streaming data</a:t>
-            </a:r>
-          </a:p>
-        </p:txBody>
-      </p:sp>
-      <p:sp>
-        <p:nvSpPr>
-          <p:cNvPr id="4" name="Footer Placeholder 3">
-            <a:extLst>
-              <a:ext uri="{FF2B5EF4-FFF2-40B4-BE49-F238E27FC236}">
-                <a16:creationId xmlns:a16="http://schemas.microsoft.com/office/drawing/2014/main" id="{C28FA6F0-DDC9-871F-8FCA-886AA1E411A0}"/>
-              </a:ext>
-            </a:extLst>
-          </p:cNvPr>
-          <p:cNvSpPr>
-            <a:spLocks noGrp="1"/>
-          </p:cNvSpPr>
-          <p:nvPr>
-            <p:ph type="ftr" sz="quarter" idx="11"/>
-          </p:nvPr>
-        </p:nvSpPr>
-        <p:spPr/>
-        <p:txBody>
-          <a:bodyPr/>
-          <a:lstStyle/>
-          <a:p>
-            <a:r>
-              <a:rPr lang="en-US"/>
-              <a:t>Syracuse University | School of Information Studies | Jeff Levesque</a:t>
-            </a:r>
-          </a:p>
-        </p:txBody>
-      </p:sp>
-      <p:sp>
-        <p:nvSpPr>
-          <p:cNvPr id="5" name="Slide Number Placeholder 4">
-            <a:extLst>
-              <a:ext uri="{FF2B5EF4-FFF2-40B4-BE49-F238E27FC236}">
-                <a16:creationId xmlns:a16="http://schemas.microsoft.com/office/drawing/2014/main" id="{ABEDE7A4-9AA9-7DCB-3C32-03FA6D060154}"/>
-              </a:ext>
-            </a:extLst>
-          </p:cNvPr>
-          <p:cNvSpPr>
-            <a:spLocks noGrp="1"/>
-          </p:cNvSpPr>
-          <p:nvPr>
-            <p:ph type="sldNum" sz="quarter" idx="12"/>
-          </p:nvPr>
-        </p:nvSpPr>
-        <p:spPr/>
-        <p:txBody>
-          <a:bodyPr/>
-          <a:lstStyle/>
-          <a:p>
-            <a:fld id="{853C539F-E86C-6741-9E08-043B79C1FE47}" type="slidenum">
-              <a:rPr lang="en-US" smtClean="0"/>
-              <a:t>8</a:t>
-            </a:fld>
-            <a:endParaRPr lang="en-US"/>
-          </a:p>
-        </p:txBody>
-      </p:sp>
-    </p:spTree>
-    <p:extLst>
-      <p:ext uri="{BB962C8B-B14F-4D97-AF65-F5344CB8AC3E}">
-        <p14:creationId xmlns:p14="http://schemas.microsoft.com/office/powerpoint/2010/main" val="1305535365"/>
       </p:ext>
     </p:extLst>
   </p:cSld>

</xml_diff>

<commit_message>
#12: presentation.pptx, add 'ist-664' slides
</commit_message>
<xml_diff>
--- a/presentation.pptx
+++ b/presentation.pptx
@@ -5,7 +5,7 @@
     <p:sldMasterId id="2147483726" r:id="rId1"/>
   </p:sldMasterIdLst>
   <p:notesMasterIdLst>
-    <p:notesMasterId r:id="rId13"/>
+    <p:notesMasterId r:id="rId19"/>
   </p:notesMasterIdLst>
   <p:sldIdLst>
     <p:sldId id="261" r:id="rId2"/>
@@ -13,12 +13,18 @@
     <p:sldId id="262" r:id="rId4"/>
     <p:sldId id="263" r:id="rId5"/>
     <p:sldId id="257" r:id="rId6"/>
-    <p:sldId id="267" r:id="rId7"/>
-    <p:sldId id="265" r:id="rId8"/>
-    <p:sldId id="266" r:id="rId9"/>
-    <p:sldId id="258" r:id="rId10"/>
-    <p:sldId id="259" r:id="rId11"/>
-    <p:sldId id="260" r:id="rId12"/>
+    <p:sldId id="273" r:id="rId7"/>
+    <p:sldId id="267" r:id="rId8"/>
+    <p:sldId id="265" r:id="rId9"/>
+    <p:sldId id="266" r:id="rId10"/>
+    <p:sldId id="258" r:id="rId11"/>
+    <p:sldId id="269" r:id="rId12"/>
+    <p:sldId id="268" r:id="rId13"/>
+    <p:sldId id="270" r:id="rId14"/>
+    <p:sldId id="271" r:id="rId15"/>
+    <p:sldId id="272" r:id="rId16"/>
+    <p:sldId id="259" r:id="rId17"/>
+    <p:sldId id="260" r:id="rId18"/>
   </p:sldIdLst>
   <p:sldSz cx="12192000" cy="6858000"/>
   <p:notesSz cx="6858000" cy="9144000"/>
@@ -13344,6 +13350,2396 @@
       <p:bgPr>
         <a:blipFill dpi="0" rotWithShape="1">
           <a:blip r:embed="rId2">
+            <a:alphaModFix amt="29932"/>
+            <a:lum/>
+          </a:blip>
+          <a:srcRect/>
+          <a:stretch>
+            <a:fillRect l="-12000" t="20000" r="-12000" b="-20000"/>
+          </a:stretch>
+        </a:blipFill>
+        <a:effectLst/>
+      </p:bgPr>
+    </p:bg>
+    <p:spTree>
+      <p:nvGrpSpPr>
+        <p:cNvPr id="1" name=""/>
+        <p:cNvGrpSpPr/>
+        <p:nvPr/>
+      </p:nvGrpSpPr>
+      <p:grpSpPr>
+        <a:xfrm>
+          <a:off x="0" y="0"/>
+          <a:ext cx="0" cy="0"/>
+          <a:chOff x="0" y="0"/>
+          <a:chExt cx="0" cy="0"/>
+        </a:xfrm>
+      </p:grpSpPr>
+      <p:sp>
+        <p:nvSpPr>
+          <p:cNvPr id="7" name="Title 6">
+            <a:extLst>
+              <a:ext uri="{FF2B5EF4-FFF2-40B4-BE49-F238E27FC236}">
+                <a16:creationId xmlns:a16="http://schemas.microsoft.com/office/drawing/2014/main" id="{F276A244-89FD-5B81-7E4E-67067BB463F2}"/>
+              </a:ext>
+            </a:extLst>
+          </p:cNvPr>
+          <p:cNvSpPr>
+            <a:spLocks noGrp="1"/>
+          </p:cNvSpPr>
+          <p:nvPr>
+            <p:ph type="ctrTitle"/>
+          </p:nvPr>
+        </p:nvSpPr>
+        <p:spPr/>
+        <p:txBody>
+          <a:bodyPr/>
+          <a:lstStyle/>
+          <a:p>
+            <a:r>
+              <a:rPr lang="en-US" dirty="0">
+                <a:solidFill>
+                  <a:schemeClr val="tx1"/>
+                </a:solidFill>
+              </a:rPr>
+              <a:t>IST-664</a:t>
+            </a:r>
+          </a:p>
+        </p:txBody>
+      </p:sp>
+      <p:sp>
+        <p:nvSpPr>
+          <p:cNvPr id="2" name="Subtitle 1">
+            <a:extLst>
+              <a:ext uri="{FF2B5EF4-FFF2-40B4-BE49-F238E27FC236}">
+                <a16:creationId xmlns:a16="http://schemas.microsoft.com/office/drawing/2014/main" id="{E28A000C-5430-E51B-8330-70BE38363181}"/>
+              </a:ext>
+            </a:extLst>
+          </p:cNvPr>
+          <p:cNvSpPr>
+            <a:spLocks noGrp="1"/>
+          </p:cNvSpPr>
+          <p:nvPr>
+            <p:ph type="subTitle" idx="1"/>
+          </p:nvPr>
+        </p:nvSpPr>
+        <p:spPr/>
+        <p:txBody>
+          <a:bodyPr/>
+          <a:lstStyle/>
+          <a:p>
+            <a:r>
+              <a:rPr lang="en-US" dirty="0">
+                <a:solidFill>
+                  <a:schemeClr val="accent1"/>
+                </a:solidFill>
+              </a:rPr>
+              <a:t>Ensembled Chatbot: classifiers with neural network</a:t>
+            </a:r>
+          </a:p>
+        </p:txBody>
+      </p:sp>
+      <p:sp>
+        <p:nvSpPr>
+          <p:cNvPr id="4" name="Footer Placeholder 3">
+            <a:extLst>
+              <a:ext uri="{FF2B5EF4-FFF2-40B4-BE49-F238E27FC236}">
+                <a16:creationId xmlns:a16="http://schemas.microsoft.com/office/drawing/2014/main" id="{68E9089F-E539-6FB4-7AB9-48C44B1D1C05}"/>
+              </a:ext>
+            </a:extLst>
+          </p:cNvPr>
+          <p:cNvSpPr>
+            <a:spLocks noGrp="1"/>
+          </p:cNvSpPr>
+          <p:nvPr>
+            <p:ph type="ftr" sz="quarter" idx="11"/>
+          </p:nvPr>
+        </p:nvSpPr>
+        <p:spPr/>
+        <p:txBody>
+          <a:bodyPr/>
+          <a:lstStyle/>
+          <a:p>
+            <a:r>
+              <a:rPr lang="en-US"/>
+              <a:t>Syracuse University | School of Information Studies | Jeff Levesque</a:t>
+            </a:r>
+          </a:p>
+        </p:txBody>
+      </p:sp>
+      <p:sp>
+        <p:nvSpPr>
+          <p:cNvPr id="5" name="Slide Number Placeholder 4">
+            <a:extLst>
+              <a:ext uri="{FF2B5EF4-FFF2-40B4-BE49-F238E27FC236}">
+                <a16:creationId xmlns:a16="http://schemas.microsoft.com/office/drawing/2014/main" id="{5A24DB52-4754-4E19-F24F-49AC47526CB9}"/>
+              </a:ext>
+            </a:extLst>
+          </p:cNvPr>
+          <p:cNvSpPr>
+            <a:spLocks noGrp="1"/>
+          </p:cNvSpPr>
+          <p:nvPr>
+            <p:ph type="sldNum" sz="quarter" idx="12"/>
+          </p:nvPr>
+        </p:nvSpPr>
+        <p:spPr/>
+        <p:txBody>
+          <a:bodyPr/>
+          <a:lstStyle/>
+          <a:p>
+            <a:fld id="{853C539F-E86C-6741-9E08-043B79C1FE47}" type="slidenum">
+              <a:rPr lang="en-US" smtClean="0"/>
+              <a:t>10</a:t>
+            </a:fld>
+            <a:endParaRPr lang="en-US"/>
+          </a:p>
+        </p:txBody>
+      </p:sp>
+    </p:spTree>
+    <p:extLst>
+      <p:ext uri="{BB962C8B-B14F-4D97-AF65-F5344CB8AC3E}">
+        <p14:creationId xmlns:p14="http://schemas.microsoft.com/office/powerpoint/2010/main" val="2810723432"/>
+      </p:ext>
+    </p:extLst>
+  </p:cSld>
+  <p:clrMapOvr>
+    <a:masterClrMapping/>
+  </p:clrMapOvr>
+</p:sld>
+</file>
+
+<file path=ppt/slides/slide11.xml><?xml version="1.0" encoding="utf-8"?>
+<p:sld xmlns:a="http://schemas.openxmlformats.org/drawingml/2006/main" xmlns:r="http://schemas.openxmlformats.org/officeDocument/2006/relationships" xmlns:p="http://schemas.openxmlformats.org/presentationml/2006/main">
+  <p:cSld>
+    <p:spTree>
+      <p:nvGrpSpPr>
+        <p:cNvPr id="1" name=""/>
+        <p:cNvGrpSpPr/>
+        <p:nvPr/>
+      </p:nvGrpSpPr>
+      <p:grpSpPr>
+        <a:xfrm>
+          <a:off x="0" y="0"/>
+          <a:ext cx="0" cy="0"/>
+          <a:chOff x="0" y="0"/>
+          <a:chExt cx="0" cy="0"/>
+        </a:xfrm>
+      </p:grpSpPr>
+      <p:sp>
+        <p:nvSpPr>
+          <p:cNvPr id="2" name="Title 1">
+            <a:extLst>
+              <a:ext uri="{FF2B5EF4-FFF2-40B4-BE49-F238E27FC236}">
+                <a16:creationId xmlns:a16="http://schemas.microsoft.com/office/drawing/2014/main" id="{7A977A2E-F923-4FCA-9053-502C9190FAB9}"/>
+              </a:ext>
+            </a:extLst>
+          </p:cNvPr>
+          <p:cNvSpPr>
+            <a:spLocks noGrp="1"/>
+          </p:cNvSpPr>
+          <p:nvPr>
+            <p:ph type="title"/>
+          </p:nvPr>
+        </p:nvSpPr>
+        <p:spPr/>
+        <p:txBody>
+          <a:bodyPr/>
+          <a:lstStyle/>
+          <a:p>
+            <a:r>
+              <a:rPr lang="en-US" dirty="0"/>
+              <a:t>Objective</a:t>
+            </a:r>
+          </a:p>
+        </p:txBody>
+      </p:sp>
+      <p:sp>
+        <p:nvSpPr>
+          <p:cNvPr id="9" name="Content Placeholder 8">
+            <a:extLst>
+              <a:ext uri="{FF2B5EF4-FFF2-40B4-BE49-F238E27FC236}">
+                <a16:creationId xmlns:a16="http://schemas.microsoft.com/office/drawing/2014/main" id="{77EC5C83-6A79-EDD3-412B-1A695722CADC}"/>
+              </a:ext>
+            </a:extLst>
+          </p:cNvPr>
+          <p:cNvSpPr>
+            <a:spLocks noGrp="1"/>
+          </p:cNvSpPr>
+          <p:nvPr>
+            <p:ph idx="1"/>
+          </p:nvPr>
+        </p:nvSpPr>
+        <p:spPr/>
+        <p:txBody>
+          <a:bodyPr>
+            <a:normAutofit/>
+          </a:bodyPr>
+          <a:lstStyle/>
+          <a:p>
+            <a:pPr marL="0" indent="0">
+              <a:buNone/>
+            </a:pPr>
+            <a:r>
+              <a:rPr lang="en-US" sz="1800" dirty="0">
+                <a:solidFill>
+                  <a:schemeClr val="accent1"/>
+                </a:solidFill>
+                <a:effectLst/>
+                <a:latin typeface="Calibri" panose="020F0502020204030204" pitchFamily="34" charset="0"/>
+                <a:ea typeface="Calibri" panose="020F0502020204030204" pitchFamily="34" charset="0"/>
+                <a:cs typeface="Times New Roman" panose="02020603050405020304" pitchFamily="18" charset="0"/>
+              </a:rPr>
+              <a:t>Minimum Requirement</a:t>
+            </a:r>
+          </a:p>
+          <a:p>
+            <a:pPr marL="0" indent="0">
+              <a:buNone/>
+            </a:pPr>
+            <a:r>
+              <a:rPr lang="en-US" sz="1800" dirty="0">
+                <a:effectLst/>
+                <a:latin typeface="Calibri" panose="020F0502020204030204" pitchFamily="34" charset="0"/>
+                <a:ea typeface="Calibri" panose="020F0502020204030204" pitchFamily="34" charset="0"/>
+                <a:cs typeface="Times New Roman" panose="02020603050405020304" pitchFamily="18" charset="0"/>
+              </a:rPr>
+              <a:t>Question Classifier</a:t>
+            </a:r>
+          </a:p>
+          <a:p>
+            <a:pPr marL="0" indent="0">
+              <a:buNone/>
+            </a:pPr>
+            <a:endParaRPr lang="en-US" sz="1800" dirty="0">
+              <a:latin typeface="Calibri" panose="020F0502020204030204" pitchFamily="34" charset="0"/>
+              <a:ea typeface="Calibri" panose="020F0502020204030204" pitchFamily="34" charset="0"/>
+              <a:cs typeface="Times New Roman" panose="02020603050405020304" pitchFamily="18" charset="0"/>
+            </a:endParaRPr>
+          </a:p>
+          <a:p>
+            <a:pPr marL="0" indent="0">
+              <a:buNone/>
+            </a:pPr>
+            <a:r>
+              <a:rPr lang="en-US" sz="1800" dirty="0">
+                <a:solidFill>
+                  <a:schemeClr val="accent1"/>
+                </a:solidFill>
+                <a:effectLst/>
+                <a:latin typeface="Calibri" panose="020F0502020204030204" pitchFamily="34" charset="0"/>
+                <a:ea typeface="Calibri" panose="020F0502020204030204" pitchFamily="34" charset="0"/>
+                <a:cs typeface="Times New Roman" panose="02020603050405020304" pitchFamily="18" charset="0"/>
+              </a:rPr>
+              <a:t>Desired Goal</a:t>
+            </a:r>
+          </a:p>
+          <a:p>
+            <a:pPr marL="0" indent="0">
+              <a:buNone/>
+            </a:pPr>
+            <a:r>
+              <a:rPr lang="en-US" sz="1800" dirty="0">
+                <a:effectLst/>
+                <a:latin typeface="Calibri" panose="020F0502020204030204" pitchFamily="34" charset="0"/>
+                <a:ea typeface="Calibri" panose="020F0502020204030204" pitchFamily="34" charset="0"/>
+                <a:cs typeface="Times New Roman" panose="02020603050405020304" pitchFamily="18" charset="0"/>
+              </a:rPr>
+              <a:t>Question Classifier </a:t>
+            </a:r>
+            <a:r>
+              <a:rPr lang="en-US" sz="1800" dirty="0">
+                <a:effectLst/>
+                <a:latin typeface="Calibri" panose="020F0502020204030204" pitchFamily="34" charset="0"/>
+                <a:ea typeface="Calibri" panose="020F0502020204030204" pitchFamily="34" charset="0"/>
+                <a:cs typeface="Times New Roman" panose="02020603050405020304" pitchFamily="18" charset="0"/>
+                <a:sym typeface="Wingdings" pitchFamily="2" charset="2"/>
+              </a:rPr>
+              <a:t></a:t>
+            </a:r>
+            <a:r>
+              <a:rPr lang="en-US" sz="1800" dirty="0">
+                <a:effectLst/>
+                <a:latin typeface="Calibri" panose="020F0502020204030204" pitchFamily="34" charset="0"/>
+                <a:ea typeface="Calibri" panose="020F0502020204030204" pitchFamily="34" charset="0"/>
+                <a:cs typeface="Times New Roman" panose="02020603050405020304" pitchFamily="18" charset="0"/>
+              </a:rPr>
+              <a:t> Topic Classifier </a:t>
+            </a:r>
+            <a:r>
+              <a:rPr lang="en-US" sz="1800" dirty="0">
+                <a:solidFill>
+                  <a:schemeClr val="bg1">
+                    <a:lumMod val="85000"/>
+                  </a:schemeClr>
+                </a:solidFill>
+                <a:effectLst/>
+                <a:latin typeface="Calibri" panose="020F0502020204030204" pitchFamily="34" charset="0"/>
+                <a:ea typeface="Calibri" panose="020F0502020204030204" pitchFamily="34" charset="0"/>
+                <a:cs typeface="Times New Roman" panose="02020603050405020304" pitchFamily="18" charset="0"/>
+                <a:sym typeface="Wingdings" pitchFamily="2" charset="2"/>
+              </a:rPr>
+              <a:t></a:t>
+            </a:r>
+            <a:r>
+              <a:rPr lang="en-US" sz="1800" dirty="0">
+                <a:solidFill>
+                  <a:schemeClr val="bg1">
+                    <a:lumMod val="85000"/>
+                  </a:schemeClr>
+                </a:solidFill>
+                <a:effectLst/>
+                <a:latin typeface="Calibri" panose="020F0502020204030204" pitchFamily="34" charset="0"/>
+                <a:ea typeface="Calibri" panose="020F0502020204030204" pitchFamily="34" charset="0"/>
+                <a:cs typeface="Times New Roman" panose="02020603050405020304" pitchFamily="18" charset="0"/>
+              </a:rPr>
+              <a:t> Sub Topic Classifier </a:t>
+            </a:r>
+            <a:r>
+              <a:rPr lang="en-US" sz="1800" dirty="0">
+                <a:effectLst/>
+                <a:latin typeface="Calibri" panose="020F0502020204030204" pitchFamily="34" charset="0"/>
+                <a:ea typeface="Calibri" panose="020F0502020204030204" pitchFamily="34" charset="0"/>
+                <a:cs typeface="Times New Roman" panose="02020603050405020304" pitchFamily="18" charset="0"/>
+                <a:sym typeface="Wingdings" pitchFamily="2" charset="2"/>
+              </a:rPr>
+              <a:t></a:t>
+            </a:r>
+            <a:r>
+              <a:rPr lang="en-US" sz="1800" dirty="0">
+                <a:effectLst/>
+                <a:latin typeface="Calibri" panose="020F0502020204030204" pitchFamily="34" charset="0"/>
+                <a:ea typeface="Calibri" panose="020F0502020204030204" pitchFamily="34" charset="0"/>
+                <a:cs typeface="Times New Roman" panose="02020603050405020304" pitchFamily="18" charset="0"/>
+              </a:rPr>
+              <a:t> Specialized RNN/NMT</a:t>
+            </a:r>
+          </a:p>
+          <a:p>
+            <a:pPr marL="0" indent="0">
+              <a:buNone/>
+            </a:pPr>
+            <a:endParaRPr lang="en-US" sz="1800" dirty="0">
+              <a:latin typeface="Calibri" panose="020F0502020204030204" pitchFamily="34" charset="0"/>
+              <a:ea typeface="Calibri" panose="020F0502020204030204" pitchFamily="34" charset="0"/>
+              <a:cs typeface="Times New Roman" panose="02020603050405020304" pitchFamily="18" charset="0"/>
+            </a:endParaRPr>
+          </a:p>
+          <a:p>
+            <a:pPr marL="0" indent="0">
+              <a:buNone/>
+            </a:pPr>
+            <a:r>
+              <a:rPr lang="en-US" sz="1800" dirty="0">
+                <a:solidFill>
+                  <a:schemeClr val="accent1"/>
+                </a:solidFill>
+                <a:effectLst/>
+                <a:latin typeface="Calibri" panose="020F0502020204030204" pitchFamily="34" charset="0"/>
+                <a:ea typeface="Calibri" panose="020F0502020204030204" pitchFamily="34" charset="0"/>
+                <a:cs typeface="Times New Roman" panose="02020603050405020304" pitchFamily="18" charset="0"/>
+              </a:rPr>
+              <a:t>Obtained Goal</a:t>
+            </a:r>
+          </a:p>
+          <a:p>
+            <a:pPr marL="0" indent="0">
+              <a:buNone/>
+            </a:pPr>
+            <a:r>
+              <a:rPr lang="en-US" sz="1800" dirty="0">
+                <a:effectLst/>
+                <a:latin typeface="Calibri" panose="020F0502020204030204" pitchFamily="34" charset="0"/>
+                <a:ea typeface="Calibri" panose="020F0502020204030204" pitchFamily="34" charset="0"/>
+                <a:cs typeface="Times New Roman" panose="02020603050405020304" pitchFamily="18" charset="0"/>
+              </a:rPr>
+              <a:t>Question Classifier </a:t>
+            </a:r>
+            <a:r>
+              <a:rPr lang="en-US" sz="1800" dirty="0">
+                <a:effectLst/>
+                <a:latin typeface="Calibri" panose="020F0502020204030204" pitchFamily="34" charset="0"/>
+                <a:ea typeface="Calibri" panose="020F0502020204030204" pitchFamily="34" charset="0"/>
+                <a:cs typeface="Times New Roman" panose="02020603050405020304" pitchFamily="18" charset="0"/>
+                <a:sym typeface="Wingdings" pitchFamily="2" charset="2"/>
+              </a:rPr>
+              <a:t></a:t>
+            </a:r>
+            <a:r>
+              <a:rPr lang="en-US" sz="1800" dirty="0">
+                <a:effectLst/>
+                <a:latin typeface="Calibri" panose="020F0502020204030204" pitchFamily="34" charset="0"/>
+                <a:ea typeface="Calibri" panose="020F0502020204030204" pitchFamily="34" charset="0"/>
+                <a:cs typeface="Times New Roman" panose="02020603050405020304" pitchFamily="18" charset="0"/>
+              </a:rPr>
+              <a:t> Topic Classifier </a:t>
+            </a:r>
+            <a:r>
+              <a:rPr lang="en-US" sz="1800" dirty="0">
+                <a:solidFill>
+                  <a:schemeClr val="bg1">
+                    <a:lumMod val="65000"/>
+                  </a:schemeClr>
+                </a:solidFill>
+                <a:effectLst/>
+                <a:latin typeface="Calibri" panose="020F0502020204030204" pitchFamily="34" charset="0"/>
+                <a:ea typeface="Calibri" panose="020F0502020204030204" pitchFamily="34" charset="0"/>
+                <a:cs typeface="Times New Roman" panose="02020603050405020304" pitchFamily="18" charset="0"/>
+                <a:sym typeface="Wingdings" pitchFamily="2" charset="2"/>
+              </a:rPr>
+              <a:t></a:t>
+            </a:r>
+            <a:r>
+              <a:rPr lang="en-US" sz="1800" dirty="0">
+                <a:solidFill>
+                  <a:schemeClr val="bg1">
+                    <a:lumMod val="65000"/>
+                  </a:schemeClr>
+                </a:solidFill>
+                <a:effectLst/>
+                <a:latin typeface="Calibri" panose="020F0502020204030204" pitchFamily="34" charset="0"/>
+                <a:ea typeface="Calibri" panose="020F0502020204030204" pitchFamily="34" charset="0"/>
+                <a:cs typeface="Times New Roman" panose="02020603050405020304" pitchFamily="18" charset="0"/>
+              </a:rPr>
+              <a:t> Specialized RNN/NMT</a:t>
+            </a:r>
+          </a:p>
+          <a:p>
+            <a:pPr marL="0" indent="0">
+              <a:buNone/>
+            </a:pPr>
+            <a:endParaRPr lang="en-US" sz="1800" dirty="0">
+              <a:effectLst/>
+              <a:latin typeface="Calibri" panose="020F0502020204030204" pitchFamily="34" charset="0"/>
+              <a:ea typeface="Calibri" panose="020F0502020204030204" pitchFamily="34" charset="0"/>
+              <a:cs typeface="Times New Roman" panose="02020603050405020304" pitchFamily="18" charset="0"/>
+            </a:endParaRPr>
+          </a:p>
+        </p:txBody>
+      </p:sp>
+      <p:sp>
+        <p:nvSpPr>
+          <p:cNvPr id="4" name="Footer Placeholder 3">
+            <a:extLst>
+              <a:ext uri="{FF2B5EF4-FFF2-40B4-BE49-F238E27FC236}">
+                <a16:creationId xmlns:a16="http://schemas.microsoft.com/office/drawing/2014/main" id="{3B2A24F1-5DBE-8B40-C915-7BC0518AA7B9}"/>
+              </a:ext>
+            </a:extLst>
+          </p:cNvPr>
+          <p:cNvSpPr>
+            <a:spLocks noGrp="1"/>
+          </p:cNvSpPr>
+          <p:nvPr>
+            <p:ph type="ftr" sz="quarter" idx="11"/>
+          </p:nvPr>
+        </p:nvSpPr>
+        <p:spPr/>
+        <p:txBody>
+          <a:bodyPr/>
+          <a:lstStyle/>
+          <a:p>
+            <a:r>
+              <a:rPr lang="en-US"/>
+              <a:t>Syracuse University | School of Information Studies | Jeff Levesque</a:t>
+            </a:r>
+          </a:p>
+        </p:txBody>
+      </p:sp>
+      <p:sp>
+        <p:nvSpPr>
+          <p:cNvPr id="5" name="Slide Number Placeholder 4">
+            <a:extLst>
+              <a:ext uri="{FF2B5EF4-FFF2-40B4-BE49-F238E27FC236}">
+                <a16:creationId xmlns:a16="http://schemas.microsoft.com/office/drawing/2014/main" id="{1AFE846D-6173-EBDF-AF2C-E9874C5D44A1}"/>
+              </a:ext>
+            </a:extLst>
+          </p:cNvPr>
+          <p:cNvSpPr>
+            <a:spLocks noGrp="1"/>
+          </p:cNvSpPr>
+          <p:nvPr>
+            <p:ph type="sldNum" sz="quarter" idx="12"/>
+          </p:nvPr>
+        </p:nvSpPr>
+        <p:spPr/>
+        <p:txBody>
+          <a:bodyPr/>
+          <a:lstStyle/>
+          <a:p>
+            <a:fld id="{853C539F-E86C-6741-9E08-043B79C1FE47}" type="slidenum">
+              <a:rPr lang="en-US" smtClean="0"/>
+              <a:t>11</a:t>
+            </a:fld>
+            <a:endParaRPr lang="en-US"/>
+          </a:p>
+        </p:txBody>
+      </p:sp>
+    </p:spTree>
+    <p:extLst>
+      <p:ext uri="{BB962C8B-B14F-4D97-AF65-F5344CB8AC3E}">
+        <p14:creationId xmlns:p14="http://schemas.microsoft.com/office/powerpoint/2010/main" val="992256326"/>
+      </p:ext>
+    </p:extLst>
+  </p:cSld>
+  <p:clrMapOvr>
+    <a:masterClrMapping/>
+  </p:clrMapOvr>
+</p:sld>
+</file>
+
+<file path=ppt/slides/slide12.xml><?xml version="1.0" encoding="utf-8"?>
+<p:sld xmlns:a="http://schemas.openxmlformats.org/drawingml/2006/main" xmlns:r="http://schemas.openxmlformats.org/officeDocument/2006/relationships" xmlns:p="http://schemas.openxmlformats.org/presentationml/2006/main">
+  <p:cSld>
+    <p:spTree>
+      <p:nvGrpSpPr>
+        <p:cNvPr id="1" name=""/>
+        <p:cNvGrpSpPr/>
+        <p:nvPr/>
+      </p:nvGrpSpPr>
+      <p:grpSpPr>
+        <a:xfrm>
+          <a:off x="0" y="0"/>
+          <a:ext cx="0" cy="0"/>
+          <a:chOff x="0" y="0"/>
+          <a:chExt cx="0" cy="0"/>
+        </a:xfrm>
+      </p:grpSpPr>
+      <p:sp>
+        <p:nvSpPr>
+          <p:cNvPr id="2" name="Title 1">
+            <a:extLst>
+              <a:ext uri="{FF2B5EF4-FFF2-40B4-BE49-F238E27FC236}">
+                <a16:creationId xmlns:a16="http://schemas.microsoft.com/office/drawing/2014/main" id="{0D387D4E-3858-5CF2-5D32-CC02DB355186}"/>
+              </a:ext>
+            </a:extLst>
+          </p:cNvPr>
+          <p:cNvSpPr>
+            <a:spLocks noGrp="1"/>
+          </p:cNvSpPr>
+          <p:nvPr>
+            <p:ph type="title"/>
+          </p:nvPr>
+        </p:nvSpPr>
+        <p:spPr/>
+        <p:txBody>
+          <a:bodyPr/>
+          <a:lstStyle/>
+          <a:p>
+            <a:r>
+              <a:rPr lang="en-US" dirty="0"/>
+              <a:t>Portfolio: Dataset</a:t>
+            </a:r>
+          </a:p>
+        </p:txBody>
+      </p:sp>
+      <p:sp>
+        <p:nvSpPr>
+          <p:cNvPr id="3" name="Content Placeholder 2">
+            <a:extLst>
+              <a:ext uri="{FF2B5EF4-FFF2-40B4-BE49-F238E27FC236}">
+                <a16:creationId xmlns:a16="http://schemas.microsoft.com/office/drawing/2014/main" id="{864FB755-A1E5-68E4-5EA8-DCA6EA044E0A}"/>
+              </a:ext>
+            </a:extLst>
+          </p:cNvPr>
+          <p:cNvSpPr>
+            <a:spLocks noGrp="1"/>
+          </p:cNvSpPr>
+          <p:nvPr>
+            <p:ph idx="1"/>
+          </p:nvPr>
+        </p:nvSpPr>
+        <p:spPr/>
+        <p:txBody>
+          <a:bodyPr>
+            <a:normAutofit lnSpcReduction="10000"/>
+          </a:bodyPr>
+          <a:lstStyle/>
+          <a:p>
+            <a:pPr marL="342900" marR="0" lvl="0" indent="-342900">
+              <a:lnSpc>
+                <a:spcPct val="107000"/>
+              </a:lnSpc>
+              <a:spcBef>
+                <a:spcPts val="0"/>
+              </a:spcBef>
+              <a:spcAft>
+                <a:spcPts val="0"/>
+              </a:spcAft>
+              <a:buFont typeface="Wingdings" pitchFamily="2" charset="2"/>
+              <a:buChar char=""/>
+            </a:pPr>
+            <a:r>
+              <a:rPr lang="en-US" sz="1800" dirty="0" err="1">
+                <a:effectLst/>
+                <a:latin typeface="Calibri" panose="020F0502020204030204" pitchFamily="34" charset="0"/>
+                <a:ea typeface="Calibri" panose="020F0502020204030204" pitchFamily="34" charset="0"/>
+                <a:cs typeface="Times New Roman" panose="02020603050405020304" pitchFamily="18" charset="0"/>
+              </a:rPr>
+              <a:t>QuestionAnswerCMU</a:t>
+            </a:r>
+            <a:r>
+              <a:rPr lang="en-US" sz="1800" dirty="0">
+                <a:effectLst/>
+                <a:latin typeface="Calibri" panose="020F0502020204030204" pitchFamily="34" charset="0"/>
+                <a:ea typeface="Calibri" panose="020F0502020204030204" pitchFamily="34" charset="0"/>
+                <a:cs typeface="Times New Roman" panose="02020603050405020304" pitchFamily="18" charset="0"/>
+              </a:rPr>
+              <a:t>: question-answer pair to train question classifier</a:t>
+            </a:r>
+          </a:p>
+          <a:p>
+            <a:pPr marL="873252" lvl="1" indent="-342900">
+              <a:lnSpc>
+                <a:spcPct val="107000"/>
+              </a:lnSpc>
+              <a:spcBef>
+                <a:spcPts val="0"/>
+              </a:spcBef>
+              <a:spcAft>
+                <a:spcPts val="0"/>
+              </a:spcAft>
+              <a:buFont typeface="Wingdings" pitchFamily="2" charset="2"/>
+              <a:buChar char=""/>
+            </a:pPr>
+            <a:r>
+              <a:rPr lang="en-US" sz="1800" dirty="0">
+                <a:effectLst/>
+                <a:latin typeface="Calibri" panose="020F0502020204030204" pitchFamily="34" charset="0"/>
+                <a:ea typeface="Calibri" panose="020F0502020204030204" pitchFamily="34" charset="0"/>
+                <a:cs typeface="Times New Roman" panose="02020603050405020304" pitchFamily="18" charset="0"/>
+              </a:rPr>
+              <a:t>Used entire NSF Graduate Research Fellowship Carnegie Mellow University dataset</a:t>
+            </a:r>
+          </a:p>
+          <a:p>
+            <a:pPr marL="1330452" lvl="2" indent="-342900">
+              <a:lnSpc>
+                <a:spcPct val="107000"/>
+              </a:lnSpc>
+              <a:spcBef>
+                <a:spcPts val="0"/>
+              </a:spcBef>
+              <a:spcAft>
+                <a:spcPts val="0"/>
+              </a:spcAft>
+              <a:buFont typeface="Wingdings" pitchFamily="2" charset="2"/>
+              <a:buChar char=""/>
+            </a:pPr>
+            <a:r>
+              <a:rPr lang="en-US" sz="1600" dirty="0">
+                <a:effectLst/>
+                <a:latin typeface="Calibri" panose="020F0502020204030204" pitchFamily="34" charset="0"/>
+                <a:ea typeface="Calibri" panose="020F0502020204030204" pitchFamily="34" charset="0"/>
+                <a:cs typeface="Times New Roman" panose="02020603050405020304" pitchFamily="18" charset="0"/>
+              </a:rPr>
+              <a:t>dataset with question and answer columns</a:t>
+            </a:r>
+          </a:p>
+          <a:p>
+            <a:pPr marL="342900" marR="0" lvl="0" indent="-342900">
+              <a:lnSpc>
+                <a:spcPct val="107000"/>
+              </a:lnSpc>
+              <a:spcBef>
+                <a:spcPts val="0"/>
+              </a:spcBef>
+              <a:spcAft>
+                <a:spcPts val="800"/>
+              </a:spcAft>
+              <a:buFont typeface="Wingdings" pitchFamily="2" charset="2"/>
+              <a:buChar char=""/>
+            </a:pPr>
+            <a:r>
+              <a:rPr lang="en-US" sz="1800" dirty="0" err="1">
+                <a:effectLst/>
+                <a:latin typeface="Calibri" panose="020F0502020204030204" pitchFamily="34" charset="0"/>
+                <a:ea typeface="Calibri" panose="020F0502020204030204" pitchFamily="34" charset="0"/>
+                <a:cs typeface="Times New Roman" panose="02020603050405020304" pitchFamily="18" charset="0"/>
+              </a:rPr>
+              <a:t>StackOverflow</a:t>
+            </a:r>
+            <a:r>
+              <a:rPr lang="en-US" sz="1800" dirty="0">
+                <a:effectLst/>
+                <a:latin typeface="Calibri" panose="020F0502020204030204" pitchFamily="34" charset="0"/>
+                <a:ea typeface="Calibri" panose="020F0502020204030204" pitchFamily="34" charset="0"/>
+                <a:cs typeface="Times New Roman" panose="02020603050405020304" pitchFamily="18" charset="0"/>
+              </a:rPr>
+              <a:t>: list of postings grouped by channels used to train classifier to label questions</a:t>
+            </a:r>
+          </a:p>
+          <a:p>
+            <a:pPr marL="873252" lvl="1" indent="-342900">
+              <a:lnSpc>
+                <a:spcPct val="107000"/>
+              </a:lnSpc>
+              <a:spcBef>
+                <a:spcPts val="0"/>
+              </a:spcBef>
+              <a:spcAft>
+                <a:spcPts val="800"/>
+              </a:spcAft>
+              <a:buFont typeface="Wingdings" pitchFamily="2" charset="2"/>
+              <a:buChar char=""/>
+            </a:pPr>
+            <a:r>
+              <a:rPr lang="en-US" sz="1800" dirty="0">
+                <a:effectLst/>
+                <a:latin typeface="Calibri" panose="020F0502020204030204" pitchFamily="34" charset="0"/>
+                <a:ea typeface="Calibri" panose="020F0502020204030204" pitchFamily="34" charset="0"/>
+                <a:cs typeface="Times New Roman" panose="02020603050405020304" pitchFamily="18" charset="0"/>
+              </a:rPr>
+              <a:t>original dataset 75GB reduced to 200MB</a:t>
+            </a:r>
+          </a:p>
+          <a:p>
+            <a:pPr marL="1330452" lvl="2" indent="-342900">
+              <a:lnSpc>
+                <a:spcPct val="107000"/>
+              </a:lnSpc>
+              <a:spcBef>
+                <a:spcPts val="0"/>
+              </a:spcBef>
+              <a:spcAft>
+                <a:spcPts val="800"/>
+              </a:spcAft>
+              <a:buFont typeface="+mj-lt"/>
+              <a:buAutoNum type="arabicPeriod"/>
+            </a:pPr>
+            <a:r>
+              <a:rPr lang="en-US" sz="1600" dirty="0">
+                <a:latin typeface="Calibri" panose="020F0502020204030204" pitchFamily="34" charset="0"/>
+                <a:cs typeface="Times New Roman" panose="02020603050405020304" pitchFamily="18" charset="0"/>
+              </a:rPr>
+              <a:t>filter only verified answer posts</a:t>
+            </a:r>
+          </a:p>
+          <a:p>
+            <a:pPr marL="1330452" lvl="2" indent="-342900">
+              <a:lnSpc>
+                <a:spcPct val="107000"/>
+              </a:lnSpc>
+              <a:spcBef>
+                <a:spcPts val="0"/>
+              </a:spcBef>
+              <a:spcAft>
+                <a:spcPts val="800"/>
+              </a:spcAft>
+              <a:buFont typeface="+mj-lt"/>
+              <a:buAutoNum type="arabicPeriod"/>
+            </a:pPr>
+            <a:r>
+              <a:rPr lang="en-US" sz="1600" dirty="0">
+                <a:latin typeface="Calibri" panose="020F0502020204030204" pitchFamily="34" charset="0"/>
+                <a:cs typeface="Times New Roman" panose="02020603050405020304" pitchFamily="18" charset="0"/>
+              </a:rPr>
+              <a:t>filter top 10 channels</a:t>
+            </a:r>
+          </a:p>
+          <a:p>
+            <a:pPr marL="1330452" lvl="2" indent="-342900">
+              <a:lnSpc>
+                <a:spcPct val="107000"/>
+              </a:lnSpc>
+              <a:spcBef>
+                <a:spcPts val="0"/>
+              </a:spcBef>
+              <a:spcAft>
+                <a:spcPts val="800"/>
+              </a:spcAft>
+              <a:buFont typeface="+mj-lt"/>
+              <a:buAutoNum type="arabicPeriod"/>
+            </a:pPr>
+            <a:r>
+              <a:rPr lang="en-US" sz="1600" dirty="0">
+                <a:latin typeface="Calibri" panose="020F0502020204030204" pitchFamily="34" charset="0"/>
+                <a:cs typeface="Times New Roman" panose="02020603050405020304" pitchFamily="18" charset="0"/>
+              </a:rPr>
+              <a:t>Sample 20% remaining</a:t>
+            </a:r>
+          </a:p>
+          <a:p>
+            <a:pPr marL="342900" marR="0" lvl="0" indent="-342900">
+              <a:lnSpc>
+                <a:spcPct val="107000"/>
+              </a:lnSpc>
+              <a:spcBef>
+                <a:spcPts val="0"/>
+              </a:spcBef>
+              <a:spcAft>
+                <a:spcPts val="0"/>
+              </a:spcAft>
+              <a:buFont typeface="Wingdings" pitchFamily="2" charset="2"/>
+              <a:buChar char=""/>
+            </a:pPr>
+            <a:r>
+              <a:rPr lang="en-US" sz="1800" dirty="0">
+                <a:effectLst/>
+                <a:latin typeface="Calibri" panose="020F0502020204030204" pitchFamily="34" charset="0"/>
+                <a:ea typeface="Calibri" panose="020F0502020204030204" pitchFamily="34" charset="0"/>
+                <a:cs typeface="Times New Roman" panose="02020603050405020304" pitchFamily="18" charset="0"/>
+              </a:rPr>
+              <a:t>Reddit: </a:t>
+            </a:r>
+            <a:r>
+              <a:rPr lang="en-US" sz="1800" dirty="0" err="1">
+                <a:effectLst/>
+                <a:latin typeface="Calibri" panose="020F0502020204030204" pitchFamily="34" charset="0"/>
+                <a:ea typeface="Calibri" panose="020F0502020204030204" pitchFamily="34" charset="0"/>
+                <a:cs typeface="Times New Roman" panose="02020603050405020304" pitchFamily="18" charset="0"/>
+              </a:rPr>
+              <a:t>json</a:t>
+            </a:r>
+            <a:r>
+              <a:rPr lang="en-US" sz="1800" dirty="0">
+                <a:effectLst/>
+                <a:latin typeface="Calibri" panose="020F0502020204030204" pitchFamily="34" charset="0"/>
+                <a:ea typeface="Calibri" panose="020F0502020204030204" pitchFamily="34" charset="0"/>
+                <a:cs typeface="Times New Roman" panose="02020603050405020304" pitchFamily="18" charset="0"/>
+              </a:rPr>
+              <a:t> data used to train RNN based NMT chat agent</a:t>
+            </a:r>
+          </a:p>
+          <a:p>
+            <a:pPr marL="873252" lvl="1" indent="-342900">
+              <a:lnSpc>
+                <a:spcPct val="107000"/>
+              </a:lnSpc>
+              <a:spcBef>
+                <a:spcPts val="0"/>
+              </a:spcBef>
+              <a:spcAft>
+                <a:spcPts val="0"/>
+              </a:spcAft>
+              <a:buFont typeface="Wingdings" pitchFamily="2" charset="2"/>
+              <a:buChar char=""/>
+            </a:pPr>
+            <a:r>
+              <a:rPr lang="en-US" sz="1800" dirty="0">
+                <a:effectLst/>
+                <a:latin typeface="Calibri" panose="020F0502020204030204" pitchFamily="34" charset="0"/>
+                <a:ea typeface="Calibri" panose="020F0502020204030204" pitchFamily="34" charset="0"/>
+                <a:cs typeface="Times New Roman" panose="02020603050405020304" pitchFamily="18" charset="0"/>
+              </a:rPr>
+              <a:t>one mont</a:t>
+            </a:r>
+            <a:r>
+              <a:rPr lang="en-US" sz="1800" dirty="0">
+                <a:latin typeface="Calibri" panose="020F0502020204030204" pitchFamily="34" charset="0"/>
+                <a:ea typeface="Calibri" panose="020F0502020204030204" pitchFamily="34" charset="0"/>
+                <a:cs typeface="Times New Roman" panose="02020603050405020304" pitchFamily="18" charset="0"/>
+              </a:rPr>
+              <a:t>h (12/2005) of reddit data (12/2005 – 05/2006 available)</a:t>
+            </a:r>
+          </a:p>
+          <a:p>
+            <a:pPr marL="873252" lvl="1" indent="-342900">
+              <a:lnSpc>
+                <a:spcPct val="107000"/>
+              </a:lnSpc>
+              <a:spcBef>
+                <a:spcPts val="0"/>
+              </a:spcBef>
+              <a:spcAft>
+                <a:spcPts val="0"/>
+              </a:spcAft>
+              <a:buFont typeface="Wingdings" pitchFamily="2" charset="2"/>
+              <a:buChar char=""/>
+            </a:pPr>
+            <a:r>
+              <a:rPr lang="en-US" sz="1800" dirty="0" err="1">
+                <a:effectLst/>
+                <a:latin typeface="Calibri" panose="020F0502020204030204" pitchFamily="34" charset="0"/>
+                <a:ea typeface="Calibri" panose="020F0502020204030204" pitchFamily="34" charset="0"/>
+                <a:cs typeface="Times New Roman" panose="02020603050405020304" pitchFamily="18" charset="0"/>
+              </a:rPr>
+              <a:t>mapreduce</a:t>
+            </a:r>
+            <a:r>
+              <a:rPr lang="en-US" sz="1800" dirty="0">
+                <a:effectLst/>
+                <a:latin typeface="Calibri" panose="020F0502020204030204" pitchFamily="34" charset="0"/>
+                <a:ea typeface="Calibri" panose="020F0502020204030204" pitchFamily="34" charset="0"/>
+                <a:cs typeface="Times New Roman" panose="02020603050405020304" pitchFamily="18" charset="0"/>
+              </a:rPr>
+              <a:t> every comment id with parent comment id</a:t>
+            </a:r>
+          </a:p>
+        </p:txBody>
+      </p:sp>
+      <p:sp>
+        <p:nvSpPr>
+          <p:cNvPr id="4" name="Footer Placeholder 3">
+            <a:extLst>
+              <a:ext uri="{FF2B5EF4-FFF2-40B4-BE49-F238E27FC236}">
+                <a16:creationId xmlns:a16="http://schemas.microsoft.com/office/drawing/2014/main" id="{A418A92B-B541-AAF0-104D-DFB835AD0BA1}"/>
+              </a:ext>
+            </a:extLst>
+          </p:cNvPr>
+          <p:cNvSpPr>
+            <a:spLocks noGrp="1"/>
+          </p:cNvSpPr>
+          <p:nvPr>
+            <p:ph type="ftr" sz="quarter" idx="11"/>
+          </p:nvPr>
+        </p:nvSpPr>
+        <p:spPr/>
+        <p:txBody>
+          <a:bodyPr/>
+          <a:lstStyle/>
+          <a:p>
+            <a:r>
+              <a:rPr lang="en-US"/>
+              <a:t>Syracuse University | School of Information Studies | Jeff Levesque</a:t>
+            </a:r>
+          </a:p>
+        </p:txBody>
+      </p:sp>
+      <p:sp>
+        <p:nvSpPr>
+          <p:cNvPr id="5" name="Slide Number Placeholder 4">
+            <a:extLst>
+              <a:ext uri="{FF2B5EF4-FFF2-40B4-BE49-F238E27FC236}">
+                <a16:creationId xmlns:a16="http://schemas.microsoft.com/office/drawing/2014/main" id="{400ACF2F-E9DA-4F9E-7716-B12BCF5CE422}"/>
+              </a:ext>
+            </a:extLst>
+          </p:cNvPr>
+          <p:cNvSpPr>
+            <a:spLocks noGrp="1"/>
+          </p:cNvSpPr>
+          <p:nvPr>
+            <p:ph type="sldNum" sz="quarter" idx="12"/>
+          </p:nvPr>
+        </p:nvSpPr>
+        <p:spPr/>
+        <p:txBody>
+          <a:bodyPr/>
+          <a:lstStyle/>
+          <a:p>
+            <a:fld id="{853C539F-E86C-6741-9E08-043B79C1FE47}" type="slidenum">
+              <a:rPr lang="en-US" smtClean="0"/>
+              <a:t>12</a:t>
+            </a:fld>
+            <a:endParaRPr lang="en-US"/>
+          </a:p>
+        </p:txBody>
+      </p:sp>
+    </p:spTree>
+    <p:extLst>
+      <p:ext uri="{BB962C8B-B14F-4D97-AF65-F5344CB8AC3E}">
+        <p14:creationId xmlns:p14="http://schemas.microsoft.com/office/powerpoint/2010/main" val="2093980056"/>
+      </p:ext>
+    </p:extLst>
+  </p:cSld>
+  <p:clrMapOvr>
+    <a:masterClrMapping/>
+  </p:clrMapOvr>
+</p:sld>
+</file>
+
+<file path=ppt/slides/slide13.xml><?xml version="1.0" encoding="utf-8"?>
+<p:sld xmlns:a="http://schemas.openxmlformats.org/drawingml/2006/main" xmlns:r="http://schemas.openxmlformats.org/officeDocument/2006/relationships" xmlns:p="http://schemas.openxmlformats.org/presentationml/2006/main">
+  <p:cSld>
+    <p:spTree>
+      <p:nvGrpSpPr>
+        <p:cNvPr id="1" name=""/>
+        <p:cNvGrpSpPr/>
+        <p:nvPr/>
+      </p:nvGrpSpPr>
+      <p:grpSpPr>
+        <a:xfrm>
+          <a:off x="0" y="0"/>
+          <a:ext cx="0" cy="0"/>
+          <a:chOff x="0" y="0"/>
+          <a:chExt cx="0" cy="0"/>
+        </a:xfrm>
+      </p:grpSpPr>
+      <p:sp>
+        <p:nvSpPr>
+          <p:cNvPr id="2" name="Title 1">
+            <a:extLst>
+              <a:ext uri="{FF2B5EF4-FFF2-40B4-BE49-F238E27FC236}">
+                <a16:creationId xmlns:a16="http://schemas.microsoft.com/office/drawing/2014/main" id="{F3426936-B124-334E-51E0-CADD097C552D}"/>
+              </a:ext>
+            </a:extLst>
+          </p:cNvPr>
+          <p:cNvSpPr>
+            <a:spLocks noGrp="1"/>
+          </p:cNvSpPr>
+          <p:nvPr>
+            <p:ph type="title"/>
+          </p:nvPr>
+        </p:nvSpPr>
+        <p:spPr/>
+        <p:txBody>
+          <a:bodyPr/>
+          <a:lstStyle/>
+          <a:p>
+            <a:r>
+              <a:rPr lang="en-US" dirty="0"/>
+              <a:t>Classifier: question-answer</a:t>
+            </a:r>
+          </a:p>
+        </p:txBody>
+      </p:sp>
+      <p:pic>
+        <p:nvPicPr>
+          <p:cNvPr id="6" name="Content Placeholder 5" descr="C:\Users\jeff1\AppData\Local\Microsoft\Windows\INetCache\Content.MSO\C1B1B730.tmp">
+            <a:extLst>
+              <a:ext uri="{FF2B5EF4-FFF2-40B4-BE49-F238E27FC236}">
+                <a16:creationId xmlns:a16="http://schemas.microsoft.com/office/drawing/2014/main" id="{EDC5A59F-892D-E146-7E11-11D6F66E50C2}"/>
+              </a:ext>
+            </a:extLst>
+          </p:cNvPr>
+          <p:cNvPicPr>
+            <a:picLocks noGrp="1" noChangeAspect="1"/>
+          </p:cNvPicPr>
+          <p:nvPr>
+            <p:ph sz="half" idx="1"/>
+          </p:nvPr>
+        </p:nvPicPr>
+        <p:blipFill>
+          <a:blip r:embed="rId2">
+            <a:extLst>
+              <a:ext uri="{28A0092B-C50C-407E-A947-70E740481C1C}">
+                <a14:useLocalDpi xmlns:a14="http://schemas.microsoft.com/office/drawing/2010/main" val="0"/>
+              </a:ext>
+            </a:extLst>
+          </a:blip>
+          <a:stretch>
+            <a:fillRect/>
+          </a:stretch>
+        </p:blipFill>
+        <p:spPr bwMode="auto">
+          <a:xfrm>
+            <a:off x="1525587" y="2298700"/>
+            <a:ext cx="4140200" cy="3556000"/>
+          </a:xfrm>
+          <a:prstGeom prst="rect">
+            <a:avLst/>
+          </a:prstGeom>
+          <a:noFill/>
+          <a:ln>
+            <a:noFill/>
+          </a:ln>
+        </p:spPr>
+      </p:pic>
+      <p:sp>
+        <p:nvSpPr>
+          <p:cNvPr id="7" name="Content Placeholder 6">
+            <a:extLst>
+              <a:ext uri="{FF2B5EF4-FFF2-40B4-BE49-F238E27FC236}">
+                <a16:creationId xmlns:a16="http://schemas.microsoft.com/office/drawing/2014/main" id="{E404F43D-8DDD-1AC7-F0DE-6180D1B0140E}"/>
+              </a:ext>
+            </a:extLst>
+          </p:cNvPr>
+          <p:cNvSpPr>
+            <a:spLocks noGrp="1"/>
+          </p:cNvSpPr>
+          <p:nvPr>
+            <p:ph sz="half" idx="2"/>
+          </p:nvPr>
+        </p:nvSpPr>
+        <p:spPr/>
+        <p:txBody>
+          <a:bodyPr/>
+          <a:lstStyle/>
+          <a:p>
+            <a:pPr marL="0" indent="0">
+              <a:buNone/>
+            </a:pPr>
+            <a:r>
+              <a:rPr lang="en-US" dirty="0">
+                <a:solidFill>
+                  <a:schemeClr val="accent1"/>
+                </a:solidFill>
+              </a:rPr>
+              <a:t>Random Forest</a:t>
+            </a:r>
+          </a:p>
+          <a:p>
+            <a:pPr marL="0" indent="0">
+              <a:buNone/>
+            </a:pPr>
+            <a:endParaRPr lang="en-US" dirty="0"/>
+          </a:p>
+          <a:p>
+            <a:r>
+              <a:rPr lang="en-US" dirty="0"/>
+              <a:t>Roughly 72% accurate</a:t>
+            </a:r>
+          </a:p>
+          <a:p>
+            <a:r>
+              <a:rPr lang="en-US" dirty="0"/>
+              <a:t>Train time 5.05 seconds</a:t>
+            </a:r>
+          </a:p>
+          <a:p>
+            <a:r>
+              <a:rPr lang="en-US" dirty="0"/>
+              <a:t>Prediction: 0.29 seconds</a:t>
+            </a:r>
+          </a:p>
+        </p:txBody>
+      </p:sp>
+      <p:sp>
+        <p:nvSpPr>
+          <p:cNvPr id="4" name="Footer Placeholder 3">
+            <a:extLst>
+              <a:ext uri="{FF2B5EF4-FFF2-40B4-BE49-F238E27FC236}">
+                <a16:creationId xmlns:a16="http://schemas.microsoft.com/office/drawing/2014/main" id="{542713B1-28DC-1EB6-D319-9B1BD23E3954}"/>
+              </a:ext>
+            </a:extLst>
+          </p:cNvPr>
+          <p:cNvSpPr>
+            <a:spLocks noGrp="1"/>
+          </p:cNvSpPr>
+          <p:nvPr>
+            <p:ph type="ftr" sz="quarter" idx="11"/>
+          </p:nvPr>
+        </p:nvSpPr>
+        <p:spPr/>
+        <p:txBody>
+          <a:bodyPr/>
+          <a:lstStyle/>
+          <a:p>
+            <a:r>
+              <a:rPr lang="en-US"/>
+              <a:t>Syracuse University | School of Information Studies | Jeff Levesque</a:t>
+            </a:r>
+          </a:p>
+        </p:txBody>
+      </p:sp>
+      <p:sp>
+        <p:nvSpPr>
+          <p:cNvPr id="5" name="Slide Number Placeholder 4">
+            <a:extLst>
+              <a:ext uri="{FF2B5EF4-FFF2-40B4-BE49-F238E27FC236}">
+                <a16:creationId xmlns:a16="http://schemas.microsoft.com/office/drawing/2014/main" id="{DBB97656-A7FE-FAF2-F69C-58489D608E03}"/>
+              </a:ext>
+            </a:extLst>
+          </p:cNvPr>
+          <p:cNvSpPr>
+            <a:spLocks noGrp="1"/>
+          </p:cNvSpPr>
+          <p:nvPr>
+            <p:ph type="sldNum" sz="quarter" idx="12"/>
+          </p:nvPr>
+        </p:nvSpPr>
+        <p:spPr/>
+        <p:txBody>
+          <a:bodyPr/>
+          <a:lstStyle/>
+          <a:p>
+            <a:fld id="{853C539F-E86C-6741-9E08-043B79C1FE47}" type="slidenum">
+              <a:rPr lang="en-US" smtClean="0"/>
+              <a:t>13</a:t>
+            </a:fld>
+            <a:endParaRPr lang="en-US"/>
+          </a:p>
+        </p:txBody>
+      </p:sp>
+    </p:spTree>
+    <p:extLst>
+      <p:ext uri="{BB962C8B-B14F-4D97-AF65-F5344CB8AC3E}">
+        <p14:creationId xmlns:p14="http://schemas.microsoft.com/office/powerpoint/2010/main" val="2157874233"/>
+      </p:ext>
+    </p:extLst>
+  </p:cSld>
+  <p:clrMapOvr>
+    <a:masterClrMapping/>
+  </p:clrMapOvr>
+</p:sld>
+</file>
+
+<file path=ppt/slides/slide14.xml><?xml version="1.0" encoding="utf-8"?>
+<p:sld xmlns:a="http://schemas.openxmlformats.org/drawingml/2006/main" xmlns:r="http://schemas.openxmlformats.org/officeDocument/2006/relationships" xmlns:p="http://schemas.openxmlformats.org/presentationml/2006/main">
+  <p:cSld>
+    <p:spTree>
+      <p:nvGrpSpPr>
+        <p:cNvPr id="1" name=""/>
+        <p:cNvGrpSpPr/>
+        <p:nvPr/>
+      </p:nvGrpSpPr>
+      <p:grpSpPr>
+        <a:xfrm>
+          <a:off x="0" y="0"/>
+          <a:ext cx="0" cy="0"/>
+          <a:chOff x="0" y="0"/>
+          <a:chExt cx="0" cy="0"/>
+        </a:xfrm>
+      </p:grpSpPr>
+      <p:sp>
+        <p:nvSpPr>
+          <p:cNvPr id="6" name="Title 5">
+            <a:extLst>
+              <a:ext uri="{FF2B5EF4-FFF2-40B4-BE49-F238E27FC236}">
+                <a16:creationId xmlns:a16="http://schemas.microsoft.com/office/drawing/2014/main" id="{A85245E7-8830-A067-17AA-0F7D63AB536F}"/>
+              </a:ext>
+            </a:extLst>
+          </p:cNvPr>
+          <p:cNvSpPr>
+            <a:spLocks noGrp="1"/>
+          </p:cNvSpPr>
+          <p:nvPr>
+            <p:ph type="title"/>
+          </p:nvPr>
+        </p:nvSpPr>
+        <p:spPr/>
+        <p:txBody>
+          <a:bodyPr/>
+          <a:lstStyle/>
+          <a:p>
+            <a:r>
+              <a:rPr lang="en-US" dirty="0"/>
+              <a:t>Classifier: question-label</a:t>
+            </a:r>
+          </a:p>
+        </p:txBody>
+      </p:sp>
+      <p:sp>
+        <p:nvSpPr>
+          <p:cNvPr id="10" name="Text Placeholder 9">
+            <a:extLst>
+              <a:ext uri="{FF2B5EF4-FFF2-40B4-BE49-F238E27FC236}">
+                <a16:creationId xmlns:a16="http://schemas.microsoft.com/office/drawing/2014/main" id="{7BD35082-70C1-FD9F-E825-5908CF4A2797}"/>
+              </a:ext>
+            </a:extLst>
+          </p:cNvPr>
+          <p:cNvSpPr>
+            <a:spLocks noGrp="1"/>
+          </p:cNvSpPr>
+          <p:nvPr>
+            <p:ph type="body" idx="1"/>
+          </p:nvPr>
+        </p:nvSpPr>
+        <p:spPr>
+          <a:xfrm>
+            <a:off x="1371600" y="1769364"/>
+            <a:ext cx="4443984" cy="823912"/>
+          </a:xfrm>
+        </p:spPr>
+        <p:txBody>
+          <a:bodyPr/>
+          <a:lstStyle/>
+          <a:p>
+            <a:r>
+              <a:rPr lang="en-US" dirty="0">
+                <a:solidFill>
+                  <a:schemeClr val="tx1"/>
+                </a:solidFill>
+              </a:rPr>
+              <a:t>Random Forest </a:t>
+            </a:r>
+            <a:r>
+              <a:rPr lang="en-US" dirty="0">
+                <a:solidFill>
+                  <a:schemeClr val="accent1"/>
+                </a:solidFill>
+              </a:rPr>
+              <a:t>(73.5%)</a:t>
+            </a:r>
+          </a:p>
+        </p:txBody>
+      </p:sp>
+      <p:pic>
+        <p:nvPicPr>
+          <p:cNvPr id="9" name="Content Placeholder 8" descr="A screenshot of a social media post&#10;&#10;Description automatically generated">
+            <a:extLst>
+              <a:ext uri="{FF2B5EF4-FFF2-40B4-BE49-F238E27FC236}">
+                <a16:creationId xmlns:a16="http://schemas.microsoft.com/office/drawing/2014/main" id="{9113AE30-0357-0C30-C5A9-463A7F0C657A}"/>
+              </a:ext>
+            </a:extLst>
+          </p:cNvPr>
+          <p:cNvPicPr>
+            <a:picLocks noGrp="1" noChangeAspect="1"/>
+          </p:cNvPicPr>
+          <p:nvPr>
+            <p:ph sz="half" idx="2"/>
+          </p:nvPr>
+        </p:nvPicPr>
+        <p:blipFill>
+          <a:blip r:embed="rId2" cstate="print">
+            <a:extLst>
+              <a:ext uri="{28A0092B-C50C-407E-A947-70E740481C1C}">
+                <a14:useLocalDpi xmlns:a14="http://schemas.microsoft.com/office/drawing/2010/main" val="0"/>
+              </a:ext>
+            </a:extLst>
+          </a:blip>
+          <a:stretch>
+            <a:fillRect/>
+          </a:stretch>
+        </p:blipFill>
+        <p:spPr>
+          <a:xfrm>
+            <a:off x="1535896" y="2757686"/>
+            <a:ext cx="3546492" cy="3546492"/>
+          </a:xfrm>
+          <a:prstGeom prst="rect">
+            <a:avLst/>
+          </a:prstGeom>
+        </p:spPr>
+      </p:pic>
+      <p:sp>
+        <p:nvSpPr>
+          <p:cNvPr id="11" name="Text Placeholder 10">
+            <a:extLst>
+              <a:ext uri="{FF2B5EF4-FFF2-40B4-BE49-F238E27FC236}">
+                <a16:creationId xmlns:a16="http://schemas.microsoft.com/office/drawing/2014/main" id="{4D230E06-3DDA-BE60-9865-A9327F4C4034}"/>
+              </a:ext>
+            </a:extLst>
+          </p:cNvPr>
+          <p:cNvSpPr>
+            <a:spLocks noGrp="1"/>
+          </p:cNvSpPr>
+          <p:nvPr>
+            <p:ph type="body" sz="quarter" idx="3"/>
+          </p:nvPr>
+        </p:nvSpPr>
+        <p:spPr>
+          <a:xfrm>
+            <a:off x="6525014" y="1769364"/>
+            <a:ext cx="4443984" cy="823912"/>
+          </a:xfrm>
+        </p:spPr>
+        <p:txBody>
+          <a:bodyPr/>
+          <a:lstStyle/>
+          <a:p>
+            <a:r>
+              <a:rPr lang="en-US" dirty="0"/>
+              <a:t>Labels</a:t>
+            </a:r>
+          </a:p>
+        </p:txBody>
+      </p:sp>
+      <p:pic>
+        <p:nvPicPr>
+          <p:cNvPr id="12" name="Content Placeholder 11">
+            <a:extLst>
+              <a:ext uri="{FF2B5EF4-FFF2-40B4-BE49-F238E27FC236}">
+                <a16:creationId xmlns:a16="http://schemas.microsoft.com/office/drawing/2014/main" id="{3A436120-BA41-A294-4222-FC3FE45482B5}"/>
+              </a:ext>
+            </a:extLst>
+          </p:cNvPr>
+          <p:cNvPicPr>
+            <a:picLocks noGrp="1" noChangeAspect="1"/>
+          </p:cNvPicPr>
+          <p:nvPr>
+            <p:ph sz="quarter" idx="4"/>
+          </p:nvPr>
+        </p:nvPicPr>
+        <p:blipFill>
+          <a:blip r:embed="rId3"/>
+          <a:stretch>
+            <a:fillRect/>
+          </a:stretch>
+        </p:blipFill>
+        <p:spPr>
+          <a:xfrm>
+            <a:off x="6525014" y="2757686"/>
+            <a:ext cx="3275024" cy="2562225"/>
+          </a:xfrm>
+          <a:prstGeom prst="rect">
+            <a:avLst/>
+          </a:prstGeom>
+        </p:spPr>
+      </p:pic>
+      <p:sp>
+        <p:nvSpPr>
+          <p:cNvPr id="4" name="Footer Placeholder 3">
+            <a:extLst>
+              <a:ext uri="{FF2B5EF4-FFF2-40B4-BE49-F238E27FC236}">
+                <a16:creationId xmlns:a16="http://schemas.microsoft.com/office/drawing/2014/main" id="{A5964456-E2BB-A1DE-C5B3-F9D4D15B146E}"/>
+              </a:ext>
+            </a:extLst>
+          </p:cNvPr>
+          <p:cNvSpPr>
+            <a:spLocks noGrp="1"/>
+          </p:cNvSpPr>
+          <p:nvPr>
+            <p:ph type="ftr" sz="quarter" idx="11"/>
+          </p:nvPr>
+        </p:nvSpPr>
+        <p:spPr/>
+        <p:txBody>
+          <a:bodyPr/>
+          <a:lstStyle/>
+          <a:p>
+            <a:r>
+              <a:rPr lang="en-US"/>
+              <a:t>Syracuse University | School of Information Studies | Jeff Levesque</a:t>
+            </a:r>
+          </a:p>
+        </p:txBody>
+      </p:sp>
+      <p:sp>
+        <p:nvSpPr>
+          <p:cNvPr id="5" name="Slide Number Placeholder 4">
+            <a:extLst>
+              <a:ext uri="{FF2B5EF4-FFF2-40B4-BE49-F238E27FC236}">
+                <a16:creationId xmlns:a16="http://schemas.microsoft.com/office/drawing/2014/main" id="{F5832A3C-85AA-C6EB-B17F-83B8FBF7FB3C}"/>
+              </a:ext>
+            </a:extLst>
+          </p:cNvPr>
+          <p:cNvSpPr>
+            <a:spLocks noGrp="1"/>
+          </p:cNvSpPr>
+          <p:nvPr>
+            <p:ph type="sldNum" sz="quarter" idx="12"/>
+          </p:nvPr>
+        </p:nvSpPr>
+        <p:spPr/>
+        <p:txBody>
+          <a:bodyPr/>
+          <a:lstStyle/>
+          <a:p>
+            <a:fld id="{853C539F-E86C-6741-9E08-043B79C1FE47}" type="slidenum">
+              <a:rPr lang="en-US" smtClean="0"/>
+              <a:t>14</a:t>
+            </a:fld>
+            <a:endParaRPr lang="en-US"/>
+          </a:p>
+        </p:txBody>
+      </p:sp>
+    </p:spTree>
+    <p:extLst>
+      <p:ext uri="{BB962C8B-B14F-4D97-AF65-F5344CB8AC3E}">
+        <p14:creationId xmlns:p14="http://schemas.microsoft.com/office/powerpoint/2010/main" val="4257181001"/>
+      </p:ext>
+    </p:extLst>
+  </p:cSld>
+  <p:clrMapOvr>
+    <a:masterClrMapping/>
+  </p:clrMapOvr>
+</p:sld>
+</file>
+
+<file path=ppt/slides/slide15.xml><?xml version="1.0" encoding="utf-8"?>
+<p:sld xmlns:a="http://schemas.openxmlformats.org/drawingml/2006/main" xmlns:r="http://schemas.openxmlformats.org/officeDocument/2006/relationships" xmlns:p="http://schemas.openxmlformats.org/presentationml/2006/main">
+  <p:cSld>
+    <p:spTree>
+      <p:nvGrpSpPr>
+        <p:cNvPr id="1" name=""/>
+        <p:cNvGrpSpPr/>
+        <p:nvPr/>
+      </p:nvGrpSpPr>
+      <p:grpSpPr>
+        <a:xfrm>
+          <a:off x="0" y="0"/>
+          <a:ext cx="0" cy="0"/>
+          <a:chOff x="0" y="0"/>
+          <a:chExt cx="0" cy="0"/>
+        </a:xfrm>
+      </p:grpSpPr>
+      <p:sp>
+        <p:nvSpPr>
+          <p:cNvPr id="2" name="Title 1">
+            <a:extLst>
+              <a:ext uri="{FF2B5EF4-FFF2-40B4-BE49-F238E27FC236}">
+                <a16:creationId xmlns:a16="http://schemas.microsoft.com/office/drawing/2014/main" id="{D758AA0B-F5F2-DAB5-DCFE-BD26B810F301}"/>
+              </a:ext>
+            </a:extLst>
+          </p:cNvPr>
+          <p:cNvSpPr>
+            <a:spLocks noGrp="1"/>
+          </p:cNvSpPr>
+          <p:nvPr>
+            <p:ph type="title"/>
+          </p:nvPr>
+        </p:nvSpPr>
+        <p:spPr/>
+        <p:txBody>
+          <a:bodyPr/>
+          <a:lstStyle/>
+          <a:p>
+            <a:r>
+              <a:rPr lang="en-US" dirty="0"/>
+              <a:t>RNN: NMT chatbot</a:t>
+            </a:r>
+          </a:p>
+        </p:txBody>
+      </p:sp>
+      <p:sp>
+        <p:nvSpPr>
+          <p:cNvPr id="9" name="Text Placeholder 8">
+            <a:extLst>
+              <a:ext uri="{FF2B5EF4-FFF2-40B4-BE49-F238E27FC236}">
+                <a16:creationId xmlns:a16="http://schemas.microsoft.com/office/drawing/2014/main" id="{69F4D17B-B030-A58E-4517-B6473B66A91D}"/>
+              </a:ext>
+            </a:extLst>
+          </p:cNvPr>
+          <p:cNvSpPr>
+            <a:spLocks noGrp="1"/>
+          </p:cNvSpPr>
+          <p:nvPr>
+            <p:ph type="body" idx="1"/>
+          </p:nvPr>
+        </p:nvSpPr>
+        <p:spPr>
+          <a:xfrm>
+            <a:off x="1371600" y="1680464"/>
+            <a:ext cx="4443984" cy="823912"/>
+          </a:xfrm>
+        </p:spPr>
+        <p:txBody>
+          <a:bodyPr/>
+          <a:lstStyle/>
+          <a:p>
+            <a:r>
+              <a:rPr lang="en-US" dirty="0"/>
+              <a:t>Execution</a:t>
+            </a:r>
+          </a:p>
+        </p:txBody>
+      </p:sp>
+      <p:sp>
+        <p:nvSpPr>
+          <p:cNvPr id="6" name="Content Placeholder 5">
+            <a:extLst>
+              <a:ext uri="{FF2B5EF4-FFF2-40B4-BE49-F238E27FC236}">
+                <a16:creationId xmlns:a16="http://schemas.microsoft.com/office/drawing/2014/main" id="{D1C049E1-F6CD-B2EA-DAF6-FBF2CD62FDFE}"/>
+              </a:ext>
+            </a:extLst>
+          </p:cNvPr>
+          <p:cNvSpPr>
+            <a:spLocks noGrp="1"/>
+          </p:cNvSpPr>
+          <p:nvPr>
+            <p:ph sz="half" idx="2"/>
+          </p:nvPr>
+        </p:nvSpPr>
+        <p:spPr>
+          <a:xfrm>
+            <a:off x="1371600" y="2757687"/>
+            <a:ext cx="4443984" cy="3109714"/>
+          </a:xfrm>
+        </p:spPr>
+        <p:txBody>
+          <a:bodyPr>
+            <a:normAutofit fontScale="55000" lnSpcReduction="20000"/>
+          </a:bodyPr>
+          <a:lstStyle/>
+          <a:p>
+            <a:pPr marL="73152" marR="0" indent="0">
+              <a:spcBef>
+                <a:spcPts val="0"/>
+              </a:spcBef>
+              <a:spcAft>
+                <a:spcPts val="0"/>
+              </a:spcAft>
+              <a:buNone/>
+            </a:pPr>
+            <a:r>
+              <a:rPr lang="en-US" sz="1800" dirty="0" err="1">
+                <a:effectLst/>
+                <a:latin typeface="Courier New" panose="02070309020205020404" pitchFamily="49" charset="0"/>
+                <a:ea typeface="Calibri" panose="020F0502020204030204" pitchFamily="34" charset="0"/>
+                <a:cs typeface="Times New Roman" panose="02020603050405020304" pitchFamily="18" charset="0"/>
+              </a:rPr>
+              <a:t>root@development</a:t>
+            </a:r>
+            <a:r>
+              <a:rPr lang="en-US" sz="1800" dirty="0">
+                <a:effectLst/>
+                <a:latin typeface="Courier New" panose="02070309020205020404" pitchFamily="49" charset="0"/>
+                <a:ea typeface="Calibri" panose="020F0502020204030204" pitchFamily="34" charset="0"/>
+                <a:cs typeface="Times New Roman" panose="02020603050405020304" pitchFamily="18" charset="0"/>
+              </a:rPr>
+              <a:t>:/vagrant# python3 </a:t>
+            </a:r>
+            <a:r>
+              <a:rPr lang="en-US" sz="1800" dirty="0" err="1">
+                <a:effectLst/>
+                <a:latin typeface="Courier New" panose="02070309020205020404" pitchFamily="49" charset="0"/>
+                <a:ea typeface="Calibri" panose="020F0502020204030204" pitchFamily="34" charset="0"/>
+                <a:cs typeface="Times New Roman" panose="02020603050405020304" pitchFamily="18" charset="0"/>
+              </a:rPr>
+              <a:t>run.py</a:t>
+            </a:r>
+            <a:endParaRPr lang="en-US" sz="1800" dirty="0">
+              <a:effectLst/>
+              <a:latin typeface="Calibri" panose="020F0502020204030204" pitchFamily="34" charset="0"/>
+              <a:ea typeface="Calibri" panose="020F0502020204030204" pitchFamily="34" charset="0"/>
+              <a:cs typeface="Times New Roman" panose="02020603050405020304" pitchFamily="18" charset="0"/>
+            </a:endParaRPr>
+          </a:p>
+          <a:p>
+            <a:pPr marL="73152" marR="0" indent="0">
+              <a:spcBef>
+                <a:spcPts val="0"/>
+              </a:spcBef>
+              <a:spcAft>
+                <a:spcPts val="0"/>
+              </a:spcAft>
+              <a:buNone/>
+            </a:pPr>
+            <a:r>
+              <a:rPr lang="en-US" sz="1800" dirty="0">
+                <a:effectLst/>
+                <a:latin typeface="Courier New" panose="02070309020205020404" pitchFamily="49" charset="0"/>
+                <a:ea typeface="Calibri" panose="020F0502020204030204" pitchFamily="34" charset="0"/>
+                <a:cs typeface="Times New Roman" panose="02020603050405020304" pitchFamily="18" charset="0"/>
+              </a:rPr>
+              <a:t> </a:t>
+            </a:r>
+            <a:endParaRPr lang="en-US" sz="1800" dirty="0">
+              <a:effectLst/>
+              <a:latin typeface="Calibri" panose="020F0502020204030204" pitchFamily="34" charset="0"/>
+              <a:ea typeface="Calibri" panose="020F0502020204030204" pitchFamily="34" charset="0"/>
+              <a:cs typeface="Times New Roman" panose="02020603050405020304" pitchFamily="18" charset="0"/>
+            </a:endParaRPr>
+          </a:p>
+          <a:p>
+            <a:pPr marL="73152" marR="0" indent="0">
+              <a:spcBef>
+                <a:spcPts val="0"/>
+              </a:spcBef>
+              <a:spcAft>
+                <a:spcPts val="0"/>
+              </a:spcAft>
+              <a:buNone/>
+            </a:pPr>
+            <a:r>
+              <a:rPr lang="en-US" sz="1800" dirty="0">
+                <a:effectLst/>
+                <a:latin typeface="Courier New" panose="02070309020205020404" pitchFamily="49" charset="0"/>
+                <a:ea typeface="Calibri" panose="020F0502020204030204" pitchFamily="34" charset="0"/>
+                <a:cs typeface="Times New Roman" panose="02020603050405020304" pitchFamily="18" charset="0"/>
+              </a:rPr>
+              <a:t> </a:t>
+            </a:r>
+            <a:endParaRPr lang="en-US" sz="1800" dirty="0">
+              <a:effectLst/>
+              <a:latin typeface="Calibri" panose="020F0502020204030204" pitchFamily="34" charset="0"/>
+              <a:ea typeface="Calibri" panose="020F0502020204030204" pitchFamily="34" charset="0"/>
+              <a:cs typeface="Times New Roman" panose="02020603050405020304" pitchFamily="18" charset="0"/>
+            </a:endParaRPr>
+          </a:p>
+          <a:p>
+            <a:pPr marL="73152" marR="0" indent="0">
+              <a:spcBef>
+                <a:spcPts val="0"/>
+              </a:spcBef>
+              <a:spcAft>
+                <a:spcPts val="0"/>
+              </a:spcAft>
+              <a:buNone/>
+            </a:pPr>
+            <a:r>
+              <a:rPr lang="en-US" sz="1800" dirty="0">
+                <a:effectLst/>
+                <a:latin typeface="Courier New" panose="02070309020205020404" pitchFamily="49" charset="0"/>
+                <a:ea typeface="Calibri" panose="020F0502020204030204" pitchFamily="34" charset="0"/>
+                <a:cs typeface="Times New Roman" panose="02020603050405020304" pitchFamily="18" charset="0"/>
+              </a:rPr>
+              <a:t>Starting interactive mode (first response will take a while):</a:t>
+            </a:r>
+            <a:endParaRPr lang="en-US" sz="1800" dirty="0">
+              <a:effectLst/>
+              <a:latin typeface="Calibri" panose="020F0502020204030204" pitchFamily="34" charset="0"/>
+              <a:ea typeface="Calibri" panose="020F0502020204030204" pitchFamily="34" charset="0"/>
+              <a:cs typeface="Times New Roman" panose="02020603050405020304" pitchFamily="18" charset="0"/>
+            </a:endParaRPr>
+          </a:p>
+          <a:p>
+            <a:pPr marL="73152" marR="0" indent="0">
+              <a:spcBef>
+                <a:spcPts val="0"/>
+              </a:spcBef>
+              <a:spcAft>
+                <a:spcPts val="0"/>
+              </a:spcAft>
+              <a:buNone/>
+            </a:pPr>
+            <a:r>
+              <a:rPr lang="en-US" sz="1800" dirty="0">
+                <a:effectLst/>
+                <a:latin typeface="Courier New" panose="02070309020205020404" pitchFamily="49" charset="0"/>
+                <a:ea typeface="Calibri" panose="020F0502020204030204" pitchFamily="34" charset="0"/>
+                <a:cs typeface="Times New Roman" panose="02020603050405020304" pitchFamily="18" charset="0"/>
+              </a:rPr>
+              <a:t> </a:t>
+            </a:r>
+            <a:endParaRPr lang="en-US" sz="1800" dirty="0">
+              <a:effectLst/>
+              <a:latin typeface="Calibri" panose="020F0502020204030204" pitchFamily="34" charset="0"/>
+              <a:ea typeface="Calibri" panose="020F0502020204030204" pitchFamily="34" charset="0"/>
+              <a:cs typeface="Times New Roman" panose="02020603050405020304" pitchFamily="18" charset="0"/>
+            </a:endParaRPr>
+          </a:p>
+          <a:p>
+            <a:pPr marL="73152" marR="0" indent="0">
+              <a:spcBef>
+                <a:spcPts val="0"/>
+              </a:spcBef>
+              <a:spcAft>
+                <a:spcPts val="0"/>
+              </a:spcAft>
+              <a:buNone/>
+            </a:pPr>
+            <a:r>
+              <a:rPr lang="en-US" sz="1800" dirty="0">
+                <a:effectLst/>
+                <a:latin typeface="Courier New" panose="02070309020205020404" pitchFamily="49" charset="0"/>
+                <a:ea typeface="Calibri" panose="020F0502020204030204" pitchFamily="34" charset="0"/>
+                <a:cs typeface="Times New Roman" panose="02020603050405020304" pitchFamily="18" charset="0"/>
+              </a:rPr>
+              <a:t>&gt; hey, where is </a:t>
+            </a:r>
+            <a:r>
+              <a:rPr lang="en-US" sz="1800" dirty="0" err="1">
+                <a:effectLst/>
+                <a:latin typeface="Courier New" panose="02070309020205020404" pitchFamily="49" charset="0"/>
+                <a:ea typeface="Calibri" panose="020F0502020204030204" pitchFamily="34" charset="0"/>
+                <a:cs typeface="Times New Roman" panose="02020603050405020304" pitchFamily="18" charset="0"/>
+              </a:rPr>
+              <a:t>billy</a:t>
+            </a:r>
+            <a:r>
+              <a:rPr lang="en-US" sz="1800" dirty="0">
+                <a:effectLst/>
+                <a:latin typeface="Courier New" panose="02070309020205020404" pitchFamily="49" charset="0"/>
+                <a:ea typeface="Calibri" panose="020F0502020204030204" pitchFamily="34" charset="0"/>
+                <a:cs typeface="Times New Roman" panose="02020603050405020304" pitchFamily="18" charset="0"/>
+              </a:rPr>
+              <a:t>?</a:t>
+            </a:r>
+            <a:endParaRPr lang="en-US" sz="1800" dirty="0">
+              <a:effectLst/>
+              <a:latin typeface="Calibri" panose="020F0502020204030204" pitchFamily="34" charset="0"/>
+              <a:ea typeface="Calibri" panose="020F0502020204030204" pitchFamily="34" charset="0"/>
+              <a:cs typeface="Times New Roman" panose="02020603050405020304" pitchFamily="18" charset="0"/>
+            </a:endParaRPr>
+          </a:p>
+          <a:p>
+            <a:pPr marL="73152" marR="0" indent="0">
+              <a:spcBef>
+                <a:spcPts val="0"/>
+              </a:spcBef>
+              <a:spcAft>
+                <a:spcPts val="0"/>
+              </a:spcAft>
+              <a:buNone/>
+            </a:pPr>
+            <a:r>
+              <a:rPr lang="en-US" sz="1800" dirty="0">
+                <a:effectLst/>
+                <a:latin typeface="Courier New" panose="02070309020205020404" pitchFamily="49" charset="0"/>
+                <a:ea typeface="Calibri" panose="020F0502020204030204" pitchFamily="34" charset="0"/>
+                <a:cs typeface="Times New Roman" panose="02020603050405020304" pitchFamily="18" charset="0"/>
+              </a:rPr>
+              <a:t>/</a:t>
+            </a:r>
+            <a:r>
+              <a:rPr lang="en-US" sz="1800" dirty="0" err="1">
+                <a:effectLst/>
+                <a:latin typeface="Courier New" panose="02070309020205020404" pitchFamily="49" charset="0"/>
+                <a:ea typeface="Calibri" panose="020F0502020204030204" pitchFamily="34" charset="0"/>
+                <a:cs typeface="Times New Roman" panose="02020603050405020304" pitchFamily="18" charset="0"/>
+              </a:rPr>
+              <a:t>usr</a:t>
+            </a:r>
+            <a:r>
+              <a:rPr lang="en-US" sz="1800" dirty="0">
+                <a:effectLst/>
+                <a:latin typeface="Courier New" panose="02070309020205020404" pitchFamily="49" charset="0"/>
+                <a:ea typeface="Calibri" panose="020F0502020204030204" pitchFamily="34" charset="0"/>
+                <a:cs typeface="Times New Roman" panose="02020603050405020304" pitchFamily="18" charset="0"/>
+              </a:rPr>
+              <a:t>/local/lib/python3.5/</a:t>
+            </a:r>
+            <a:r>
+              <a:rPr lang="en-US" sz="1800" dirty="0" err="1">
+                <a:effectLst/>
+                <a:latin typeface="Courier New" panose="02070309020205020404" pitchFamily="49" charset="0"/>
+                <a:ea typeface="Calibri" panose="020F0502020204030204" pitchFamily="34" charset="0"/>
+                <a:cs typeface="Times New Roman" panose="02020603050405020304" pitchFamily="18" charset="0"/>
+              </a:rPr>
+              <a:t>dist</a:t>
+            </a:r>
+            <a:r>
+              <a:rPr lang="en-US" sz="1800" dirty="0">
+                <a:effectLst/>
+                <a:latin typeface="Courier New" panose="02070309020205020404" pitchFamily="49" charset="0"/>
+                <a:ea typeface="Calibri" panose="020F0502020204030204" pitchFamily="34" charset="0"/>
+                <a:cs typeface="Times New Roman" panose="02020603050405020304" pitchFamily="18" charset="0"/>
+              </a:rPr>
+              <a:t>-packages/</a:t>
+            </a:r>
+            <a:r>
+              <a:rPr lang="en-US" sz="1800" dirty="0" err="1">
+                <a:effectLst/>
+                <a:latin typeface="Courier New" panose="02070309020205020404" pitchFamily="49" charset="0"/>
+                <a:ea typeface="Calibri" panose="020F0502020204030204" pitchFamily="34" charset="0"/>
+                <a:cs typeface="Times New Roman" panose="02020603050405020304" pitchFamily="18" charset="0"/>
+              </a:rPr>
+              <a:t>sklearn</a:t>
+            </a:r>
+            <a:r>
+              <a:rPr lang="en-US" sz="1800" dirty="0">
+                <a:effectLst/>
+                <a:latin typeface="Courier New" panose="02070309020205020404" pitchFamily="49" charset="0"/>
+                <a:ea typeface="Calibri" panose="020F0502020204030204" pitchFamily="34" charset="0"/>
+                <a:cs typeface="Times New Roman" panose="02020603050405020304" pitchFamily="18" charset="0"/>
+              </a:rPr>
+              <a:t>/base.py:251: </a:t>
+            </a:r>
+            <a:r>
+              <a:rPr lang="en-US" sz="1800" dirty="0" err="1">
+                <a:effectLst/>
+                <a:latin typeface="Courier New" panose="02070309020205020404" pitchFamily="49" charset="0"/>
+                <a:ea typeface="Calibri" panose="020F0502020204030204" pitchFamily="34" charset="0"/>
+                <a:cs typeface="Times New Roman" panose="02020603050405020304" pitchFamily="18" charset="0"/>
+              </a:rPr>
+              <a:t>UserWarning</a:t>
+            </a:r>
+            <a:r>
+              <a:rPr lang="en-US" sz="1800" dirty="0">
+                <a:effectLst/>
+                <a:latin typeface="Courier New" panose="02070309020205020404" pitchFamily="49" charset="0"/>
+                <a:ea typeface="Calibri" panose="020F0502020204030204" pitchFamily="34" charset="0"/>
+                <a:cs typeface="Times New Roman" panose="02020603050405020304" pitchFamily="18" charset="0"/>
+              </a:rPr>
+              <a:t>: Trying to unpickle estimator </a:t>
+            </a:r>
+            <a:r>
+              <a:rPr lang="en-US" sz="1800" dirty="0" err="1">
+                <a:effectLst/>
+                <a:latin typeface="Courier New" panose="02070309020205020404" pitchFamily="49" charset="0"/>
+                <a:ea typeface="Calibri" panose="020F0502020204030204" pitchFamily="34" charset="0"/>
+                <a:cs typeface="Times New Roman" panose="02020603050405020304" pitchFamily="18" charset="0"/>
+              </a:rPr>
+              <a:t>DecisionTreeClassifier</a:t>
+            </a:r>
+            <a:r>
+              <a:rPr lang="en-US" sz="1800" dirty="0">
+                <a:effectLst/>
+                <a:latin typeface="Courier New" panose="02070309020205020404" pitchFamily="49" charset="0"/>
+                <a:ea typeface="Calibri" panose="020F0502020204030204" pitchFamily="34" charset="0"/>
+                <a:cs typeface="Times New Roman" panose="02020603050405020304" pitchFamily="18" charset="0"/>
+              </a:rPr>
+              <a:t> from version 0.20.1 when using version 0.20.0. This might lead to breaking code or invalid results. Use at your own risk.</a:t>
+            </a:r>
+            <a:endParaRPr lang="en-US" sz="1800" dirty="0">
+              <a:effectLst/>
+              <a:latin typeface="Calibri" panose="020F0502020204030204" pitchFamily="34" charset="0"/>
+              <a:ea typeface="Calibri" panose="020F0502020204030204" pitchFamily="34" charset="0"/>
+              <a:cs typeface="Times New Roman" panose="02020603050405020304" pitchFamily="18" charset="0"/>
+            </a:endParaRPr>
+          </a:p>
+          <a:p>
+            <a:pPr marL="73152" marR="0" indent="0">
+              <a:spcBef>
+                <a:spcPts val="0"/>
+              </a:spcBef>
+              <a:spcAft>
+                <a:spcPts val="0"/>
+              </a:spcAft>
+              <a:buNone/>
+            </a:pPr>
+            <a:r>
+              <a:rPr lang="en-US" sz="1800" dirty="0">
+                <a:effectLst/>
+                <a:latin typeface="Courier New" panose="02070309020205020404" pitchFamily="49" charset="0"/>
+                <a:ea typeface="Calibri" panose="020F0502020204030204" pitchFamily="34" charset="0"/>
+                <a:cs typeface="Times New Roman" panose="02020603050405020304" pitchFamily="18" charset="0"/>
+              </a:rPr>
+              <a:t>  </a:t>
+            </a:r>
+            <a:r>
+              <a:rPr lang="en-US" sz="1800" dirty="0" err="1">
+                <a:effectLst/>
+                <a:latin typeface="Courier New" panose="02070309020205020404" pitchFamily="49" charset="0"/>
+                <a:ea typeface="Calibri" panose="020F0502020204030204" pitchFamily="34" charset="0"/>
+                <a:cs typeface="Times New Roman" panose="02020603050405020304" pitchFamily="18" charset="0"/>
+              </a:rPr>
+              <a:t>UserWarning</a:t>
+            </a:r>
+            <a:r>
+              <a:rPr lang="en-US" sz="1800" dirty="0">
+                <a:effectLst/>
+                <a:latin typeface="Courier New" panose="02070309020205020404" pitchFamily="49" charset="0"/>
+                <a:ea typeface="Calibri" panose="020F0502020204030204" pitchFamily="34" charset="0"/>
+                <a:cs typeface="Times New Roman" panose="02020603050405020304" pitchFamily="18" charset="0"/>
+              </a:rPr>
+              <a:t>)</a:t>
+            </a:r>
+            <a:endParaRPr lang="en-US" sz="1800" dirty="0">
+              <a:effectLst/>
+              <a:latin typeface="Calibri" panose="020F0502020204030204" pitchFamily="34" charset="0"/>
+              <a:ea typeface="Calibri" panose="020F0502020204030204" pitchFamily="34" charset="0"/>
+              <a:cs typeface="Times New Roman" panose="02020603050405020304" pitchFamily="18" charset="0"/>
+            </a:endParaRPr>
+          </a:p>
+          <a:p>
+            <a:pPr marL="73152" marR="0" indent="0">
+              <a:spcBef>
+                <a:spcPts val="0"/>
+              </a:spcBef>
+              <a:spcAft>
+                <a:spcPts val="0"/>
+              </a:spcAft>
+              <a:buNone/>
+            </a:pPr>
+            <a:r>
+              <a:rPr lang="en-US" sz="1800" dirty="0">
+                <a:effectLst/>
+                <a:latin typeface="Courier New" panose="02070309020205020404" pitchFamily="49" charset="0"/>
+                <a:ea typeface="Calibri" panose="020F0502020204030204" pitchFamily="34" charset="0"/>
+                <a:cs typeface="Times New Roman" panose="02020603050405020304" pitchFamily="18" charset="0"/>
+              </a:rPr>
+              <a:t>/</a:t>
+            </a:r>
+            <a:r>
+              <a:rPr lang="en-US" sz="1800" dirty="0" err="1">
+                <a:effectLst/>
+                <a:latin typeface="Courier New" panose="02070309020205020404" pitchFamily="49" charset="0"/>
+                <a:ea typeface="Calibri" panose="020F0502020204030204" pitchFamily="34" charset="0"/>
+                <a:cs typeface="Times New Roman" panose="02020603050405020304" pitchFamily="18" charset="0"/>
+              </a:rPr>
+              <a:t>usr</a:t>
+            </a:r>
+            <a:r>
+              <a:rPr lang="en-US" sz="1800" dirty="0">
+                <a:effectLst/>
+                <a:latin typeface="Courier New" panose="02070309020205020404" pitchFamily="49" charset="0"/>
+                <a:ea typeface="Calibri" panose="020F0502020204030204" pitchFamily="34" charset="0"/>
+                <a:cs typeface="Times New Roman" panose="02020603050405020304" pitchFamily="18" charset="0"/>
+              </a:rPr>
+              <a:t>/local/lib/python3.5/</a:t>
+            </a:r>
+            <a:r>
+              <a:rPr lang="en-US" sz="1800" dirty="0" err="1">
+                <a:effectLst/>
+                <a:latin typeface="Courier New" panose="02070309020205020404" pitchFamily="49" charset="0"/>
+                <a:ea typeface="Calibri" panose="020F0502020204030204" pitchFamily="34" charset="0"/>
+                <a:cs typeface="Times New Roman" panose="02020603050405020304" pitchFamily="18" charset="0"/>
+              </a:rPr>
+              <a:t>dist</a:t>
+            </a:r>
+            <a:r>
+              <a:rPr lang="en-US" sz="1800" dirty="0">
+                <a:effectLst/>
+                <a:latin typeface="Courier New" panose="02070309020205020404" pitchFamily="49" charset="0"/>
+                <a:ea typeface="Calibri" panose="020F0502020204030204" pitchFamily="34" charset="0"/>
+                <a:cs typeface="Times New Roman" panose="02020603050405020304" pitchFamily="18" charset="0"/>
+              </a:rPr>
+              <a:t>-packages/</a:t>
+            </a:r>
+            <a:r>
+              <a:rPr lang="en-US" sz="1800" dirty="0" err="1">
+                <a:effectLst/>
+                <a:latin typeface="Courier New" panose="02070309020205020404" pitchFamily="49" charset="0"/>
+                <a:ea typeface="Calibri" panose="020F0502020204030204" pitchFamily="34" charset="0"/>
+                <a:cs typeface="Times New Roman" panose="02020603050405020304" pitchFamily="18" charset="0"/>
+              </a:rPr>
+              <a:t>sklearn</a:t>
+            </a:r>
+            <a:r>
+              <a:rPr lang="en-US" sz="1800" dirty="0">
+                <a:effectLst/>
+                <a:latin typeface="Courier New" panose="02070309020205020404" pitchFamily="49" charset="0"/>
+                <a:ea typeface="Calibri" panose="020F0502020204030204" pitchFamily="34" charset="0"/>
+                <a:cs typeface="Times New Roman" panose="02020603050405020304" pitchFamily="18" charset="0"/>
+              </a:rPr>
+              <a:t>/base.py:251: </a:t>
+            </a:r>
+            <a:r>
+              <a:rPr lang="en-US" sz="1800" dirty="0" err="1">
+                <a:effectLst/>
+                <a:latin typeface="Courier New" panose="02070309020205020404" pitchFamily="49" charset="0"/>
+                <a:ea typeface="Calibri" panose="020F0502020204030204" pitchFamily="34" charset="0"/>
+                <a:cs typeface="Times New Roman" panose="02020603050405020304" pitchFamily="18" charset="0"/>
+              </a:rPr>
+              <a:t>UserWarning</a:t>
+            </a:r>
+            <a:r>
+              <a:rPr lang="en-US" sz="1800" dirty="0">
+                <a:effectLst/>
+                <a:latin typeface="Courier New" panose="02070309020205020404" pitchFamily="49" charset="0"/>
+                <a:ea typeface="Calibri" panose="020F0502020204030204" pitchFamily="34" charset="0"/>
+                <a:cs typeface="Times New Roman" panose="02020603050405020304" pitchFamily="18" charset="0"/>
+              </a:rPr>
+              <a:t>: Trying to unpickle estimator </a:t>
+            </a:r>
+            <a:r>
+              <a:rPr lang="en-US" sz="1800" dirty="0" err="1">
+                <a:effectLst/>
+                <a:latin typeface="Courier New" panose="02070309020205020404" pitchFamily="49" charset="0"/>
+                <a:ea typeface="Calibri" panose="020F0502020204030204" pitchFamily="34" charset="0"/>
+                <a:cs typeface="Times New Roman" panose="02020603050405020304" pitchFamily="18" charset="0"/>
+              </a:rPr>
+              <a:t>RandomForestClassifier</a:t>
+            </a:r>
+            <a:r>
+              <a:rPr lang="en-US" sz="1800" dirty="0">
+                <a:effectLst/>
+                <a:latin typeface="Courier New" panose="02070309020205020404" pitchFamily="49" charset="0"/>
+                <a:ea typeface="Calibri" panose="020F0502020204030204" pitchFamily="34" charset="0"/>
+                <a:cs typeface="Times New Roman" panose="02020603050405020304" pitchFamily="18" charset="0"/>
+              </a:rPr>
+              <a:t> from version 0.20.1 when using version 0.20.0. This might lead to breaking code or invalid results. Use at your own risk.</a:t>
+            </a:r>
+            <a:endParaRPr lang="en-US" sz="1800" dirty="0">
+              <a:effectLst/>
+              <a:latin typeface="Calibri" panose="020F0502020204030204" pitchFamily="34" charset="0"/>
+              <a:ea typeface="Calibri" panose="020F0502020204030204" pitchFamily="34" charset="0"/>
+              <a:cs typeface="Times New Roman" panose="02020603050405020304" pitchFamily="18" charset="0"/>
+            </a:endParaRPr>
+          </a:p>
+          <a:p>
+            <a:pPr marL="73152" marR="0" indent="0">
+              <a:spcBef>
+                <a:spcPts val="0"/>
+              </a:spcBef>
+              <a:spcAft>
+                <a:spcPts val="0"/>
+              </a:spcAft>
+              <a:buNone/>
+            </a:pPr>
+            <a:r>
+              <a:rPr lang="en-US" sz="1800" dirty="0">
+                <a:effectLst/>
+                <a:latin typeface="Courier New" panose="02070309020205020404" pitchFamily="49" charset="0"/>
+                <a:ea typeface="Calibri" panose="020F0502020204030204" pitchFamily="34" charset="0"/>
+                <a:cs typeface="Times New Roman" panose="02020603050405020304" pitchFamily="18" charset="0"/>
+              </a:rPr>
+              <a:t>  </a:t>
+            </a:r>
+            <a:r>
+              <a:rPr lang="en-US" sz="1800" dirty="0" err="1">
+                <a:effectLst/>
+                <a:latin typeface="Courier New" panose="02070309020205020404" pitchFamily="49" charset="0"/>
+                <a:ea typeface="Calibri" panose="020F0502020204030204" pitchFamily="34" charset="0"/>
+                <a:cs typeface="Times New Roman" panose="02020603050405020304" pitchFamily="18" charset="0"/>
+              </a:rPr>
+              <a:t>UserWarning</a:t>
+            </a:r>
+            <a:r>
+              <a:rPr lang="en-US" sz="1800" dirty="0">
+                <a:effectLst/>
+                <a:latin typeface="Courier New" panose="02070309020205020404" pitchFamily="49" charset="0"/>
+                <a:ea typeface="Calibri" panose="020F0502020204030204" pitchFamily="34" charset="0"/>
+                <a:cs typeface="Times New Roman" panose="02020603050405020304" pitchFamily="18" charset="0"/>
+              </a:rPr>
+              <a:t>)</a:t>
+            </a:r>
+            <a:endParaRPr lang="en-US" sz="1800" dirty="0">
+              <a:effectLst/>
+              <a:latin typeface="Calibri" panose="020F0502020204030204" pitchFamily="34" charset="0"/>
+              <a:ea typeface="Calibri" panose="020F0502020204030204" pitchFamily="34" charset="0"/>
+              <a:cs typeface="Times New Roman" panose="02020603050405020304" pitchFamily="18" charset="0"/>
+            </a:endParaRPr>
+          </a:p>
+          <a:p>
+            <a:pPr marL="73152" marR="0" indent="0">
+              <a:spcBef>
+                <a:spcPts val="0"/>
+              </a:spcBef>
+              <a:spcAft>
+                <a:spcPts val="0"/>
+              </a:spcAft>
+              <a:buNone/>
+            </a:pPr>
+            <a:r>
+              <a:rPr lang="en-US" sz="1800" dirty="0">
+                <a:effectLst/>
+                <a:latin typeface="Courier New" panose="02070309020205020404" pitchFamily="49" charset="0"/>
+                <a:ea typeface="Calibri" panose="020F0502020204030204" pitchFamily="34" charset="0"/>
+                <a:cs typeface="Times New Roman" panose="02020603050405020304" pitchFamily="18" charset="0"/>
+              </a:rPr>
+              <a:t>hey jimmy, maybe checkout ['math']</a:t>
+            </a:r>
+            <a:endParaRPr lang="en-US" sz="1800" dirty="0">
+              <a:effectLst/>
+              <a:latin typeface="Calibri" panose="020F0502020204030204" pitchFamily="34" charset="0"/>
+              <a:ea typeface="Calibri" panose="020F0502020204030204" pitchFamily="34" charset="0"/>
+              <a:cs typeface="Times New Roman" panose="02020603050405020304" pitchFamily="18" charset="0"/>
+            </a:endParaRPr>
+          </a:p>
+          <a:p>
+            <a:pPr marL="73152" marR="0" indent="0">
+              <a:spcBef>
+                <a:spcPts val="0"/>
+              </a:spcBef>
+              <a:spcAft>
+                <a:spcPts val="0"/>
+              </a:spcAft>
+              <a:buNone/>
+            </a:pPr>
+            <a:r>
+              <a:rPr lang="en-US" sz="1800" dirty="0">
+                <a:effectLst/>
+                <a:latin typeface="Courier New" panose="02070309020205020404" pitchFamily="49" charset="0"/>
+                <a:ea typeface="Calibri" panose="020F0502020204030204" pitchFamily="34" charset="0"/>
+                <a:cs typeface="Times New Roman" panose="02020603050405020304" pitchFamily="18" charset="0"/>
+              </a:rPr>
+              <a:t> </a:t>
+            </a:r>
+            <a:endParaRPr lang="en-US" sz="1800" dirty="0">
+              <a:effectLst/>
+              <a:latin typeface="Calibri" panose="020F0502020204030204" pitchFamily="34" charset="0"/>
+              <a:ea typeface="Calibri" panose="020F0502020204030204" pitchFamily="34" charset="0"/>
+              <a:cs typeface="Times New Roman" panose="02020603050405020304" pitchFamily="18" charset="0"/>
+            </a:endParaRPr>
+          </a:p>
+          <a:p>
+            <a:pPr marL="73152" marR="0" indent="0">
+              <a:spcBef>
+                <a:spcPts val="0"/>
+              </a:spcBef>
+              <a:spcAft>
+                <a:spcPts val="0"/>
+              </a:spcAft>
+              <a:buNone/>
+            </a:pPr>
+            <a:r>
+              <a:rPr lang="en-US" sz="1800" dirty="0">
+                <a:effectLst/>
+                <a:latin typeface="Courier New" panose="02070309020205020404" pitchFamily="49" charset="0"/>
+                <a:ea typeface="Calibri" panose="020F0502020204030204" pitchFamily="34" charset="0"/>
+                <a:cs typeface="Times New Roman" panose="02020603050405020304" pitchFamily="18" charset="0"/>
+              </a:rPr>
+              <a:t>&gt; </a:t>
+            </a:r>
+            <a:endParaRPr lang="en-US" sz="1800" dirty="0">
+              <a:effectLst/>
+              <a:latin typeface="Calibri" panose="020F0502020204030204" pitchFamily="34" charset="0"/>
+              <a:ea typeface="Calibri" panose="020F0502020204030204" pitchFamily="34" charset="0"/>
+              <a:cs typeface="Times New Roman" panose="02020603050405020304" pitchFamily="18" charset="0"/>
+            </a:endParaRPr>
+          </a:p>
+          <a:p>
+            <a:endParaRPr lang="en-US" dirty="0"/>
+          </a:p>
+        </p:txBody>
+      </p:sp>
+      <p:sp>
+        <p:nvSpPr>
+          <p:cNvPr id="10" name="Text Placeholder 9">
+            <a:extLst>
+              <a:ext uri="{FF2B5EF4-FFF2-40B4-BE49-F238E27FC236}">
+                <a16:creationId xmlns:a16="http://schemas.microsoft.com/office/drawing/2014/main" id="{C6DCD547-28ED-4961-9B2D-2ED5022705F8}"/>
+              </a:ext>
+            </a:extLst>
+          </p:cNvPr>
+          <p:cNvSpPr>
+            <a:spLocks noGrp="1"/>
+          </p:cNvSpPr>
+          <p:nvPr>
+            <p:ph type="body" sz="quarter" idx="3"/>
+          </p:nvPr>
+        </p:nvSpPr>
+        <p:spPr>
+          <a:xfrm>
+            <a:off x="6525014" y="1680464"/>
+            <a:ext cx="4443984" cy="823912"/>
+          </a:xfrm>
+        </p:spPr>
+        <p:txBody>
+          <a:bodyPr/>
+          <a:lstStyle/>
+          <a:p>
+            <a:r>
+              <a:rPr lang="en-US" dirty="0"/>
+              <a:t>Result</a:t>
+            </a:r>
+          </a:p>
+        </p:txBody>
+      </p:sp>
+      <p:sp>
+        <p:nvSpPr>
+          <p:cNvPr id="11" name="Content Placeholder 10">
+            <a:extLst>
+              <a:ext uri="{FF2B5EF4-FFF2-40B4-BE49-F238E27FC236}">
+                <a16:creationId xmlns:a16="http://schemas.microsoft.com/office/drawing/2014/main" id="{2BC4BBBE-0B3B-E874-98B2-C829F1DC82F1}"/>
+              </a:ext>
+            </a:extLst>
+          </p:cNvPr>
+          <p:cNvSpPr>
+            <a:spLocks noGrp="1"/>
+          </p:cNvSpPr>
+          <p:nvPr>
+            <p:ph sz="quarter" idx="4"/>
+          </p:nvPr>
+        </p:nvSpPr>
+        <p:spPr>
+          <a:xfrm>
+            <a:off x="6525014" y="2757685"/>
+            <a:ext cx="4443984" cy="3109715"/>
+          </a:xfrm>
+        </p:spPr>
+        <p:txBody>
+          <a:bodyPr>
+            <a:normAutofit fontScale="55000" lnSpcReduction="20000"/>
+          </a:bodyPr>
+          <a:lstStyle/>
+          <a:p>
+            <a:r>
+              <a:rPr lang="en-US" dirty="0"/>
+              <a:t>NMT generated response with ‘bleu’ score less than 12</a:t>
+            </a:r>
+          </a:p>
+          <a:p>
+            <a:pPr marL="987552" lvl="1" indent="-457200">
+              <a:buFont typeface="+mj-lt"/>
+              <a:buAutoNum type="arabicPeriod"/>
+            </a:pPr>
+            <a:r>
+              <a:rPr lang="en-US" dirty="0"/>
+              <a:t>NMT response suppressed</a:t>
+            </a:r>
+          </a:p>
+          <a:p>
+            <a:pPr marL="987552" lvl="1" indent="-457200">
+              <a:buFont typeface="+mj-lt"/>
+              <a:buAutoNum type="arabicPeriod"/>
+            </a:pPr>
+            <a:r>
+              <a:rPr lang="en-US" dirty="0"/>
+              <a:t>question-label classifier response returned</a:t>
+            </a:r>
+          </a:p>
+          <a:p>
+            <a:pPr marL="0" indent="0">
+              <a:buNone/>
+            </a:pPr>
+            <a:endParaRPr lang="en-US" dirty="0"/>
+          </a:p>
+          <a:p>
+            <a:pPr marL="0" indent="0">
+              <a:buNone/>
+            </a:pPr>
+            <a:r>
+              <a:rPr lang="en-US" sz="4800" dirty="0"/>
+              <a:t>Discussion</a:t>
+            </a:r>
+          </a:p>
+          <a:p>
+            <a:pPr marL="0" indent="0">
+              <a:buNone/>
+            </a:pPr>
+            <a:endParaRPr lang="en-US" dirty="0"/>
+          </a:p>
+          <a:p>
+            <a:r>
+              <a:rPr lang="en-US" dirty="0"/>
+              <a:t>NMT uses ‘bleu’ scoring scale for responses</a:t>
+            </a:r>
+          </a:p>
+          <a:p>
+            <a:pPr lvl="1"/>
+            <a:r>
+              <a:rPr lang="en-US" dirty="0"/>
+              <a:t>change default ‘bleu’ metric to ‘accuracy’</a:t>
+            </a:r>
+          </a:p>
+          <a:p>
+            <a:r>
+              <a:rPr lang="en-US" dirty="0"/>
+              <a:t>Our codebase arbitrarily suppresses NMT response when bleu </a:t>
+            </a:r>
+            <a:r>
+              <a:rPr lang="en-US" dirty="0" err="1"/>
+              <a:t>best_score</a:t>
+            </a:r>
+            <a:r>
+              <a:rPr lang="en-US" dirty="0"/>
+              <a:t> &lt; 12</a:t>
+            </a:r>
+          </a:p>
+          <a:p>
+            <a:pPr lvl="1"/>
+            <a:r>
+              <a:rPr lang="en-US" dirty="0"/>
+              <a:t>never spent time investigating NMT scoring configuration</a:t>
+            </a:r>
+          </a:p>
+          <a:p>
+            <a:pPr lvl="1"/>
+            <a:endParaRPr lang="en-US" dirty="0"/>
+          </a:p>
+        </p:txBody>
+      </p:sp>
+      <p:sp>
+        <p:nvSpPr>
+          <p:cNvPr id="4" name="Footer Placeholder 3">
+            <a:extLst>
+              <a:ext uri="{FF2B5EF4-FFF2-40B4-BE49-F238E27FC236}">
+                <a16:creationId xmlns:a16="http://schemas.microsoft.com/office/drawing/2014/main" id="{42520141-D06A-2FE8-F452-6F1FB36007C9}"/>
+              </a:ext>
+            </a:extLst>
+          </p:cNvPr>
+          <p:cNvSpPr>
+            <a:spLocks noGrp="1"/>
+          </p:cNvSpPr>
+          <p:nvPr>
+            <p:ph type="ftr" sz="quarter" idx="11"/>
+          </p:nvPr>
+        </p:nvSpPr>
+        <p:spPr/>
+        <p:txBody>
+          <a:bodyPr/>
+          <a:lstStyle/>
+          <a:p>
+            <a:r>
+              <a:rPr lang="en-US"/>
+              <a:t>Syracuse University | School of Information Studies | Jeff Levesque</a:t>
+            </a:r>
+          </a:p>
+        </p:txBody>
+      </p:sp>
+      <p:sp>
+        <p:nvSpPr>
+          <p:cNvPr id="5" name="Slide Number Placeholder 4">
+            <a:extLst>
+              <a:ext uri="{FF2B5EF4-FFF2-40B4-BE49-F238E27FC236}">
+                <a16:creationId xmlns:a16="http://schemas.microsoft.com/office/drawing/2014/main" id="{14622E81-7798-2D77-2EFA-A3C005AFF5E0}"/>
+              </a:ext>
+            </a:extLst>
+          </p:cNvPr>
+          <p:cNvSpPr>
+            <a:spLocks noGrp="1"/>
+          </p:cNvSpPr>
+          <p:nvPr>
+            <p:ph type="sldNum" sz="quarter" idx="12"/>
+          </p:nvPr>
+        </p:nvSpPr>
+        <p:spPr/>
+        <p:txBody>
+          <a:bodyPr/>
+          <a:lstStyle/>
+          <a:p>
+            <a:fld id="{853C539F-E86C-6741-9E08-043B79C1FE47}" type="slidenum">
+              <a:rPr lang="en-US" smtClean="0"/>
+              <a:t>15</a:t>
+            </a:fld>
+            <a:endParaRPr lang="en-US"/>
+          </a:p>
+        </p:txBody>
+      </p:sp>
+    </p:spTree>
+    <p:extLst>
+      <p:ext uri="{BB962C8B-B14F-4D97-AF65-F5344CB8AC3E}">
+        <p14:creationId xmlns:p14="http://schemas.microsoft.com/office/powerpoint/2010/main" val="265879871"/>
+      </p:ext>
+    </p:extLst>
+  </p:cSld>
+  <p:clrMapOvr>
+    <a:masterClrMapping/>
+  </p:clrMapOvr>
+</p:sld>
+</file>
+
+<file path=ppt/slides/slide16.xml><?xml version="1.0" encoding="utf-8"?>
+<p:sld xmlns:a="http://schemas.openxmlformats.org/drawingml/2006/main" xmlns:r="http://schemas.openxmlformats.org/officeDocument/2006/relationships" xmlns:p="http://schemas.openxmlformats.org/presentationml/2006/main">
+  <p:cSld>
+    <p:bg>
+      <p:bgPr>
+        <a:blipFill dpi="0" rotWithShape="1">
+          <a:blip r:embed="rId2">
             <a:alphaModFix amt="29667"/>
             <a:lum/>
             <a:extLst>
@@ -13495,7 +15891,7 @@
           <a:p>
             <a:fld id="{853C539F-E86C-6741-9E08-043B79C1FE47}" type="slidenum">
               <a:rPr lang="en-US" smtClean="0"/>
-              <a:t>10</a:t>
+              <a:t>16</a:t>
             </a:fld>
             <a:endParaRPr lang="en-US"/>
           </a:p>
@@ -13514,7 +15910,7 @@
 </p:sld>
 </file>
 
-<file path=ppt/slides/slide11.xml><?xml version="1.0" encoding="utf-8"?>
+<file path=ppt/slides/slide17.xml><?xml version="1.0" encoding="utf-8"?>
 <p:sld xmlns:a="http://schemas.openxmlformats.org/drawingml/2006/main" xmlns:r="http://schemas.openxmlformats.org/officeDocument/2006/relationships" xmlns:p="http://schemas.openxmlformats.org/presentationml/2006/main">
   <p:cSld>
     <p:bg>
@@ -13661,7 +16057,7 @@
           <a:p>
             <a:fld id="{853C539F-E86C-6741-9E08-043B79C1FE47}" type="slidenum">
               <a:rPr lang="en-US" smtClean="0"/>
-              <a:t>11</a:t>
+              <a:t>17</a:t>
             </a:fld>
             <a:endParaRPr lang="en-US"/>
           </a:p>
@@ -14780,6 +17176,231 @@
           <p:cNvPr id="2" name="Title 1">
             <a:extLst>
               <a:ext uri="{FF2B5EF4-FFF2-40B4-BE49-F238E27FC236}">
+                <a16:creationId xmlns:a16="http://schemas.microsoft.com/office/drawing/2014/main" id="{7A977A2E-F923-4FCA-9053-502C9190FAB9}"/>
+              </a:ext>
+            </a:extLst>
+          </p:cNvPr>
+          <p:cNvSpPr>
+            <a:spLocks noGrp="1"/>
+          </p:cNvSpPr>
+          <p:nvPr>
+            <p:ph type="title"/>
+          </p:nvPr>
+        </p:nvSpPr>
+        <p:spPr/>
+        <p:txBody>
+          <a:bodyPr/>
+          <a:lstStyle/>
+          <a:p>
+            <a:r>
+              <a:rPr lang="en-US" dirty="0"/>
+              <a:t>Objective</a:t>
+            </a:r>
+          </a:p>
+        </p:txBody>
+      </p:sp>
+      <p:sp>
+        <p:nvSpPr>
+          <p:cNvPr id="9" name="Content Placeholder 8">
+            <a:extLst>
+              <a:ext uri="{FF2B5EF4-FFF2-40B4-BE49-F238E27FC236}">
+                <a16:creationId xmlns:a16="http://schemas.microsoft.com/office/drawing/2014/main" id="{77EC5C83-6A79-EDD3-412B-1A695722CADC}"/>
+              </a:ext>
+            </a:extLst>
+          </p:cNvPr>
+          <p:cNvSpPr>
+            <a:spLocks noGrp="1"/>
+          </p:cNvSpPr>
+          <p:nvPr>
+            <p:ph idx="1"/>
+          </p:nvPr>
+        </p:nvSpPr>
+        <p:spPr/>
+        <p:txBody>
+          <a:bodyPr>
+            <a:normAutofit/>
+          </a:bodyPr>
+          <a:lstStyle/>
+          <a:p>
+            <a:pPr marL="0" indent="0">
+              <a:buNone/>
+            </a:pPr>
+            <a:r>
+              <a:rPr lang="en-US" sz="1800" dirty="0">
+                <a:solidFill>
+                  <a:schemeClr val="accent1"/>
+                </a:solidFill>
+                <a:effectLst/>
+                <a:latin typeface="Calibri" panose="020F0502020204030204" pitchFamily="34" charset="0"/>
+                <a:ea typeface="Calibri" panose="020F0502020204030204" pitchFamily="34" charset="0"/>
+                <a:cs typeface="Times New Roman" panose="02020603050405020304" pitchFamily="18" charset="0"/>
+              </a:rPr>
+              <a:t>Minimum Requirement</a:t>
+            </a:r>
+          </a:p>
+          <a:p>
+            <a:pPr marL="0" indent="0">
+              <a:buNone/>
+            </a:pPr>
+            <a:r>
+              <a:rPr lang="en-US" sz="1800" dirty="0">
+                <a:effectLst/>
+                <a:latin typeface="Calibri" panose="020F0502020204030204" pitchFamily="34" charset="0"/>
+                <a:ea typeface="Calibri" panose="020F0502020204030204" pitchFamily="34" charset="0"/>
+                <a:cs typeface="Times New Roman" panose="02020603050405020304" pitchFamily="18" charset="0"/>
+              </a:rPr>
+              <a:t>Utilize R, perform financial analysis for decision-making, visualize results using Shiny dashboard</a:t>
+            </a:r>
+          </a:p>
+          <a:p>
+            <a:pPr marL="0" indent="0">
+              <a:buNone/>
+            </a:pPr>
+            <a:endParaRPr lang="en-US" sz="1800" dirty="0">
+              <a:latin typeface="Calibri" panose="020F0502020204030204" pitchFamily="34" charset="0"/>
+              <a:ea typeface="Calibri" panose="020F0502020204030204" pitchFamily="34" charset="0"/>
+              <a:cs typeface="Times New Roman" panose="02020603050405020304" pitchFamily="18" charset="0"/>
+            </a:endParaRPr>
+          </a:p>
+          <a:p>
+            <a:pPr marL="0" indent="0">
+              <a:buNone/>
+            </a:pPr>
+            <a:r>
+              <a:rPr lang="en-US" sz="1800" dirty="0">
+                <a:solidFill>
+                  <a:schemeClr val="accent1"/>
+                </a:solidFill>
+                <a:effectLst/>
+                <a:latin typeface="Calibri" panose="020F0502020204030204" pitchFamily="34" charset="0"/>
+                <a:ea typeface="Calibri" panose="020F0502020204030204" pitchFamily="34" charset="0"/>
+                <a:cs typeface="Times New Roman" panose="02020603050405020304" pitchFamily="18" charset="0"/>
+              </a:rPr>
+              <a:t>Desired Goal</a:t>
+            </a:r>
+          </a:p>
+          <a:p>
+            <a:pPr marL="0" indent="0">
+              <a:buNone/>
+            </a:pPr>
+            <a:r>
+              <a:rPr lang="en-US" sz="1800" dirty="0">
+                <a:effectLst/>
+                <a:latin typeface="Calibri" panose="020F0502020204030204" pitchFamily="34" charset="0"/>
+                <a:ea typeface="Calibri" panose="020F0502020204030204" pitchFamily="34" charset="0"/>
+                <a:cs typeface="Times New Roman" panose="02020603050405020304" pitchFamily="18" charset="0"/>
+              </a:rPr>
+              <a:t>Reuse R code from previous course assignments with supplement python code to perform financial analysis,</a:t>
+            </a:r>
+            <a:r>
+              <a:rPr lang="en-US" sz="1800" dirty="0">
+                <a:latin typeface="Calibri" panose="020F0502020204030204" pitchFamily="34" charset="0"/>
+                <a:ea typeface="Calibri" panose="020F0502020204030204" pitchFamily="34" charset="0"/>
+                <a:cs typeface="Times New Roman" panose="02020603050405020304" pitchFamily="18" charset="0"/>
+              </a:rPr>
+              <a:t> and machine learning visualized through Shiny dashboard</a:t>
+            </a:r>
+            <a:endParaRPr lang="en-US" sz="1800" dirty="0">
+              <a:effectLst/>
+              <a:latin typeface="Calibri" panose="020F0502020204030204" pitchFamily="34" charset="0"/>
+              <a:ea typeface="Calibri" panose="020F0502020204030204" pitchFamily="34" charset="0"/>
+              <a:cs typeface="Times New Roman" panose="02020603050405020304" pitchFamily="18" charset="0"/>
+            </a:endParaRPr>
+          </a:p>
+        </p:txBody>
+      </p:sp>
+      <p:sp>
+        <p:nvSpPr>
+          <p:cNvPr id="4" name="Footer Placeholder 3">
+            <a:extLst>
+              <a:ext uri="{FF2B5EF4-FFF2-40B4-BE49-F238E27FC236}">
+                <a16:creationId xmlns:a16="http://schemas.microsoft.com/office/drawing/2014/main" id="{3B2A24F1-5DBE-8B40-C915-7BC0518AA7B9}"/>
+              </a:ext>
+            </a:extLst>
+          </p:cNvPr>
+          <p:cNvSpPr>
+            <a:spLocks noGrp="1"/>
+          </p:cNvSpPr>
+          <p:nvPr>
+            <p:ph type="ftr" sz="quarter" idx="11"/>
+          </p:nvPr>
+        </p:nvSpPr>
+        <p:spPr/>
+        <p:txBody>
+          <a:bodyPr/>
+          <a:lstStyle/>
+          <a:p>
+            <a:r>
+              <a:rPr lang="en-US"/>
+              <a:t>Syracuse University | School of Information Studies | Jeff Levesque</a:t>
+            </a:r>
+          </a:p>
+        </p:txBody>
+      </p:sp>
+      <p:sp>
+        <p:nvSpPr>
+          <p:cNvPr id="5" name="Slide Number Placeholder 4">
+            <a:extLst>
+              <a:ext uri="{FF2B5EF4-FFF2-40B4-BE49-F238E27FC236}">
+                <a16:creationId xmlns:a16="http://schemas.microsoft.com/office/drawing/2014/main" id="{1AFE846D-6173-EBDF-AF2C-E9874C5D44A1}"/>
+              </a:ext>
+            </a:extLst>
+          </p:cNvPr>
+          <p:cNvSpPr>
+            <a:spLocks noGrp="1"/>
+          </p:cNvSpPr>
+          <p:nvPr>
+            <p:ph type="sldNum" sz="quarter" idx="12"/>
+          </p:nvPr>
+        </p:nvSpPr>
+        <p:spPr/>
+        <p:txBody>
+          <a:bodyPr/>
+          <a:lstStyle/>
+          <a:p>
+            <a:fld id="{853C539F-E86C-6741-9E08-043B79C1FE47}" type="slidenum">
+              <a:rPr lang="en-US" smtClean="0"/>
+              <a:t>6</a:t>
+            </a:fld>
+            <a:endParaRPr lang="en-US"/>
+          </a:p>
+        </p:txBody>
+      </p:sp>
+    </p:spTree>
+    <p:extLst>
+      <p:ext uri="{BB962C8B-B14F-4D97-AF65-F5344CB8AC3E}">
+        <p14:creationId xmlns:p14="http://schemas.microsoft.com/office/powerpoint/2010/main" val="771807147"/>
+      </p:ext>
+    </p:extLst>
+  </p:cSld>
+  <p:clrMapOvr>
+    <a:masterClrMapping/>
+  </p:clrMapOvr>
+</p:sld>
+</file>
+
+<file path=ppt/slides/slide7.xml><?xml version="1.0" encoding="utf-8"?>
+<p:sld xmlns:a="http://schemas.openxmlformats.org/drawingml/2006/main" xmlns:r="http://schemas.openxmlformats.org/officeDocument/2006/relationships" xmlns:p="http://schemas.openxmlformats.org/presentationml/2006/main">
+  <p:cSld>
+    <p:spTree>
+      <p:nvGrpSpPr>
+        <p:cNvPr id="1" name=""/>
+        <p:cNvGrpSpPr/>
+        <p:nvPr/>
+      </p:nvGrpSpPr>
+      <p:grpSpPr>
+        <a:xfrm>
+          <a:off x="0" y="0"/>
+          <a:ext cx="0" cy="0"/>
+          <a:chOff x="0" y="0"/>
+          <a:chExt cx="0" cy="0"/>
+        </a:xfrm>
+      </p:grpSpPr>
+      <p:sp>
+        <p:nvSpPr>
+          <p:cNvPr id="2" name="Title 1">
+            <a:extLst>
+              <a:ext uri="{FF2B5EF4-FFF2-40B4-BE49-F238E27FC236}">
                 <a16:creationId xmlns:a16="http://schemas.microsoft.com/office/drawing/2014/main" id="{0D387D4E-3858-5CF2-5D32-CC02DB355186}"/>
               </a:ext>
             </a:extLst>
@@ -15110,7 +17731,7 @@
           <a:p>
             <a:fld id="{853C539F-E86C-6741-9E08-043B79C1FE47}" type="slidenum">
               <a:rPr lang="en-US" smtClean="0"/>
-              <a:t>6</a:t>
+              <a:t>7</a:t>
             </a:fld>
             <a:endParaRPr lang="en-US"/>
           </a:p>
@@ -15175,7 +17796,7 @@
 </p:sld>
 </file>
 
-<file path=ppt/slides/slide7.xml><?xml version="1.0" encoding="utf-8"?>
+<file path=ppt/slides/slide8.xml><?xml version="1.0" encoding="utf-8"?>
 <p:sld xmlns:a="http://schemas.openxmlformats.org/drawingml/2006/main" xmlns:r="http://schemas.openxmlformats.org/officeDocument/2006/relationships" xmlns:p="http://schemas.openxmlformats.org/presentationml/2006/main">
   <p:cSld>
     <p:spTree>
@@ -15433,7 +18054,7 @@
           <a:p>
             <a:fld id="{853C539F-E86C-6741-9E08-043B79C1FE47}" type="slidenum">
               <a:rPr lang="en-US" smtClean="0"/>
-              <a:t>7</a:t>
+              <a:t>8</a:t>
             </a:fld>
             <a:endParaRPr lang="en-US"/>
           </a:p>
@@ -15452,7 +18073,7 @@
 </p:sld>
 </file>
 
-<file path=ppt/slides/slide8.xml><?xml version="1.0" encoding="utf-8"?>
+<file path=ppt/slides/slide9.xml><?xml version="1.0" encoding="utf-8"?>
 <p:sld xmlns:a="http://schemas.openxmlformats.org/drawingml/2006/main" xmlns:r="http://schemas.openxmlformats.org/officeDocument/2006/relationships" xmlns:p="http://schemas.openxmlformats.org/presentationml/2006/main">
   <p:cSld>
     <p:spTree>
@@ -15614,7 +18235,7 @@
           <a:p>
             <a:fld id="{853C539F-E86C-6741-9E08-043B79C1FE47}" type="slidenum">
               <a:rPr lang="en-US" smtClean="0"/>
-              <a:t>8</a:t>
+              <a:t>9</a:t>
             </a:fld>
             <a:endParaRPr lang="en-US"/>
           </a:p>
@@ -15722,172 +18343,6 @@
     <p:extLst>
       <p:ext uri="{BB962C8B-B14F-4D97-AF65-F5344CB8AC3E}">
         <p14:creationId xmlns:p14="http://schemas.microsoft.com/office/powerpoint/2010/main" val="1138072347"/>
-      </p:ext>
-    </p:extLst>
-  </p:cSld>
-  <p:clrMapOvr>
-    <a:masterClrMapping/>
-  </p:clrMapOvr>
-</p:sld>
-</file>
-
-<file path=ppt/slides/slide9.xml><?xml version="1.0" encoding="utf-8"?>
-<p:sld xmlns:a="http://schemas.openxmlformats.org/drawingml/2006/main" xmlns:r="http://schemas.openxmlformats.org/officeDocument/2006/relationships" xmlns:p="http://schemas.openxmlformats.org/presentationml/2006/main">
-  <p:cSld>
-    <p:bg>
-      <p:bgPr>
-        <a:blipFill dpi="0" rotWithShape="1">
-          <a:blip r:embed="rId2">
-            <a:alphaModFix amt="29932"/>
-            <a:lum/>
-          </a:blip>
-          <a:srcRect/>
-          <a:stretch>
-            <a:fillRect l="-12000" t="20000" r="-12000" b="-20000"/>
-          </a:stretch>
-        </a:blipFill>
-        <a:effectLst/>
-      </p:bgPr>
-    </p:bg>
-    <p:spTree>
-      <p:nvGrpSpPr>
-        <p:cNvPr id="1" name=""/>
-        <p:cNvGrpSpPr/>
-        <p:nvPr/>
-      </p:nvGrpSpPr>
-      <p:grpSpPr>
-        <a:xfrm>
-          <a:off x="0" y="0"/>
-          <a:ext cx="0" cy="0"/>
-          <a:chOff x="0" y="0"/>
-          <a:chExt cx="0" cy="0"/>
-        </a:xfrm>
-      </p:grpSpPr>
-      <p:sp>
-        <p:nvSpPr>
-          <p:cNvPr id="7" name="Title 6">
-            <a:extLst>
-              <a:ext uri="{FF2B5EF4-FFF2-40B4-BE49-F238E27FC236}">
-                <a16:creationId xmlns:a16="http://schemas.microsoft.com/office/drawing/2014/main" id="{F276A244-89FD-5B81-7E4E-67067BB463F2}"/>
-              </a:ext>
-            </a:extLst>
-          </p:cNvPr>
-          <p:cNvSpPr>
-            <a:spLocks noGrp="1"/>
-          </p:cNvSpPr>
-          <p:nvPr>
-            <p:ph type="ctrTitle"/>
-          </p:nvPr>
-        </p:nvSpPr>
-        <p:spPr/>
-        <p:txBody>
-          <a:bodyPr/>
-          <a:lstStyle/>
-          <a:p>
-            <a:r>
-              <a:rPr lang="en-US" dirty="0">
-                <a:solidFill>
-                  <a:schemeClr val="tx1"/>
-                </a:solidFill>
-              </a:rPr>
-              <a:t>IST-664</a:t>
-            </a:r>
-          </a:p>
-        </p:txBody>
-      </p:sp>
-      <p:sp>
-        <p:nvSpPr>
-          <p:cNvPr id="2" name="Subtitle 1">
-            <a:extLst>
-              <a:ext uri="{FF2B5EF4-FFF2-40B4-BE49-F238E27FC236}">
-                <a16:creationId xmlns:a16="http://schemas.microsoft.com/office/drawing/2014/main" id="{E28A000C-5430-E51B-8330-70BE38363181}"/>
-              </a:ext>
-            </a:extLst>
-          </p:cNvPr>
-          <p:cNvSpPr>
-            <a:spLocks noGrp="1"/>
-          </p:cNvSpPr>
-          <p:nvPr>
-            <p:ph type="subTitle" idx="1"/>
-          </p:nvPr>
-        </p:nvSpPr>
-        <p:spPr/>
-        <p:txBody>
-          <a:bodyPr/>
-          <a:lstStyle/>
-          <a:p>
-            <a:r>
-              <a:rPr lang="en-US" dirty="0">
-                <a:solidFill>
-                  <a:schemeClr val="accent1"/>
-                </a:solidFill>
-              </a:rPr>
-              <a:t>Ensembled Chatbot: classifiers with neural network</a:t>
-            </a:r>
-          </a:p>
-        </p:txBody>
-      </p:sp>
-      <p:sp>
-        <p:nvSpPr>
-          <p:cNvPr id="4" name="Footer Placeholder 3">
-            <a:extLst>
-              <a:ext uri="{FF2B5EF4-FFF2-40B4-BE49-F238E27FC236}">
-                <a16:creationId xmlns:a16="http://schemas.microsoft.com/office/drawing/2014/main" id="{68E9089F-E539-6FB4-7AB9-48C44B1D1C05}"/>
-              </a:ext>
-            </a:extLst>
-          </p:cNvPr>
-          <p:cNvSpPr>
-            <a:spLocks noGrp="1"/>
-          </p:cNvSpPr>
-          <p:nvPr>
-            <p:ph type="ftr" sz="quarter" idx="11"/>
-          </p:nvPr>
-        </p:nvSpPr>
-        <p:spPr/>
-        <p:txBody>
-          <a:bodyPr/>
-          <a:lstStyle/>
-          <a:p>
-            <a:r>
-              <a:rPr lang="en-US"/>
-              <a:t>Syracuse University | School of Information Studies | Jeff Levesque</a:t>
-            </a:r>
-          </a:p>
-        </p:txBody>
-      </p:sp>
-      <p:sp>
-        <p:nvSpPr>
-          <p:cNvPr id="5" name="Slide Number Placeholder 4">
-            <a:extLst>
-              <a:ext uri="{FF2B5EF4-FFF2-40B4-BE49-F238E27FC236}">
-                <a16:creationId xmlns:a16="http://schemas.microsoft.com/office/drawing/2014/main" id="{5A24DB52-4754-4E19-F24F-49AC47526CB9}"/>
-              </a:ext>
-            </a:extLst>
-          </p:cNvPr>
-          <p:cNvSpPr>
-            <a:spLocks noGrp="1"/>
-          </p:cNvSpPr>
-          <p:nvPr>
-            <p:ph type="sldNum" sz="quarter" idx="12"/>
-          </p:nvPr>
-        </p:nvSpPr>
-        <p:spPr/>
-        <p:txBody>
-          <a:bodyPr/>
-          <a:lstStyle/>
-          <a:p>
-            <a:fld id="{853C539F-E86C-6741-9E08-043B79C1FE47}" type="slidenum">
-              <a:rPr lang="en-US" smtClean="0"/>
-              <a:t>9</a:t>
-            </a:fld>
-            <a:endParaRPr lang="en-US"/>
-          </a:p>
-        </p:txBody>
-      </p:sp>
-    </p:spTree>
-    <p:extLst>
-      <p:ext uri="{BB962C8B-B14F-4D97-AF65-F5344CB8AC3E}">
-        <p14:creationId xmlns:p14="http://schemas.microsoft.com/office/powerpoint/2010/main" val="2810723432"/>
       </p:ext>
     </p:extLst>
   </p:cSld>

</xml_diff>

<commit_message>
#12: presentation.pptx, update RNN slide
</commit_message>
<xml_diff>
--- a/presentation.pptx
+++ b/presentation.pptx
@@ -14913,7 +14913,7 @@
         <p:spPr>
           <a:xfrm>
             <a:off x="1371600" y="2757687"/>
-            <a:ext cx="4443984" cy="3109714"/>
+            <a:ext cx="4724400" cy="3109714"/>
           </a:xfrm>
         </p:spPr>
         <p:txBody>
@@ -15534,8 +15534,8 @@
         </p:nvSpPr>
         <p:spPr>
           <a:xfrm>
-            <a:off x="6525014" y="1680464"/>
-            <a:ext cx="4443984" cy="823912"/>
+            <a:off x="6311900" y="1680464"/>
+            <a:ext cx="5232400" cy="823912"/>
           </a:xfrm>
         </p:spPr>
         <p:txBody>
@@ -15567,8 +15567,8 @@
         </p:nvSpPr>
         <p:spPr>
           <a:xfrm>
-            <a:off x="6525014" y="2757685"/>
-            <a:ext cx="4443984" cy="3109715"/>
+            <a:off x="6311900" y="2757685"/>
+            <a:ext cx="5232400" cy="3414515"/>
           </a:xfrm>
         </p:spPr>
         <p:txBody>
@@ -15599,7 +15599,7 @@
             </a:pPr>
             <a:r>
               <a:rPr lang="en-US" dirty="0"/>
-              <a:t>question-label classifier response returned</a:t>
+              <a:t>question-label classifier (fallback) response returned</a:t>
             </a:r>
           </a:p>
           <a:p>
@@ -15655,6 +15655,20 @@
             <a:r>
               <a:rPr lang="en-US" dirty="0"/>
               <a:t>never spent time investigating NMT scoring configuration</a:t>
+            </a:r>
+          </a:p>
+          <a:p>
+            <a:r>
+              <a:rPr lang="en-US" dirty="0"/>
+              <a:t>ingested data in </a:t>
+            </a:r>
+            <a:r>
+              <a:rPr lang="en-US" dirty="0" err="1"/>
+              <a:t>mongodb</a:t>
+            </a:r>
+            <a:r>
+              <a:rPr lang="en-US" dirty="0"/>
+              <a:t> should be sufficient quantity for at least low quality NMT chatbot</a:t>
             </a:r>
           </a:p>
           <a:p>

</xml_diff>